<commit_message>
added slide for LDA description
</commit_message>
<xml_diff>
--- a/DA_6233_Final_Presentation.pptx
+++ b/DA_6233_Final_Presentation.pptx
@@ -5,7 +5,7 @@
     <p:sldMasterId id="2147483648" r:id="rId1"/>
   </p:sldMasterIdLst>
   <p:notesMasterIdLst>
-    <p:notesMasterId r:id="rId14"/>
+    <p:notesMasterId r:id="rId15"/>
   </p:notesMasterIdLst>
   <p:sldIdLst>
     <p:sldId id="256" r:id="rId2"/>
@@ -17,9 +17,10 @@
     <p:sldId id="262" r:id="rId8"/>
     <p:sldId id="263" r:id="rId9"/>
     <p:sldId id="264" r:id="rId10"/>
-    <p:sldId id="260" r:id="rId11"/>
-    <p:sldId id="266" r:id="rId12"/>
-    <p:sldId id="267" r:id="rId13"/>
+    <p:sldId id="268" r:id="rId11"/>
+    <p:sldId id="260" r:id="rId12"/>
+    <p:sldId id="266" r:id="rId13"/>
+    <p:sldId id="267" r:id="rId14"/>
   </p:sldIdLst>
   <p:sldSz cx="12192000" cy="6858000"/>
   <p:notesSz cx="6858000" cy="9144000"/>
@@ -208,7 +209,7 @@
           <a:p>
             <a:fld id="{58299053-DB97-47E9-A4B3-500162653FBF}" type="datetimeFigureOut">
               <a:rPr lang="en-US" smtClean="0"/>
-              <a:t>9/11/2018</a:t>
+              <a:t>9/13/2018</a:t>
             </a:fld>
             <a:endParaRPr lang="en-US"/>
           </a:p>
@@ -624,7 +625,7 @@
           <a:p>
             <a:fld id="{684CF5A3-BAE2-4A74-8FB3-5868FC79B3E4}" type="slidenum">
               <a:rPr lang="en-US" smtClean="0"/>
-              <a:t>11</a:t>
+              <a:t>12</a:t>
             </a:fld>
             <a:endParaRPr lang="en-US"/>
           </a:p>
@@ -665,7 +666,7 @@
           <p:cNvPr id="2" name="Title 1">
             <a:extLst>
               <a:ext uri="{FF2B5EF4-FFF2-40B4-BE49-F238E27FC236}">
-                <a16:creationId xmlns:a16="http://schemas.microsoft.com/office/drawing/2014/main" xmlns="" id="{744D7686-7A51-4BE1-875F-CD6EF979A411}"/>
+                <a16:creationId xmlns:a16="http://schemas.microsoft.com/office/drawing/2014/main" id="{744D7686-7A51-4BE1-875F-CD6EF979A411}"/>
               </a:ext>
             </a:extLst>
           </p:cNvPr>
@@ -702,7 +703,7 @@
           <p:cNvPr id="3" name="Subtitle 2">
             <a:extLst>
               <a:ext uri="{FF2B5EF4-FFF2-40B4-BE49-F238E27FC236}">
-                <a16:creationId xmlns:a16="http://schemas.microsoft.com/office/drawing/2014/main" xmlns="" id="{CB78BDF9-C297-44E6-B470-FCB7CEB96D31}"/>
+                <a16:creationId xmlns:a16="http://schemas.microsoft.com/office/drawing/2014/main" id="{CB78BDF9-C297-44E6-B470-FCB7CEB96D31}"/>
               </a:ext>
             </a:extLst>
           </p:cNvPr>
@@ -772,7 +773,7 @@
           <p:cNvPr id="4" name="Date Placeholder 3">
             <a:extLst>
               <a:ext uri="{FF2B5EF4-FFF2-40B4-BE49-F238E27FC236}">
-                <a16:creationId xmlns:a16="http://schemas.microsoft.com/office/drawing/2014/main" xmlns="" id="{64B37A4A-83B8-4FA1-96E6-E936E4690A54}"/>
+                <a16:creationId xmlns:a16="http://schemas.microsoft.com/office/drawing/2014/main" id="{64B37A4A-83B8-4FA1-96E6-E936E4690A54}"/>
               </a:ext>
             </a:extLst>
           </p:cNvPr>
@@ -790,7 +791,7 @@
           <a:p>
             <a:fld id="{50CB2F0A-8324-4208-AF8B-B09E4CFA67EA}" type="datetimeFigureOut">
               <a:rPr lang="en-US" smtClean="0"/>
-              <a:t>9/11/2018</a:t>
+              <a:t>9/13/2018</a:t>
             </a:fld>
             <a:endParaRPr lang="en-US"/>
           </a:p>
@@ -801,7 +802,7 @@
           <p:cNvPr id="5" name="Footer Placeholder 4">
             <a:extLst>
               <a:ext uri="{FF2B5EF4-FFF2-40B4-BE49-F238E27FC236}">
-                <a16:creationId xmlns:a16="http://schemas.microsoft.com/office/drawing/2014/main" xmlns="" id="{7BC64647-9C7B-4050-80E1-91495DCDE537}"/>
+                <a16:creationId xmlns:a16="http://schemas.microsoft.com/office/drawing/2014/main" id="{7BC64647-9C7B-4050-80E1-91495DCDE537}"/>
               </a:ext>
             </a:extLst>
           </p:cNvPr>
@@ -826,7 +827,7 @@
           <p:cNvPr id="6" name="Slide Number Placeholder 5">
             <a:extLst>
               <a:ext uri="{FF2B5EF4-FFF2-40B4-BE49-F238E27FC236}">
-                <a16:creationId xmlns:a16="http://schemas.microsoft.com/office/drawing/2014/main" xmlns="" id="{B2ACA3C4-2D18-410B-8489-AE6FD7337480}"/>
+                <a16:creationId xmlns:a16="http://schemas.microsoft.com/office/drawing/2014/main" id="{B2ACA3C4-2D18-410B-8489-AE6FD7337480}"/>
               </a:ext>
             </a:extLst>
           </p:cNvPr>
@@ -885,7 +886,7 @@
           <p:cNvPr id="2" name="Title 1">
             <a:extLst>
               <a:ext uri="{FF2B5EF4-FFF2-40B4-BE49-F238E27FC236}">
-                <a16:creationId xmlns:a16="http://schemas.microsoft.com/office/drawing/2014/main" xmlns="" id="{27ABF513-A4C6-4D9D-82F8-425AC2A67243}"/>
+                <a16:creationId xmlns:a16="http://schemas.microsoft.com/office/drawing/2014/main" id="{27ABF513-A4C6-4D9D-82F8-425AC2A67243}"/>
               </a:ext>
             </a:extLst>
           </p:cNvPr>
@@ -913,7 +914,7 @@
           <p:cNvPr id="3" name="Vertical Text Placeholder 2">
             <a:extLst>
               <a:ext uri="{FF2B5EF4-FFF2-40B4-BE49-F238E27FC236}">
-                <a16:creationId xmlns:a16="http://schemas.microsoft.com/office/drawing/2014/main" xmlns="" id="{601BA765-C8A8-4FC8-9ED7-B6C1B22DDC3E}"/>
+                <a16:creationId xmlns:a16="http://schemas.microsoft.com/office/drawing/2014/main" id="{601BA765-C8A8-4FC8-9ED7-B6C1B22DDC3E}"/>
               </a:ext>
             </a:extLst>
           </p:cNvPr>
@@ -970,7 +971,7 @@
           <p:cNvPr id="4" name="Date Placeholder 3">
             <a:extLst>
               <a:ext uri="{FF2B5EF4-FFF2-40B4-BE49-F238E27FC236}">
-                <a16:creationId xmlns:a16="http://schemas.microsoft.com/office/drawing/2014/main" xmlns="" id="{EDEAAF7E-CC86-4E6F-A3FC-574F254FBFA9}"/>
+                <a16:creationId xmlns:a16="http://schemas.microsoft.com/office/drawing/2014/main" id="{EDEAAF7E-CC86-4E6F-A3FC-574F254FBFA9}"/>
               </a:ext>
             </a:extLst>
           </p:cNvPr>
@@ -988,7 +989,7 @@
           <a:p>
             <a:fld id="{50CB2F0A-8324-4208-AF8B-B09E4CFA67EA}" type="datetimeFigureOut">
               <a:rPr lang="en-US" smtClean="0"/>
-              <a:t>9/11/2018</a:t>
+              <a:t>9/13/2018</a:t>
             </a:fld>
             <a:endParaRPr lang="en-US"/>
           </a:p>
@@ -999,7 +1000,7 @@
           <p:cNvPr id="5" name="Footer Placeholder 4">
             <a:extLst>
               <a:ext uri="{FF2B5EF4-FFF2-40B4-BE49-F238E27FC236}">
-                <a16:creationId xmlns:a16="http://schemas.microsoft.com/office/drawing/2014/main" xmlns="" id="{A715B7DC-7214-4D9F-898E-CDDF4160318E}"/>
+                <a16:creationId xmlns:a16="http://schemas.microsoft.com/office/drawing/2014/main" id="{A715B7DC-7214-4D9F-898E-CDDF4160318E}"/>
               </a:ext>
             </a:extLst>
           </p:cNvPr>
@@ -1024,7 +1025,7 @@
           <p:cNvPr id="6" name="Slide Number Placeholder 5">
             <a:extLst>
               <a:ext uri="{FF2B5EF4-FFF2-40B4-BE49-F238E27FC236}">
-                <a16:creationId xmlns:a16="http://schemas.microsoft.com/office/drawing/2014/main" xmlns="" id="{CD6EA5CC-223E-46C4-A383-360521BCD0D4}"/>
+                <a16:creationId xmlns:a16="http://schemas.microsoft.com/office/drawing/2014/main" id="{CD6EA5CC-223E-46C4-A383-360521BCD0D4}"/>
               </a:ext>
             </a:extLst>
           </p:cNvPr>
@@ -1083,7 +1084,7 @@
           <p:cNvPr id="2" name="Vertical Title 1">
             <a:extLst>
               <a:ext uri="{FF2B5EF4-FFF2-40B4-BE49-F238E27FC236}">
-                <a16:creationId xmlns:a16="http://schemas.microsoft.com/office/drawing/2014/main" xmlns="" id="{46151C93-3FAD-4C89-ADAC-97003BED3448}"/>
+                <a16:creationId xmlns:a16="http://schemas.microsoft.com/office/drawing/2014/main" id="{46151C93-3FAD-4C89-ADAC-97003BED3448}"/>
               </a:ext>
             </a:extLst>
           </p:cNvPr>
@@ -1116,7 +1117,7 @@
           <p:cNvPr id="3" name="Vertical Text Placeholder 2">
             <a:extLst>
               <a:ext uri="{FF2B5EF4-FFF2-40B4-BE49-F238E27FC236}">
-                <a16:creationId xmlns:a16="http://schemas.microsoft.com/office/drawing/2014/main" xmlns="" id="{73B19E3D-6852-48D1-90EE-6126BA0CA977}"/>
+                <a16:creationId xmlns:a16="http://schemas.microsoft.com/office/drawing/2014/main" id="{73B19E3D-6852-48D1-90EE-6126BA0CA977}"/>
               </a:ext>
             </a:extLst>
           </p:cNvPr>
@@ -1178,7 +1179,7 @@
           <p:cNvPr id="4" name="Date Placeholder 3">
             <a:extLst>
               <a:ext uri="{FF2B5EF4-FFF2-40B4-BE49-F238E27FC236}">
-                <a16:creationId xmlns:a16="http://schemas.microsoft.com/office/drawing/2014/main" xmlns="" id="{68C72CA9-3312-4976-A7DD-E0785CA85529}"/>
+                <a16:creationId xmlns:a16="http://schemas.microsoft.com/office/drawing/2014/main" id="{68C72CA9-3312-4976-A7DD-E0785CA85529}"/>
               </a:ext>
             </a:extLst>
           </p:cNvPr>
@@ -1196,7 +1197,7 @@
           <a:p>
             <a:fld id="{50CB2F0A-8324-4208-AF8B-B09E4CFA67EA}" type="datetimeFigureOut">
               <a:rPr lang="en-US" smtClean="0"/>
-              <a:t>9/11/2018</a:t>
+              <a:t>9/13/2018</a:t>
             </a:fld>
             <a:endParaRPr lang="en-US"/>
           </a:p>
@@ -1207,7 +1208,7 @@
           <p:cNvPr id="5" name="Footer Placeholder 4">
             <a:extLst>
               <a:ext uri="{FF2B5EF4-FFF2-40B4-BE49-F238E27FC236}">
-                <a16:creationId xmlns:a16="http://schemas.microsoft.com/office/drawing/2014/main" xmlns="" id="{CB7441C3-EC64-43B0-A3FC-D104DF0763AB}"/>
+                <a16:creationId xmlns:a16="http://schemas.microsoft.com/office/drawing/2014/main" id="{CB7441C3-EC64-43B0-A3FC-D104DF0763AB}"/>
               </a:ext>
             </a:extLst>
           </p:cNvPr>
@@ -1232,7 +1233,7 @@
           <p:cNvPr id="6" name="Slide Number Placeholder 5">
             <a:extLst>
               <a:ext uri="{FF2B5EF4-FFF2-40B4-BE49-F238E27FC236}">
-                <a16:creationId xmlns:a16="http://schemas.microsoft.com/office/drawing/2014/main" xmlns="" id="{0F941C29-1956-47AC-A238-2BFC67B21090}"/>
+                <a16:creationId xmlns:a16="http://schemas.microsoft.com/office/drawing/2014/main" id="{0F941C29-1956-47AC-A238-2BFC67B21090}"/>
               </a:ext>
             </a:extLst>
           </p:cNvPr>
@@ -1291,7 +1292,7 @@
           <p:cNvPr id="2" name="Title 1">
             <a:extLst>
               <a:ext uri="{FF2B5EF4-FFF2-40B4-BE49-F238E27FC236}">
-                <a16:creationId xmlns:a16="http://schemas.microsoft.com/office/drawing/2014/main" xmlns="" id="{CA6AC740-4A51-41BD-BA83-C0FA05500B39}"/>
+                <a16:creationId xmlns:a16="http://schemas.microsoft.com/office/drawing/2014/main" id="{CA6AC740-4A51-41BD-BA83-C0FA05500B39}"/>
               </a:ext>
             </a:extLst>
           </p:cNvPr>
@@ -1319,7 +1320,7 @@
           <p:cNvPr id="3" name="Content Placeholder 2">
             <a:extLst>
               <a:ext uri="{FF2B5EF4-FFF2-40B4-BE49-F238E27FC236}">
-                <a16:creationId xmlns:a16="http://schemas.microsoft.com/office/drawing/2014/main" xmlns="" id="{31B6F4B4-E090-4BE2-AB45-6B725BA61793}"/>
+                <a16:creationId xmlns:a16="http://schemas.microsoft.com/office/drawing/2014/main" id="{31B6F4B4-E090-4BE2-AB45-6B725BA61793}"/>
               </a:ext>
             </a:extLst>
           </p:cNvPr>
@@ -1376,7 +1377,7 @@
           <p:cNvPr id="4" name="Date Placeholder 3">
             <a:extLst>
               <a:ext uri="{FF2B5EF4-FFF2-40B4-BE49-F238E27FC236}">
-                <a16:creationId xmlns:a16="http://schemas.microsoft.com/office/drawing/2014/main" xmlns="" id="{25A154B7-AB87-4831-8F1A-8D7A4CDE2FDB}"/>
+                <a16:creationId xmlns:a16="http://schemas.microsoft.com/office/drawing/2014/main" id="{25A154B7-AB87-4831-8F1A-8D7A4CDE2FDB}"/>
               </a:ext>
             </a:extLst>
           </p:cNvPr>
@@ -1394,7 +1395,7 @@
           <a:p>
             <a:fld id="{50CB2F0A-8324-4208-AF8B-B09E4CFA67EA}" type="datetimeFigureOut">
               <a:rPr lang="en-US" smtClean="0"/>
-              <a:t>9/11/2018</a:t>
+              <a:t>9/13/2018</a:t>
             </a:fld>
             <a:endParaRPr lang="en-US"/>
           </a:p>
@@ -1405,7 +1406,7 @@
           <p:cNvPr id="5" name="Footer Placeholder 4">
             <a:extLst>
               <a:ext uri="{FF2B5EF4-FFF2-40B4-BE49-F238E27FC236}">
-                <a16:creationId xmlns:a16="http://schemas.microsoft.com/office/drawing/2014/main" xmlns="" id="{32E48315-621B-4546-ADB9-F35348E0D1EC}"/>
+                <a16:creationId xmlns:a16="http://schemas.microsoft.com/office/drawing/2014/main" id="{32E48315-621B-4546-ADB9-F35348E0D1EC}"/>
               </a:ext>
             </a:extLst>
           </p:cNvPr>
@@ -1430,7 +1431,7 @@
           <p:cNvPr id="6" name="Slide Number Placeholder 5">
             <a:extLst>
               <a:ext uri="{FF2B5EF4-FFF2-40B4-BE49-F238E27FC236}">
-                <a16:creationId xmlns:a16="http://schemas.microsoft.com/office/drawing/2014/main" xmlns="" id="{2056410A-D62B-4938-A587-A17755797825}"/>
+                <a16:creationId xmlns:a16="http://schemas.microsoft.com/office/drawing/2014/main" id="{2056410A-D62B-4938-A587-A17755797825}"/>
               </a:ext>
             </a:extLst>
           </p:cNvPr>
@@ -1489,7 +1490,7 @@
           <p:cNvPr id="2" name="Title 1">
             <a:extLst>
               <a:ext uri="{FF2B5EF4-FFF2-40B4-BE49-F238E27FC236}">
-                <a16:creationId xmlns:a16="http://schemas.microsoft.com/office/drawing/2014/main" xmlns="" id="{5953F8F3-8C2B-41AD-8D86-2765D7A588E1}"/>
+                <a16:creationId xmlns:a16="http://schemas.microsoft.com/office/drawing/2014/main" id="{5953F8F3-8C2B-41AD-8D86-2765D7A588E1}"/>
               </a:ext>
             </a:extLst>
           </p:cNvPr>
@@ -1526,7 +1527,7 @@
           <p:cNvPr id="3" name="Text Placeholder 2">
             <a:extLst>
               <a:ext uri="{FF2B5EF4-FFF2-40B4-BE49-F238E27FC236}">
-                <a16:creationId xmlns:a16="http://schemas.microsoft.com/office/drawing/2014/main" xmlns="" id="{3F472F2E-26B6-416D-B182-54ADC50E1169}"/>
+                <a16:creationId xmlns:a16="http://schemas.microsoft.com/office/drawing/2014/main" id="{3F472F2E-26B6-416D-B182-54ADC50E1169}"/>
               </a:ext>
             </a:extLst>
           </p:cNvPr>
@@ -1651,7 +1652,7 @@
           <p:cNvPr id="4" name="Date Placeholder 3">
             <a:extLst>
               <a:ext uri="{FF2B5EF4-FFF2-40B4-BE49-F238E27FC236}">
-                <a16:creationId xmlns:a16="http://schemas.microsoft.com/office/drawing/2014/main" xmlns="" id="{0EBF19B1-6E84-42C1-807F-7A17CD2B3FD4}"/>
+                <a16:creationId xmlns:a16="http://schemas.microsoft.com/office/drawing/2014/main" id="{0EBF19B1-6E84-42C1-807F-7A17CD2B3FD4}"/>
               </a:ext>
             </a:extLst>
           </p:cNvPr>
@@ -1669,7 +1670,7 @@
           <a:p>
             <a:fld id="{50CB2F0A-8324-4208-AF8B-B09E4CFA67EA}" type="datetimeFigureOut">
               <a:rPr lang="en-US" smtClean="0"/>
-              <a:t>9/11/2018</a:t>
+              <a:t>9/13/2018</a:t>
             </a:fld>
             <a:endParaRPr lang="en-US"/>
           </a:p>
@@ -1680,7 +1681,7 @@
           <p:cNvPr id="5" name="Footer Placeholder 4">
             <a:extLst>
               <a:ext uri="{FF2B5EF4-FFF2-40B4-BE49-F238E27FC236}">
-                <a16:creationId xmlns:a16="http://schemas.microsoft.com/office/drawing/2014/main" xmlns="" id="{32032618-9D78-48A0-98E1-0EB596360096}"/>
+                <a16:creationId xmlns:a16="http://schemas.microsoft.com/office/drawing/2014/main" id="{32032618-9D78-48A0-98E1-0EB596360096}"/>
               </a:ext>
             </a:extLst>
           </p:cNvPr>
@@ -1705,7 +1706,7 @@
           <p:cNvPr id="6" name="Slide Number Placeholder 5">
             <a:extLst>
               <a:ext uri="{FF2B5EF4-FFF2-40B4-BE49-F238E27FC236}">
-                <a16:creationId xmlns:a16="http://schemas.microsoft.com/office/drawing/2014/main" xmlns="" id="{C5E8BBDD-FA74-4A45-901A-3845EA99D10A}"/>
+                <a16:creationId xmlns:a16="http://schemas.microsoft.com/office/drawing/2014/main" id="{C5E8BBDD-FA74-4A45-901A-3845EA99D10A}"/>
               </a:ext>
             </a:extLst>
           </p:cNvPr>
@@ -1764,7 +1765,7 @@
           <p:cNvPr id="2" name="Title 1">
             <a:extLst>
               <a:ext uri="{FF2B5EF4-FFF2-40B4-BE49-F238E27FC236}">
-                <a16:creationId xmlns:a16="http://schemas.microsoft.com/office/drawing/2014/main" xmlns="" id="{3485ACDA-5BE6-4AEC-8100-708954378154}"/>
+                <a16:creationId xmlns:a16="http://schemas.microsoft.com/office/drawing/2014/main" id="{3485ACDA-5BE6-4AEC-8100-708954378154}"/>
               </a:ext>
             </a:extLst>
           </p:cNvPr>
@@ -1792,7 +1793,7 @@
           <p:cNvPr id="3" name="Content Placeholder 2">
             <a:extLst>
               <a:ext uri="{FF2B5EF4-FFF2-40B4-BE49-F238E27FC236}">
-                <a16:creationId xmlns:a16="http://schemas.microsoft.com/office/drawing/2014/main" xmlns="" id="{5E8ADE4C-D6E4-4264-99FF-EC46C4189485}"/>
+                <a16:creationId xmlns:a16="http://schemas.microsoft.com/office/drawing/2014/main" id="{5E8ADE4C-D6E4-4264-99FF-EC46C4189485}"/>
               </a:ext>
             </a:extLst>
           </p:cNvPr>
@@ -1854,7 +1855,7 @@
           <p:cNvPr id="4" name="Content Placeholder 3">
             <a:extLst>
               <a:ext uri="{FF2B5EF4-FFF2-40B4-BE49-F238E27FC236}">
-                <a16:creationId xmlns:a16="http://schemas.microsoft.com/office/drawing/2014/main" xmlns="" id="{55F5604E-A34D-4756-A0F3-B43A62C2AD30}"/>
+                <a16:creationId xmlns:a16="http://schemas.microsoft.com/office/drawing/2014/main" id="{55F5604E-A34D-4756-A0F3-B43A62C2AD30}"/>
               </a:ext>
             </a:extLst>
           </p:cNvPr>
@@ -1916,7 +1917,7 @@
           <p:cNvPr id="5" name="Date Placeholder 4">
             <a:extLst>
               <a:ext uri="{FF2B5EF4-FFF2-40B4-BE49-F238E27FC236}">
-                <a16:creationId xmlns:a16="http://schemas.microsoft.com/office/drawing/2014/main" xmlns="" id="{9AC673F2-D0C0-4ABD-B7DD-9ECAA0B65E49}"/>
+                <a16:creationId xmlns:a16="http://schemas.microsoft.com/office/drawing/2014/main" id="{9AC673F2-D0C0-4ABD-B7DD-9ECAA0B65E49}"/>
               </a:ext>
             </a:extLst>
           </p:cNvPr>
@@ -1934,7 +1935,7 @@
           <a:p>
             <a:fld id="{50CB2F0A-8324-4208-AF8B-B09E4CFA67EA}" type="datetimeFigureOut">
               <a:rPr lang="en-US" smtClean="0"/>
-              <a:t>9/11/2018</a:t>
+              <a:t>9/13/2018</a:t>
             </a:fld>
             <a:endParaRPr lang="en-US"/>
           </a:p>
@@ -1945,7 +1946,7 @@
           <p:cNvPr id="6" name="Footer Placeholder 5">
             <a:extLst>
               <a:ext uri="{FF2B5EF4-FFF2-40B4-BE49-F238E27FC236}">
-                <a16:creationId xmlns:a16="http://schemas.microsoft.com/office/drawing/2014/main" xmlns="" id="{DCC06619-F4B1-4ABE-94FE-C77D0AFB2DAF}"/>
+                <a16:creationId xmlns:a16="http://schemas.microsoft.com/office/drawing/2014/main" id="{DCC06619-F4B1-4ABE-94FE-C77D0AFB2DAF}"/>
               </a:ext>
             </a:extLst>
           </p:cNvPr>
@@ -1970,7 +1971,7 @@
           <p:cNvPr id="7" name="Slide Number Placeholder 6">
             <a:extLst>
               <a:ext uri="{FF2B5EF4-FFF2-40B4-BE49-F238E27FC236}">
-                <a16:creationId xmlns:a16="http://schemas.microsoft.com/office/drawing/2014/main" xmlns="" id="{1A88CCC0-EA9A-495D-89D1-9F1F05C2F297}"/>
+                <a16:creationId xmlns:a16="http://schemas.microsoft.com/office/drawing/2014/main" id="{1A88CCC0-EA9A-495D-89D1-9F1F05C2F297}"/>
               </a:ext>
             </a:extLst>
           </p:cNvPr>
@@ -2029,7 +2030,7 @@
           <p:cNvPr id="2" name="Title 1">
             <a:extLst>
               <a:ext uri="{FF2B5EF4-FFF2-40B4-BE49-F238E27FC236}">
-                <a16:creationId xmlns:a16="http://schemas.microsoft.com/office/drawing/2014/main" xmlns="" id="{C8BFA135-5024-4992-9E18-825A34ADA8BC}"/>
+                <a16:creationId xmlns:a16="http://schemas.microsoft.com/office/drawing/2014/main" id="{C8BFA135-5024-4992-9E18-825A34ADA8BC}"/>
               </a:ext>
             </a:extLst>
           </p:cNvPr>
@@ -2062,7 +2063,7 @@
           <p:cNvPr id="3" name="Text Placeholder 2">
             <a:extLst>
               <a:ext uri="{FF2B5EF4-FFF2-40B4-BE49-F238E27FC236}">
-                <a16:creationId xmlns:a16="http://schemas.microsoft.com/office/drawing/2014/main" xmlns="" id="{3E770727-0296-4DCA-8E06-4D349B6F143E}"/>
+                <a16:creationId xmlns:a16="http://schemas.microsoft.com/office/drawing/2014/main" id="{3E770727-0296-4DCA-8E06-4D349B6F143E}"/>
               </a:ext>
             </a:extLst>
           </p:cNvPr>
@@ -2133,7 +2134,7 @@
           <p:cNvPr id="4" name="Content Placeholder 3">
             <a:extLst>
               <a:ext uri="{FF2B5EF4-FFF2-40B4-BE49-F238E27FC236}">
-                <a16:creationId xmlns:a16="http://schemas.microsoft.com/office/drawing/2014/main" xmlns="" id="{2DB28FB0-DEA5-45DE-8EC5-EE15C74BE406}"/>
+                <a16:creationId xmlns:a16="http://schemas.microsoft.com/office/drawing/2014/main" id="{2DB28FB0-DEA5-45DE-8EC5-EE15C74BE406}"/>
               </a:ext>
             </a:extLst>
           </p:cNvPr>
@@ -2195,7 +2196,7 @@
           <p:cNvPr id="5" name="Text Placeholder 4">
             <a:extLst>
               <a:ext uri="{FF2B5EF4-FFF2-40B4-BE49-F238E27FC236}">
-                <a16:creationId xmlns:a16="http://schemas.microsoft.com/office/drawing/2014/main" xmlns="" id="{E5D8A5B0-B850-44A1-A7E4-4C45D0FE0409}"/>
+                <a16:creationId xmlns:a16="http://schemas.microsoft.com/office/drawing/2014/main" id="{E5D8A5B0-B850-44A1-A7E4-4C45D0FE0409}"/>
               </a:ext>
             </a:extLst>
           </p:cNvPr>
@@ -2266,7 +2267,7 @@
           <p:cNvPr id="6" name="Content Placeholder 5">
             <a:extLst>
               <a:ext uri="{FF2B5EF4-FFF2-40B4-BE49-F238E27FC236}">
-                <a16:creationId xmlns:a16="http://schemas.microsoft.com/office/drawing/2014/main" xmlns="" id="{C2D177AE-BEAE-4BB6-B902-FED745819473}"/>
+                <a16:creationId xmlns:a16="http://schemas.microsoft.com/office/drawing/2014/main" id="{C2D177AE-BEAE-4BB6-B902-FED745819473}"/>
               </a:ext>
             </a:extLst>
           </p:cNvPr>
@@ -2328,7 +2329,7 @@
           <p:cNvPr id="7" name="Date Placeholder 6">
             <a:extLst>
               <a:ext uri="{FF2B5EF4-FFF2-40B4-BE49-F238E27FC236}">
-                <a16:creationId xmlns:a16="http://schemas.microsoft.com/office/drawing/2014/main" xmlns="" id="{1C73A79E-5806-48FF-91FC-BBC93D20134B}"/>
+                <a16:creationId xmlns:a16="http://schemas.microsoft.com/office/drawing/2014/main" id="{1C73A79E-5806-48FF-91FC-BBC93D20134B}"/>
               </a:ext>
             </a:extLst>
           </p:cNvPr>
@@ -2346,7 +2347,7 @@
           <a:p>
             <a:fld id="{50CB2F0A-8324-4208-AF8B-B09E4CFA67EA}" type="datetimeFigureOut">
               <a:rPr lang="en-US" smtClean="0"/>
-              <a:t>9/11/2018</a:t>
+              <a:t>9/13/2018</a:t>
             </a:fld>
             <a:endParaRPr lang="en-US"/>
           </a:p>
@@ -2357,7 +2358,7 @@
           <p:cNvPr id="8" name="Footer Placeholder 7">
             <a:extLst>
               <a:ext uri="{FF2B5EF4-FFF2-40B4-BE49-F238E27FC236}">
-                <a16:creationId xmlns:a16="http://schemas.microsoft.com/office/drawing/2014/main" xmlns="" id="{33F13C7F-37FE-4B1B-95E3-1A4BBF70E781}"/>
+                <a16:creationId xmlns:a16="http://schemas.microsoft.com/office/drawing/2014/main" id="{33F13C7F-37FE-4B1B-95E3-1A4BBF70E781}"/>
               </a:ext>
             </a:extLst>
           </p:cNvPr>
@@ -2382,7 +2383,7 @@
           <p:cNvPr id="9" name="Slide Number Placeholder 8">
             <a:extLst>
               <a:ext uri="{FF2B5EF4-FFF2-40B4-BE49-F238E27FC236}">
-                <a16:creationId xmlns:a16="http://schemas.microsoft.com/office/drawing/2014/main" xmlns="" id="{7E383342-7FCD-4307-9ECF-EB2C36A23530}"/>
+                <a16:creationId xmlns:a16="http://schemas.microsoft.com/office/drawing/2014/main" id="{7E383342-7FCD-4307-9ECF-EB2C36A23530}"/>
               </a:ext>
             </a:extLst>
           </p:cNvPr>
@@ -2441,7 +2442,7 @@
           <p:cNvPr id="2" name="Title 1">
             <a:extLst>
               <a:ext uri="{FF2B5EF4-FFF2-40B4-BE49-F238E27FC236}">
-                <a16:creationId xmlns:a16="http://schemas.microsoft.com/office/drawing/2014/main" xmlns="" id="{D11A7B22-5F3E-4BD1-A91F-D1512EABEED3}"/>
+                <a16:creationId xmlns:a16="http://schemas.microsoft.com/office/drawing/2014/main" id="{D11A7B22-5F3E-4BD1-A91F-D1512EABEED3}"/>
               </a:ext>
             </a:extLst>
           </p:cNvPr>
@@ -2469,7 +2470,7 @@
           <p:cNvPr id="3" name="Date Placeholder 2">
             <a:extLst>
               <a:ext uri="{FF2B5EF4-FFF2-40B4-BE49-F238E27FC236}">
-                <a16:creationId xmlns:a16="http://schemas.microsoft.com/office/drawing/2014/main" xmlns="" id="{760F96F1-1E72-452C-AB23-55E8FAB458C2}"/>
+                <a16:creationId xmlns:a16="http://schemas.microsoft.com/office/drawing/2014/main" id="{760F96F1-1E72-452C-AB23-55E8FAB458C2}"/>
               </a:ext>
             </a:extLst>
           </p:cNvPr>
@@ -2487,7 +2488,7 @@
           <a:p>
             <a:fld id="{50CB2F0A-8324-4208-AF8B-B09E4CFA67EA}" type="datetimeFigureOut">
               <a:rPr lang="en-US" smtClean="0"/>
-              <a:t>9/11/2018</a:t>
+              <a:t>9/13/2018</a:t>
             </a:fld>
             <a:endParaRPr lang="en-US"/>
           </a:p>
@@ -2498,7 +2499,7 @@
           <p:cNvPr id="4" name="Footer Placeholder 3">
             <a:extLst>
               <a:ext uri="{FF2B5EF4-FFF2-40B4-BE49-F238E27FC236}">
-                <a16:creationId xmlns:a16="http://schemas.microsoft.com/office/drawing/2014/main" xmlns="" id="{E6FAFC39-F625-44DC-9DBB-D1907C894A7D}"/>
+                <a16:creationId xmlns:a16="http://schemas.microsoft.com/office/drawing/2014/main" id="{E6FAFC39-F625-44DC-9DBB-D1907C894A7D}"/>
               </a:ext>
             </a:extLst>
           </p:cNvPr>
@@ -2523,7 +2524,7 @@
           <p:cNvPr id="5" name="Slide Number Placeholder 4">
             <a:extLst>
               <a:ext uri="{FF2B5EF4-FFF2-40B4-BE49-F238E27FC236}">
-                <a16:creationId xmlns:a16="http://schemas.microsoft.com/office/drawing/2014/main" xmlns="" id="{D771CF29-E186-46DB-86E2-6CCA895D6D6C}"/>
+                <a16:creationId xmlns:a16="http://schemas.microsoft.com/office/drawing/2014/main" id="{D771CF29-E186-46DB-86E2-6CCA895D6D6C}"/>
               </a:ext>
             </a:extLst>
           </p:cNvPr>
@@ -2582,7 +2583,7 @@
           <p:cNvPr id="2" name="Date Placeholder 1">
             <a:extLst>
               <a:ext uri="{FF2B5EF4-FFF2-40B4-BE49-F238E27FC236}">
-                <a16:creationId xmlns:a16="http://schemas.microsoft.com/office/drawing/2014/main" xmlns="" id="{C670A28D-6A13-4C7B-8FA6-AF3E27C1A845}"/>
+                <a16:creationId xmlns:a16="http://schemas.microsoft.com/office/drawing/2014/main" id="{C670A28D-6A13-4C7B-8FA6-AF3E27C1A845}"/>
               </a:ext>
             </a:extLst>
           </p:cNvPr>
@@ -2600,7 +2601,7 @@
           <a:p>
             <a:fld id="{50CB2F0A-8324-4208-AF8B-B09E4CFA67EA}" type="datetimeFigureOut">
               <a:rPr lang="en-US" smtClean="0"/>
-              <a:t>9/11/2018</a:t>
+              <a:t>9/13/2018</a:t>
             </a:fld>
             <a:endParaRPr lang="en-US"/>
           </a:p>
@@ -2611,7 +2612,7 @@
           <p:cNvPr id="3" name="Footer Placeholder 2">
             <a:extLst>
               <a:ext uri="{FF2B5EF4-FFF2-40B4-BE49-F238E27FC236}">
-                <a16:creationId xmlns:a16="http://schemas.microsoft.com/office/drawing/2014/main" xmlns="" id="{E843CB09-A7DD-4480-BAB8-E6F415989404}"/>
+                <a16:creationId xmlns:a16="http://schemas.microsoft.com/office/drawing/2014/main" id="{E843CB09-A7DD-4480-BAB8-E6F415989404}"/>
               </a:ext>
             </a:extLst>
           </p:cNvPr>
@@ -2636,7 +2637,7 @@
           <p:cNvPr id="4" name="Slide Number Placeholder 3">
             <a:extLst>
               <a:ext uri="{FF2B5EF4-FFF2-40B4-BE49-F238E27FC236}">
-                <a16:creationId xmlns:a16="http://schemas.microsoft.com/office/drawing/2014/main" xmlns="" id="{2E37EDE4-9CB0-49E8-94A1-528E3FB69141}"/>
+                <a16:creationId xmlns:a16="http://schemas.microsoft.com/office/drawing/2014/main" id="{2E37EDE4-9CB0-49E8-94A1-528E3FB69141}"/>
               </a:ext>
             </a:extLst>
           </p:cNvPr>
@@ -2695,7 +2696,7 @@
           <p:cNvPr id="2" name="Title 1">
             <a:extLst>
               <a:ext uri="{FF2B5EF4-FFF2-40B4-BE49-F238E27FC236}">
-                <a16:creationId xmlns:a16="http://schemas.microsoft.com/office/drawing/2014/main" xmlns="" id="{4C582AEC-9958-485D-80C3-8A1AF29F826E}"/>
+                <a16:creationId xmlns:a16="http://schemas.microsoft.com/office/drawing/2014/main" id="{4C582AEC-9958-485D-80C3-8A1AF29F826E}"/>
               </a:ext>
             </a:extLst>
           </p:cNvPr>
@@ -2732,7 +2733,7 @@
           <p:cNvPr id="3" name="Content Placeholder 2">
             <a:extLst>
               <a:ext uri="{FF2B5EF4-FFF2-40B4-BE49-F238E27FC236}">
-                <a16:creationId xmlns:a16="http://schemas.microsoft.com/office/drawing/2014/main" xmlns="" id="{A858FBD1-EB70-4E0B-8EBA-D0FBCDFF29D3}"/>
+                <a16:creationId xmlns:a16="http://schemas.microsoft.com/office/drawing/2014/main" id="{A858FBD1-EB70-4E0B-8EBA-D0FBCDFF29D3}"/>
               </a:ext>
             </a:extLst>
           </p:cNvPr>
@@ -2822,7 +2823,7 @@
           <p:cNvPr id="4" name="Text Placeholder 3">
             <a:extLst>
               <a:ext uri="{FF2B5EF4-FFF2-40B4-BE49-F238E27FC236}">
-                <a16:creationId xmlns:a16="http://schemas.microsoft.com/office/drawing/2014/main" xmlns="" id="{D6BF8F4A-8DF8-49DF-B4FD-3B0550426A78}"/>
+                <a16:creationId xmlns:a16="http://schemas.microsoft.com/office/drawing/2014/main" id="{D6BF8F4A-8DF8-49DF-B4FD-3B0550426A78}"/>
               </a:ext>
             </a:extLst>
           </p:cNvPr>
@@ -2893,7 +2894,7 @@
           <p:cNvPr id="5" name="Date Placeholder 4">
             <a:extLst>
               <a:ext uri="{FF2B5EF4-FFF2-40B4-BE49-F238E27FC236}">
-                <a16:creationId xmlns:a16="http://schemas.microsoft.com/office/drawing/2014/main" xmlns="" id="{2CAFDFE2-E9A4-4DBE-9703-C19FDC645067}"/>
+                <a16:creationId xmlns:a16="http://schemas.microsoft.com/office/drawing/2014/main" id="{2CAFDFE2-E9A4-4DBE-9703-C19FDC645067}"/>
               </a:ext>
             </a:extLst>
           </p:cNvPr>
@@ -2911,7 +2912,7 @@
           <a:p>
             <a:fld id="{50CB2F0A-8324-4208-AF8B-B09E4CFA67EA}" type="datetimeFigureOut">
               <a:rPr lang="en-US" smtClean="0"/>
-              <a:t>9/11/2018</a:t>
+              <a:t>9/13/2018</a:t>
             </a:fld>
             <a:endParaRPr lang="en-US"/>
           </a:p>
@@ -2922,7 +2923,7 @@
           <p:cNvPr id="6" name="Footer Placeholder 5">
             <a:extLst>
               <a:ext uri="{FF2B5EF4-FFF2-40B4-BE49-F238E27FC236}">
-                <a16:creationId xmlns:a16="http://schemas.microsoft.com/office/drawing/2014/main" xmlns="" id="{5944E4F7-C2CC-4BA1-84B4-5F65CF387CCF}"/>
+                <a16:creationId xmlns:a16="http://schemas.microsoft.com/office/drawing/2014/main" id="{5944E4F7-C2CC-4BA1-84B4-5F65CF387CCF}"/>
               </a:ext>
             </a:extLst>
           </p:cNvPr>
@@ -2947,7 +2948,7 @@
           <p:cNvPr id="7" name="Slide Number Placeholder 6">
             <a:extLst>
               <a:ext uri="{FF2B5EF4-FFF2-40B4-BE49-F238E27FC236}">
-                <a16:creationId xmlns:a16="http://schemas.microsoft.com/office/drawing/2014/main" xmlns="" id="{514882BF-BD3D-4DA0-8407-3309E1D82689}"/>
+                <a16:creationId xmlns:a16="http://schemas.microsoft.com/office/drawing/2014/main" id="{514882BF-BD3D-4DA0-8407-3309E1D82689}"/>
               </a:ext>
             </a:extLst>
           </p:cNvPr>
@@ -3006,7 +3007,7 @@
           <p:cNvPr id="2" name="Title 1">
             <a:extLst>
               <a:ext uri="{FF2B5EF4-FFF2-40B4-BE49-F238E27FC236}">
-                <a16:creationId xmlns:a16="http://schemas.microsoft.com/office/drawing/2014/main" xmlns="" id="{D4D26355-7A2C-44BC-9CD2-5D55609C56B6}"/>
+                <a16:creationId xmlns:a16="http://schemas.microsoft.com/office/drawing/2014/main" id="{D4D26355-7A2C-44BC-9CD2-5D55609C56B6}"/>
               </a:ext>
             </a:extLst>
           </p:cNvPr>
@@ -3043,7 +3044,7 @@
           <p:cNvPr id="3" name="Picture Placeholder 2">
             <a:extLst>
               <a:ext uri="{FF2B5EF4-FFF2-40B4-BE49-F238E27FC236}">
-                <a16:creationId xmlns:a16="http://schemas.microsoft.com/office/drawing/2014/main" xmlns="" id="{B308CD5B-286D-4A46-97A5-3ACD7CD1F2F5}"/>
+                <a16:creationId xmlns:a16="http://schemas.microsoft.com/office/drawing/2014/main" id="{B308CD5B-286D-4A46-97A5-3ACD7CD1F2F5}"/>
               </a:ext>
             </a:extLst>
           </p:cNvPr>
@@ -3110,7 +3111,7 @@
           <p:cNvPr id="4" name="Text Placeholder 3">
             <a:extLst>
               <a:ext uri="{FF2B5EF4-FFF2-40B4-BE49-F238E27FC236}">
-                <a16:creationId xmlns:a16="http://schemas.microsoft.com/office/drawing/2014/main" xmlns="" id="{E69DBABD-3991-49EF-A22F-2FCD1C86990F}"/>
+                <a16:creationId xmlns:a16="http://schemas.microsoft.com/office/drawing/2014/main" id="{E69DBABD-3991-49EF-A22F-2FCD1C86990F}"/>
               </a:ext>
             </a:extLst>
           </p:cNvPr>
@@ -3181,7 +3182,7 @@
           <p:cNvPr id="5" name="Date Placeholder 4">
             <a:extLst>
               <a:ext uri="{FF2B5EF4-FFF2-40B4-BE49-F238E27FC236}">
-                <a16:creationId xmlns:a16="http://schemas.microsoft.com/office/drawing/2014/main" xmlns="" id="{3FAEAB48-04D7-4256-8184-508A660AFCE3}"/>
+                <a16:creationId xmlns:a16="http://schemas.microsoft.com/office/drawing/2014/main" id="{3FAEAB48-04D7-4256-8184-508A660AFCE3}"/>
               </a:ext>
             </a:extLst>
           </p:cNvPr>
@@ -3199,7 +3200,7 @@
           <a:p>
             <a:fld id="{50CB2F0A-8324-4208-AF8B-B09E4CFA67EA}" type="datetimeFigureOut">
               <a:rPr lang="en-US" smtClean="0"/>
-              <a:t>9/11/2018</a:t>
+              <a:t>9/13/2018</a:t>
             </a:fld>
             <a:endParaRPr lang="en-US"/>
           </a:p>
@@ -3210,7 +3211,7 @@
           <p:cNvPr id="6" name="Footer Placeholder 5">
             <a:extLst>
               <a:ext uri="{FF2B5EF4-FFF2-40B4-BE49-F238E27FC236}">
-                <a16:creationId xmlns:a16="http://schemas.microsoft.com/office/drawing/2014/main" xmlns="" id="{F783F302-7DE3-4B9E-AA28-E3308AF76AC1}"/>
+                <a16:creationId xmlns:a16="http://schemas.microsoft.com/office/drawing/2014/main" id="{F783F302-7DE3-4B9E-AA28-E3308AF76AC1}"/>
               </a:ext>
             </a:extLst>
           </p:cNvPr>
@@ -3235,7 +3236,7 @@
           <p:cNvPr id="7" name="Slide Number Placeholder 6">
             <a:extLst>
               <a:ext uri="{FF2B5EF4-FFF2-40B4-BE49-F238E27FC236}">
-                <a16:creationId xmlns:a16="http://schemas.microsoft.com/office/drawing/2014/main" xmlns="" id="{BC9A7CF8-4B36-4E66-BF51-6B0F785E856C}"/>
+                <a16:creationId xmlns:a16="http://schemas.microsoft.com/office/drawing/2014/main" id="{BC9A7CF8-4B36-4E66-BF51-6B0F785E856C}"/>
               </a:ext>
             </a:extLst>
           </p:cNvPr>
@@ -3299,7 +3300,7 @@
           <p:cNvPr id="2" name="Title Placeholder 1">
             <a:extLst>
               <a:ext uri="{FF2B5EF4-FFF2-40B4-BE49-F238E27FC236}">
-                <a16:creationId xmlns:a16="http://schemas.microsoft.com/office/drawing/2014/main" xmlns="" id="{37AAE613-F2BC-4C80-9BAB-162D68A05E0D}"/>
+                <a16:creationId xmlns:a16="http://schemas.microsoft.com/office/drawing/2014/main" id="{37AAE613-F2BC-4C80-9BAB-162D68A05E0D}"/>
               </a:ext>
             </a:extLst>
           </p:cNvPr>
@@ -3337,7 +3338,7 @@
           <p:cNvPr id="3" name="Text Placeholder 2">
             <a:extLst>
               <a:ext uri="{FF2B5EF4-FFF2-40B4-BE49-F238E27FC236}">
-                <a16:creationId xmlns:a16="http://schemas.microsoft.com/office/drawing/2014/main" xmlns="" id="{C1A6EDB9-66CF-46B1-9509-466DA3AF5B16}"/>
+                <a16:creationId xmlns:a16="http://schemas.microsoft.com/office/drawing/2014/main" id="{C1A6EDB9-66CF-46B1-9509-466DA3AF5B16}"/>
               </a:ext>
             </a:extLst>
           </p:cNvPr>
@@ -3404,7 +3405,7 @@
           <p:cNvPr id="4" name="Date Placeholder 3">
             <a:extLst>
               <a:ext uri="{FF2B5EF4-FFF2-40B4-BE49-F238E27FC236}">
-                <a16:creationId xmlns:a16="http://schemas.microsoft.com/office/drawing/2014/main" xmlns="" id="{144FC09D-A75C-4651-B51A-AEBFDD198BCC}"/>
+                <a16:creationId xmlns:a16="http://schemas.microsoft.com/office/drawing/2014/main" id="{144FC09D-A75C-4651-B51A-AEBFDD198BCC}"/>
               </a:ext>
             </a:extLst>
           </p:cNvPr>
@@ -3440,7 +3441,7 @@
           <a:p>
             <a:fld id="{50CB2F0A-8324-4208-AF8B-B09E4CFA67EA}" type="datetimeFigureOut">
               <a:rPr lang="en-US" smtClean="0"/>
-              <a:t>9/11/2018</a:t>
+              <a:t>9/13/2018</a:t>
             </a:fld>
             <a:endParaRPr lang="en-US"/>
           </a:p>
@@ -3451,7 +3452,7 @@
           <p:cNvPr id="5" name="Footer Placeholder 4">
             <a:extLst>
               <a:ext uri="{FF2B5EF4-FFF2-40B4-BE49-F238E27FC236}">
-                <a16:creationId xmlns:a16="http://schemas.microsoft.com/office/drawing/2014/main" xmlns="" id="{D08197DE-33D2-4C53-980D-F12D7B4DBBDB}"/>
+                <a16:creationId xmlns:a16="http://schemas.microsoft.com/office/drawing/2014/main" id="{D08197DE-33D2-4C53-980D-F12D7B4DBBDB}"/>
               </a:ext>
             </a:extLst>
           </p:cNvPr>
@@ -3494,7 +3495,7 @@
           <p:cNvPr id="6" name="Slide Number Placeholder 5">
             <a:extLst>
               <a:ext uri="{FF2B5EF4-FFF2-40B4-BE49-F238E27FC236}">
-                <a16:creationId xmlns:a16="http://schemas.microsoft.com/office/drawing/2014/main" xmlns="" id="{8EE921EE-D1AC-4195-A25E-4706CBE93FF5}"/>
+                <a16:creationId xmlns:a16="http://schemas.microsoft.com/office/drawing/2014/main" id="{8EE921EE-D1AC-4195-A25E-4706CBE93FF5}"/>
               </a:ext>
             </a:extLst>
           </p:cNvPr>
@@ -3872,7 +3873,7 @@
           <p:cNvPr id="1042" name="Rectangle 1041">
             <a:extLst>
               <a:ext uri="{FF2B5EF4-FFF2-40B4-BE49-F238E27FC236}">
-                <a16:creationId xmlns:a16="http://schemas.microsoft.com/office/drawing/2014/main" xmlns="" id="{28DD362E-6694-4B9D-928A-DCA8B08293C1}"/>
+                <a16:creationId xmlns:a16="http://schemas.microsoft.com/office/drawing/2014/main" id="{28DD362E-6694-4B9D-928A-DCA8B08293C1}"/>
               </a:ext>
             </a:extLst>
           </p:cNvPr>
@@ -3921,7 +3922,7 @@
           <p:cNvPr id="1026" name="Picture 2" descr="https://jeffshore.com/wp-content/uploads/2012/08/3118711607-1-350x223.gif">
             <a:extLst>
               <a:ext uri="{FF2B5EF4-FFF2-40B4-BE49-F238E27FC236}">
-                <a16:creationId xmlns:a16="http://schemas.microsoft.com/office/drawing/2014/main" xmlns="" id="{3E8A9C60-5460-4637-8298-8E65FB94F277}"/>
+                <a16:creationId xmlns:a16="http://schemas.microsoft.com/office/drawing/2014/main" id="{3E8A9C60-5460-4637-8298-8E65FB94F277}"/>
               </a:ext>
             </a:extLst>
           </p:cNvPr>
@@ -3968,7 +3969,7 @@
           <p:cNvPr id="1030" name="Picture 6" descr="troll dancing GIF">
             <a:extLst>
               <a:ext uri="{FF2B5EF4-FFF2-40B4-BE49-F238E27FC236}">
-                <a16:creationId xmlns:a16="http://schemas.microsoft.com/office/drawing/2014/main" xmlns="" id="{B974D3B3-A077-4E1A-85B0-9C53DAD6CF71}"/>
+                <a16:creationId xmlns:a16="http://schemas.microsoft.com/office/drawing/2014/main" id="{B974D3B3-A077-4E1A-85B0-9C53DAD6CF71}"/>
               </a:ext>
             </a:extLst>
           </p:cNvPr>
@@ -4015,7 +4016,7 @@
           <p:cNvPr id="7" name="Picture 6" descr="troll dancing GIF">
             <a:extLst>
               <a:ext uri="{FF2B5EF4-FFF2-40B4-BE49-F238E27FC236}">
-                <a16:creationId xmlns:a16="http://schemas.microsoft.com/office/drawing/2014/main" xmlns="" id="{9FE42726-33D9-4D3D-A2B0-6E7BC57AD162}"/>
+                <a16:creationId xmlns:a16="http://schemas.microsoft.com/office/drawing/2014/main" id="{9FE42726-33D9-4D3D-A2B0-6E7BC57AD162}"/>
               </a:ext>
             </a:extLst>
           </p:cNvPr>
@@ -4062,7 +4063,7 @@
           <p:cNvPr id="8" name="Picture 7" descr="troll dancing GIF">
             <a:extLst>
               <a:ext uri="{FF2B5EF4-FFF2-40B4-BE49-F238E27FC236}">
-                <a16:creationId xmlns:a16="http://schemas.microsoft.com/office/drawing/2014/main" xmlns="" id="{DDBD98C7-5B4B-4CC7-984C-F8BAD8A0E4F6}"/>
+                <a16:creationId xmlns:a16="http://schemas.microsoft.com/office/drawing/2014/main" id="{DDBD98C7-5B4B-4CC7-984C-F8BAD8A0E4F6}"/>
               </a:ext>
             </a:extLst>
           </p:cNvPr>
@@ -4109,7 +4110,7 @@
           <p:cNvPr id="5" name="AutoShape 8" descr="Image result for twitter logo">
             <a:extLst>
               <a:ext uri="{FF2B5EF4-FFF2-40B4-BE49-F238E27FC236}">
-                <a16:creationId xmlns:a16="http://schemas.microsoft.com/office/drawing/2014/main" xmlns="" id="{FF9E44DA-0AD0-4E12-9B2B-AFC7FDBE65BF}"/>
+                <a16:creationId xmlns:a16="http://schemas.microsoft.com/office/drawing/2014/main" id="{FF9E44DA-0AD0-4E12-9B2B-AFC7FDBE65BF}"/>
               </a:ext>
             </a:extLst>
           </p:cNvPr>
@@ -4154,7 +4155,7 @@
           <p:cNvPr id="1034" name="Picture 10" descr="Image result for twitter logo">
             <a:extLst>
               <a:ext uri="{FF2B5EF4-FFF2-40B4-BE49-F238E27FC236}">
-                <a16:creationId xmlns:a16="http://schemas.microsoft.com/office/drawing/2014/main" xmlns="" id="{7C588831-98EA-4788-AB68-CAF0609B106A}"/>
+                <a16:creationId xmlns:a16="http://schemas.microsoft.com/office/drawing/2014/main" id="{7C588831-98EA-4788-AB68-CAF0609B106A}"/>
               </a:ext>
             </a:extLst>
           </p:cNvPr>
@@ -4201,7 +4202,7 @@
           <p:cNvPr id="9" name="Straight Arrow Connector 8">
             <a:extLst>
               <a:ext uri="{FF2B5EF4-FFF2-40B4-BE49-F238E27FC236}">
-                <a16:creationId xmlns:a16="http://schemas.microsoft.com/office/drawing/2014/main" xmlns="" id="{F76C03DC-2E09-4A8E-BCC6-18CD6BFC9A54}"/>
+                <a16:creationId xmlns:a16="http://schemas.microsoft.com/office/drawing/2014/main" id="{F76C03DC-2E09-4A8E-BCC6-18CD6BFC9A54}"/>
               </a:ext>
             </a:extLst>
           </p:cNvPr>
@@ -4248,7 +4249,7 @@
           <p:cNvPr id="1036" name="Picture 12" descr="Brian George No GIF">
             <a:extLst>
               <a:ext uri="{FF2B5EF4-FFF2-40B4-BE49-F238E27FC236}">
-                <a16:creationId xmlns:a16="http://schemas.microsoft.com/office/drawing/2014/main" xmlns="" id="{05BB35DA-30C1-4518-82CA-6F3FBC1EFC97}"/>
+                <a16:creationId xmlns:a16="http://schemas.microsoft.com/office/drawing/2014/main" id="{05BB35DA-30C1-4518-82CA-6F3FBC1EFC97}"/>
               </a:ext>
             </a:extLst>
           </p:cNvPr>
@@ -4295,7 +4296,7 @@
           <p:cNvPr id="30" name="Straight Arrow Connector 29">
             <a:extLst>
               <a:ext uri="{FF2B5EF4-FFF2-40B4-BE49-F238E27FC236}">
-                <a16:creationId xmlns:a16="http://schemas.microsoft.com/office/drawing/2014/main" xmlns="" id="{38A2130C-7188-4010-BC4C-B56C27670079}"/>
+                <a16:creationId xmlns:a16="http://schemas.microsoft.com/office/drawing/2014/main" id="{38A2130C-7188-4010-BC4C-B56C27670079}"/>
               </a:ext>
             </a:extLst>
           </p:cNvPr>
@@ -4342,7 +4343,7 @@
           <p:cNvPr id="27" name="Connector: Elbow 26">
             <a:extLst>
               <a:ext uri="{FF2B5EF4-FFF2-40B4-BE49-F238E27FC236}">
-                <a16:creationId xmlns:a16="http://schemas.microsoft.com/office/drawing/2014/main" xmlns="" id="{B48F621F-6CA8-4BDE-ADFF-3917DA6F0DE9}"/>
+                <a16:creationId xmlns:a16="http://schemas.microsoft.com/office/drawing/2014/main" id="{B48F621F-6CA8-4BDE-ADFF-3917DA6F0DE9}"/>
               </a:ext>
             </a:extLst>
           </p:cNvPr>
@@ -4393,7 +4394,7 @@
           <p:cNvPr id="1033" name="TextBox 1032">
             <a:extLst>
               <a:ext uri="{FF2B5EF4-FFF2-40B4-BE49-F238E27FC236}">
-                <a16:creationId xmlns:a16="http://schemas.microsoft.com/office/drawing/2014/main" xmlns="" id="{F944E8B0-F97A-4A63-B356-A31AA0C16086}"/>
+                <a16:creationId xmlns:a16="http://schemas.microsoft.com/office/drawing/2014/main" id="{F944E8B0-F97A-4A63-B356-A31AA0C16086}"/>
               </a:ext>
             </a:extLst>
           </p:cNvPr>
@@ -4440,7 +4441,7 @@
           <p:cNvPr id="1038" name="Picture 14" descr="Image result for clemson university logo">
             <a:extLst>
               <a:ext uri="{FF2B5EF4-FFF2-40B4-BE49-F238E27FC236}">
-                <a16:creationId xmlns:a16="http://schemas.microsoft.com/office/drawing/2014/main" xmlns="" id="{7A85A61E-8FEF-41DF-B67B-BC03F89B213F}"/>
+                <a16:creationId xmlns:a16="http://schemas.microsoft.com/office/drawing/2014/main" id="{7A85A61E-8FEF-41DF-B67B-BC03F89B213F}"/>
               </a:ext>
             </a:extLst>
           </p:cNvPr>
@@ -4487,7 +4488,7 @@
           <p:cNvPr id="1040" name="Picture 16" descr="Image result for salesforce social logo">
             <a:extLst>
               <a:ext uri="{FF2B5EF4-FFF2-40B4-BE49-F238E27FC236}">
-                <a16:creationId xmlns:a16="http://schemas.microsoft.com/office/drawing/2014/main" xmlns="" id="{E56C000B-B6DC-426C-B744-07D59689E04F}"/>
+                <a16:creationId xmlns:a16="http://schemas.microsoft.com/office/drawing/2014/main" id="{E56C000B-B6DC-426C-B744-07D59689E04F}"/>
               </a:ext>
             </a:extLst>
           </p:cNvPr>
@@ -4534,7 +4535,7 @@
           <p:cNvPr id="1041" name="Graphic 1040" descr="Gears">
             <a:extLst>
               <a:ext uri="{FF2B5EF4-FFF2-40B4-BE49-F238E27FC236}">
-                <a16:creationId xmlns:a16="http://schemas.microsoft.com/office/drawing/2014/main" xmlns="" id="{78AEFBBA-9B48-4F38-880E-5577D81BB138}"/>
+                <a16:creationId xmlns:a16="http://schemas.microsoft.com/office/drawing/2014/main" id="{78AEFBBA-9B48-4F38-880E-5577D81BB138}"/>
               </a:ext>
             </a:extLst>
           </p:cNvPr>
@@ -4550,7 +4551,7 @@
                 <a14:useLocalDpi xmlns:a14="http://schemas.microsoft.com/office/drawing/2010/main" val="0"/>
               </a:ext>
               <a:ext uri="{96DAC541-7B7A-43D3-8B79-37D633B846F1}">
-                <asvg:svgBlip xmlns:asvg="http://schemas.microsoft.com/office/drawing/2016/SVG/main" xmlns="" r:embed="rId9"/>
+                <asvg:svgBlip xmlns:asvg="http://schemas.microsoft.com/office/drawing/2016/SVG/main" r:embed="rId9"/>
               </a:ext>
             </a:extLst>
           </a:blip>
@@ -4573,7 +4574,7 @@
           <p:cNvPr id="51" name="Straight Arrow Connector 50">
             <a:extLst>
               <a:ext uri="{FF2B5EF4-FFF2-40B4-BE49-F238E27FC236}">
-                <a16:creationId xmlns:a16="http://schemas.microsoft.com/office/drawing/2014/main" xmlns="" id="{E1A9F1C8-6045-47A1-8698-498C0E3F0253}"/>
+                <a16:creationId xmlns:a16="http://schemas.microsoft.com/office/drawing/2014/main" id="{E1A9F1C8-6045-47A1-8698-498C0E3F0253}"/>
               </a:ext>
             </a:extLst>
           </p:cNvPr>
@@ -4620,7 +4621,7 @@
           <p:cNvPr id="1047" name="Rectangle 1046">
             <a:extLst>
               <a:ext uri="{FF2B5EF4-FFF2-40B4-BE49-F238E27FC236}">
-                <a16:creationId xmlns:a16="http://schemas.microsoft.com/office/drawing/2014/main" xmlns="" id="{0CA82760-640B-4B6C-BAF0-989ED6E41BB0}"/>
+                <a16:creationId xmlns:a16="http://schemas.microsoft.com/office/drawing/2014/main" id="{0CA82760-640B-4B6C-BAF0-989ED6E41BB0}"/>
               </a:ext>
             </a:extLst>
           </p:cNvPr>
@@ -4683,7 +4684,7 @@
           <p:cNvPr id="1048" name="Rectangle 1047">
             <a:extLst>
               <a:ext uri="{FF2B5EF4-FFF2-40B4-BE49-F238E27FC236}">
-                <a16:creationId xmlns:a16="http://schemas.microsoft.com/office/drawing/2014/main" xmlns="" id="{E80780C1-9ED4-47E5-9FDB-87474C968B42}"/>
+                <a16:creationId xmlns:a16="http://schemas.microsoft.com/office/drawing/2014/main" id="{E80780C1-9ED4-47E5-9FDB-87474C968B42}"/>
               </a:ext>
             </a:extLst>
           </p:cNvPr>
@@ -4735,7 +4736,7 @@
           <p:cNvPr id="1049" name="Picture 18" descr="Image result for fivethirtyeight logo">
             <a:extLst>
               <a:ext uri="{FF2B5EF4-FFF2-40B4-BE49-F238E27FC236}">
-                <a16:creationId xmlns:a16="http://schemas.microsoft.com/office/drawing/2014/main" xmlns="" id="{04CEDED7-D6DC-45D5-BB02-359B6A1533F7}"/>
+                <a16:creationId xmlns:a16="http://schemas.microsoft.com/office/drawing/2014/main" id="{04CEDED7-D6DC-45D5-BB02-359B6A1533F7}"/>
               </a:ext>
             </a:extLst>
           </p:cNvPr>
@@ -4782,7 +4783,7 @@
           <p:cNvPr id="59" name="Straight Arrow Connector 58">
             <a:extLst>
               <a:ext uri="{FF2B5EF4-FFF2-40B4-BE49-F238E27FC236}">
-                <a16:creationId xmlns:a16="http://schemas.microsoft.com/office/drawing/2014/main" xmlns="" id="{F507EBCD-37C8-4452-9640-0FAF7D732C42}"/>
+                <a16:creationId xmlns:a16="http://schemas.microsoft.com/office/drawing/2014/main" id="{F507EBCD-37C8-4452-9640-0FAF7D732C42}"/>
               </a:ext>
             </a:extLst>
           </p:cNvPr>
@@ -4829,7 +4830,7 @@
           <p:cNvPr id="1051" name="Rectangle 1050">
             <a:extLst>
               <a:ext uri="{FF2B5EF4-FFF2-40B4-BE49-F238E27FC236}">
-                <a16:creationId xmlns:a16="http://schemas.microsoft.com/office/drawing/2014/main" xmlns="" id="{E7CF3942-2B6C-4EEB-AED7-F9D1A7260CD3}"/>
+                <a16:creationId xmlns:a16="http://schemas.microsoft.com/office/drawing/2014/main" id="{E7CF3942-2B6C-4EEB-AED7-F9D1A7260CD3}"/>
               </a:ext>
             </a:extLst>
           </p:cNvPr>
@@ -4861,29 +4862,8 @@
                 </a:solidFill>
                 <a:latin typeface="Bahnschrift SemiCondensed" panose="020B0502040204020203" pitchFamily="34" charset="0"/>
               </a:rPr>
-              <a:t>2,973,371 </a:t>
-            </a:r>
-            <a:r>
-              <a:rPr lang="en-US" sz="4400" dirty="0" smtClean="0">
-                <a:solidFill>
-                  <a:schemeClr val="tx1">
-                    <a:lumMod val="65000"/>
-                    <a:lumOff val="35000"/>
-                  </a:schemeClr>
-                </a:solidFill>
-                <a:latin typeface="Bahnschrift SemiCondensed" panose="020B0502040204020203" pitchFamily="34" charset="0"/>
-              </a:rPr>
-              <a:t>Tweets</a:t>
-            </a:r>
-            <a:endParaRPr lang="en-US" sz="4400" dirty="0">
-              <a:solidFill>
-                <a:schemeClr val="tx1">
-                  <a:lumMod val="65000"/>
-                  <a:lumOff val="35000"/>
-                </a:schemeClr>
-              </a:solidFill>
-              <a:latin typeface="Bahnschrift SemiCondensed" panose="020B0502040204020203" pitchFamily="34" charset="0"/>
-            </a:endParaRPr>
+              <a:t>2,973,371 Tweets</a:t>
+            </a:r>
           </a:p>
         </p:txBody>
       </p:sp>
@@ -4892,7 +4872,7 @@
           <p:cNvPr id="1052" name="Rectangle 1051">
             <a:extLst>
               <a:ext uri="{FF2B5EF4-FFF2-40B4-BE49-F238E27FC236}">
-                <a16:creationId xmlns:a16="http://schemas.microsoft.com/office/drawing/2014/main" xmlns="" id="{E2F3B0F5-96ED-468E-95BE-45DC4FDCD97C}"/>
+                <a16:creationId xmlns:a16="http://schemas.microsoft.com/office/drawing/2014/main" id="{E2F3B0F5-96ED-468E-95BE-45DC4FDCD97C}"/>
               </a:ext>
             </a:extLst>
           </p:cNvPr>
@@ -4924,29 +4904,8 @@
                 </a:solidFill>
                 <a:latin typeface="Bahnschrift SemiCondensed" panose="020B0502040204020203" pitchFamily="34" charset="0"/>
               </a:rPr>
-              <a:t>2,848 </a:t>
-            </a:r>
-            <a:r>
-              <a:rPr lang="en-US" sz="4400" dirty="0" smtClean="0">
-                <a:solidFill>
-                  <a:schemeClr val="tx1">
-                    <a:lumMod val="65000"/>
-                    <a:lumOff val="35000"/>
-                  </a:schemeClr>
-                </a:solidFill>
-                <a:latin typeface="Bahnschrift SemiCondensed" panose="020B0502040204020203" pitchFamily="34" charset="0"/>
-              </a:rPr>
-              <a:t>Handles</a:t>
-            </a:r>
-            <a:endParaRPr lang="en-US" sz="4400" dirty="0">
-              <a:solidFill>
-                <a:schemeClr val="tx1">
-                  <a:lumMod val="65000"/>
-                  <a:lumOff val="35000"/>
-                </a:schemeClr>
-              </a:solidFill>
-              <a:latin typeface="Bahnschrift SemiCondensed" panose="020B0502040204020203" pitchFamily="34" charset="0"/>
-            </a:endParaRPr>
+              <a:t>2,848 Handles</a:t>
+            </a:r>
           </a:p>
         </p:txBody>
       </p:sp>
@@ -4955,7 +4914,7 @@
           <p:cNvPr id="64" name="Straight Arrow Connector 63">
             <a:extLst>
               <a:ext uri="{FF2B5EF4-FFF2-40B4-BE49-F238E27FC236}">
-                <a16:creationId xmlns:a16="http://schemas.microsoft.com/office/drawing/2014/main" xmlns="" id="{E2E7DCF8-8A56-4264-AFDE-C555096971F6}"/>
+                <a16:creationId xmlns:a16="http://schemas.microsoft.com/office/drawing/2014/main" id="{E2E7DCF8-8A56-4264-AFDE-C555096971F6}"/>
               </a:ext>
             </a:extLst>
           </p:cNvPr>
@@ -5002,7 +4961,7 @@
           <p:cNvPr id="37" name="TextBox 36">
             <a:extLst>
               <a:ext uri="{FF2B5EF4-FFF2-40B4-BE49-F238E27FC236}">
-                <a16:creationId xmlns:a16="http://schemas.microsoft.com/office/drawing/2014/main" xmlns="" id="{54ED368B-23DB-4A53-B1B6-D5DF9A09EAB9}"/>
+                <a16:creationId xmlns:a16="http://schemas.microsoft.com/office/drawing/2014/main" id="{54ED368B-23DB-4A53-B1B6-D5DF9A09EAB9}"/>
               </a:ext>
             </a:extLst>
           </p:cNvPr>
@@ -5040,7 +4999,7 @@
           <p:cNvPr id="74" name="TextBox 73">
             <a:extLst>
               <a:ext uri="{FF2B5EF4-FFF2-40B4-BE49-F238E27FC236}">
-                <a16:creationId xmlns:a16="http://schemas.microsoft.com/office/drawing/2014/main" xmlns="" id="{89AA6401-2C26-40A8-A37A-D8E784EDF940}"/>
+                <a16:creationId xmlns:a16="http://schemas.microsoft.com/office/drawing/2014/main" id="{89AA6401-2C26-40A8-A37A-D8E784EDF940}"/>
               </a:ext>
             </a:extLst>
           </p:cNvPr>
@@ -5096,7 +5055,7 @@
           <p:cNvPr id="75" name="TextBox 74">
             <a:extLst>
               <a:ext uri="{FF2B5EF4-FFF2-40B4-BE49-F238E27FC236}">
-                <a16:creationId xmlns:a16="http://schemas.microsoft.com/office/drawing/2014/main" xmlns="" id="{C9E429F4-88A0-4B83-A316-47A628EDF2EF}"/>
+                <a16:creationId xmlns:a16="http://schemas.microsoft.com/office/drawing/2014/main" id="{C9E429F4-88A0-4B83-A316-47A628EDF2EF}"/>
               </a:ext>
             </a:extLst>
           </p:cNvPr>
@@ -5159,79 +5118,101 @@
           <a:chExt cx="0" cy="0"/>
         </a:xfrm>
       </p:grpSpPr>
+      <p:sp>
+        <p:nvSpPr>
+          <p:cNvPr id="2" name="Rectangle 1">
+            <a:extLst>
+              <a:ext uri="{FF2B5EF4-FFF2-40B4-BE49-F238E27FC236}">
+                <a16:creationId xmlns:a16="http://schemas.microsoft.com/office/drawing/2014/main" id="{41D7C7E7-30C2-442E-BA4E-CD5942642DE9}"/>
+              </a:ext>
+            </a:extLst>
+          </p:cNvPr>
+          <p:cNvSpPr/>
+          <p:nvPr/>
+        </p:nvSpPr>
+        <p:spPr>
+          <a:xfrm>
+            <a:off x="3012090" y="202787"/>
+            <a:ext cx="4661854" cy="769441"/>
+          </a:xfrm>
+          <a:prstGeom prst="rect">
+            <a:avLst/>
+          </a:prstGeom>
+        </p:spPr>
+        <p:txBody>
+          <a:bodyPr wrap="none">
+            <a:spAutoFit/>
+          </a:bodyPr>
+          <a:lstStyle/>
+          <a:p>
+            <a:r>
+              <a:rPr lang="en-US" sz="4400" dirty="0">
+                <a:solidFill>
+                  <a:schemeClr val="tx1">
+                    <a:lumMod val="75000"/>
+                    <a:lumOff val="25000"/>
+                  </a:schemeClr>
+                </a:solidFill>
+                <a:latin typeface="Bahnschrift SemiCondensed" panose="020B0502040204020203" pitchFamily="34" charset="0"/>
+              </a:rPr>
+              <a:t>Tweet Topic Analysis</a:t>
+            </a:r>
+          </a:p>
+        </p:txBody>
+      </p:sp>
       <p:pic>
         <p:nvPicPr>
-          <p:cNvPr id="14" name="Picture 13">
-            <a:extLst>
-              <a:ext uri="{FF2B5EF4-FFF2-40B4-BE49-F238E27FC236}">
-                <a16:creationId xmlns:a16="http://schemas.microsoft.com/office/drawing/2014/main" xmlns="" id="{BE03139D-8751-40BD-8037-D780F7104A92}"/>
+          <p:cNvPr id="7" name="Picture 10" descr="Image result for twitter logo">
+            <a:extLst>
+              <a:ext uri="{FF2B5EF4-FFF2-40B4-BE49-F238E27FC236}">
+                <a16:creationId xmlns:a16="http://schemas.microsoft.com/office/drawing/2014/main" id="{23E89E04-AB75-478D-85E4-DC335BC04275}"/>
               </a:ext>
             </a:extLst>
           </p:cNvPr>
           <p:cNvPicPr>
-            <a:picLocks noChangeAspect="1"/>
+            <a:picLocks noChangeAspect="1" noChangeArrowheads="1"/>
           </p:cNvPicPr>
           <p:nvPr/>
         </p:nvPicPr>
         <p:blipFill>
-          <a:blip r:embed="rId2"/>
+          <a:blip r:embed="rId2" cstate="print">
+            <a:extLst>
+              <a:ext uri="{28A0092B-C50C-407E-A947-70E740481C1C}">
+                <a14:useLocalDpi xmlns:a14="http://schemas.microsoft.com/office/drawing/2010/main" val="0"/>
+              </a:ext>
+            </a:extLst>
+          </a:blip>
+          <a:srcRect/>
           <a:stretch>
             <a:fillRect/>
           </a:stretch>
         </p:blipFill>
-        <p:spPr>
-          <a:xfrm>
-            <a:off x="201271" y="1356399"/>
-            <a:ext cx="3715135" cy="2396262"/>
+        <p:spPr bwMode="auto">
+          <a:xfrm>
+            <a:off x="3728034" y="2105102"/>
+            <a:ext cx="956064" cy="956064"/>
           </a:xfrm>
           <a:prstGeom prst="rect">
             <a:avLst/>
           </a:prstGeom>
+          <a:noFill/>
+          <a:extLst>
+            <a:ext uri="{909E8E84-426E-40DD-AFC4-6F175D3DCCD1}">
+              <a14:hiddenFill xmlns:a14="http://schemas.microsoft.com/office/drawing/2010/main">
+                <a:solidFill>
+                  <a:srgbClr val="FFFFFF"/>
+                </a:solidFill>
+              </a14:hiddenFill>
+            </a:ext>
+          </a:extLst>
         </p:spPr>
       </p:pic>
-      <p:sp>
-        <p:nvSpPr>
-          <p:cNvPr id="15" name="TextBox 14">
-            <a:extLst>
-              <a:ext uri="{FF2B5EF4-FFF2-40B4-BE49-F238E27FC236}">
-                <a16:creationId xmlns:a16="http://schemas.microsoft.com/office/drawing/2014/main" xmlns="" id="{55151C75-05A7-4AFB-BA9E-542763EA59C9}"/>
-              </a:ext>
-            </a:extLst>
-          </p:cNvPr>
-          <p:cNvSpPr txBox="1"/>
-          <p:nvPr/>
-        </p:nvSpPr>
-        <p:spPr>
-          <a:xfrm>
-            <a:off x="796338" y="940418"/>
-            <a:ext cx="2847531" cy="338554"/>
-          </a:xfrm>
-          <a:prstGeom prst="rect">
-            <a:avLst/>
-          </a:prstGeom>
-          <a:noFill/>
-        </p:spPr>
-        <p:txBody>
-          <a:bodyPr wrap="square" rtlCol="0">
-            <a:spAutoFit/>
-          </a:bodyPr>
-          <a:lstStyle/>
-          <a:p>
-            <a:r>
-              <a:rPr lang="en-US" sz="1600" dirty="0">
-                <a:latin typeface="Bahnschrift SemiCondensed" panose="020B0502040204020203" pitchFamily="34" charset="0"/>
-              </a:rPr>
-              <a:t>July 20-24, 2015 (Right Trolls)</a:t>
-            </a:r>
-          </a:p>
-        </p:txBody>
-      </p:sp>
       <p:pic>
         <p:nvPicPr>
-          <p:cNvPr id="16" name="Picture 15">
-            <a:extLst>
-              <a:ext uri="{FF2B5EF4-FFF2-40B4-BE49-F238E27FC236}">
-                <a16:creationId xmlns:a16="http://schemas.microsoft.com/office/drawing/2014/main" xmlns="" id="{4C70C66F-A86A-497A-983B-D7497F0C273F}"/>
+          <p:cNvPr id="8" name="Picture 7">
+            <a:extLst>
+              <a:ext uri="{FF2B5EF4-FFF2-40B4-BE49-F238E27FC236}">
+                <a16:creationId xmlns:a16="http://schemas.microsoft.com/office/drawing/2014/main" id="{99DF0058-263E-4926-BE79-342B84B27455}"/>
               </a:ext>
             </a:extLst>
           </p:cNvPr>
@@ -5248,8 +5229,8 @@
         </p:blipFill>
         <p:spPr>
           <a:xfrm>
-            <a:off x="3981451" y="1324902"/>
-            <a:ext cx="3851928" cy="2484494"/>
+            <a:off x="8330621" y="1707161"/>
+            <a:ext cx="3325493" cy="2144942"/>
           </a:xfrm>
           <a:prstGeom prst="rect">
             <a:avLst/>
@@ -5258,47 +5239,46 @@
       </p:pic>
       <p:sp>
         <p:nvSpPr>
-          <p:cNvPr id="17" name="TextBox 16">
-            <a:extLst>
-              <a:ext uri="{FF2B5EF4-FFF2-40B4-BE49-F238E27FC236}">
-                <a16:creationId xmlns:a16="http://schemas.microsoft.com/office/drawing/2014/main" xmlns="" id="{79579487-98BA-42F6-B098-D363E1C56791}"/>
-              </a:ext>
-            </a:extLst>
-          </p:cNvPr>
-          <p:cNvSpPr txBox="1"/>
+          <p:cNvPr id="11" name="Rectangle 10">
+            <a:extLst>
+              <a:ext uri="{FF2B5EF4-FFF2-40B4-BE49-F238E27FC236}">
+                <a16:creationId xmlns:a16="http://schemas.microsoft.com/office/drawing/2014/main" id="{2B838F66-76B1-4C80-AD6B-903048365266}"/>
+              </a:ext>
+            </a:extLst>
+          </p:cNvPr>
+          <p:cNvSpPr/>
           <p:nvPr/>
         </p:nvSpPr>
         <p:spPr>
           <a:xfrm>
-            <a:off x="4752602" y="945685"/>
-            <a:ext cx="2900834" cy="338554"/>
+            <a:off x="302619" y="1695143"/>
+            <a:ext cx="3116986" cy="2308324"/>
           </a:xfrm>
           <a:prstGeom prst="rect">
             <a:avLst/>
           </a:prstGeom>
-          <a:noFill/>
-        </p:spPr>
-        <p:txBody>
-          <a:bodyPr wrap="square" rtlCol="0">
+        </p:spPr>
+        <p:txBody>
+          <a:bodyPr wrap="square">
             <a:spAutoFit/>
           </a:bodyPr>
           <a:lstStyle/>
           <a:p>
             <a:r>
-              <a:rPr lang="en-US" sz="1600" dirty="0">
-                <a:latin typeface="Bahnschrift SemiCondensed" panose="020B0502040204020203" pitchFamily="34" charset="0"/>
+              <a:rPr lang="en-US" dirty="0">
+                <a:latin typeface="Bahnschrift" panose="020B0502040204020203" pitchFamily="34" charset="0"/>
               </a:rPr>
-              <a:t>Mar 21-23, 2016 (Right Trolls)</a:t>
+              <a:t>Latent Dirichlet Allocation (LDA) is a mathematical method for finding the mixture of words that is associated with each topic while also determining the mixture of topics that describes each document.</a:t>
             </a:r>
           </a:p>
         </p:txBody>
       </p:sp>
       <p:pic>
         <p:nvPicPr>
-          <p:cNvPr id="18" name="Picture 17">
-            <a:extLst>
-              <a:ext uri="{FF2B5EF4-FFF2-40B4-BE49-F238E27FC236}">
-                <a16:creationId xmlns:a16="http://schemas.microsoft.com/office/drawing/2014/main" xmlns="" id="{4C541F7E-5A80-4F57-9FC3-B9DCA907C7F8}"/>
+          <p:cNvPr id="12" name="Picture 11">
+            <a:extLst>
+              <a:ext uri="{FF2B5EF4-FFF2-40B4-BE49-F238E27FC236}">
+                <a16:creationId xmlns:a16="http://schemas.microsoft.com/office/drawing/2014/main" id="{83C2CCF9-4590-4810-AB1F-8E78E81D9FCD}"/>
               </a:ext>
             </a:extLst>
           </p:cNvPr>
@@ -5315,20 +5295,114 @@
         </p:blipFill>
         <p:spPr>
           <a:xfrm>
-            <a:off x="8103769" y="1324902"/>
-            <a:ext cx="3763969" cy="2427759"/>
+            <a:off x="5715960" y="1695143"/>
+            <a:ext cx="1957984" cy="2131545"/>
           </a:xfrm>
           <a:prstGeom prst="rect">
             <a:avLst/>
           </a:prstGeom>
         </p:spPr>
       </p:pic>
-      <p:sp>
-        <p:nvSpPr>
-          <p:cNvPr id="19" name="TextBox 18">
-            <a:extLst>
-              <a:ext uri="{FF2B5EF4-FFF2-40B4-BE49-F238E27FC236}">
-                <a16:creationId xmlns:a16="http://schemas.microsoft.com/office/drawing/2014/main" xmlns="" id="{347EE929-CE65-4398-B545-7CCCBB85939B}"/>
+      <p:cxnSp>
+        <p:nvCxnSpPr>
+          <p:cNvPr id="13" name="Straight Arrow Connector 12">
+            <a:extLst>
+              <a:ext uri="{FF2B5EF4-FFF2-40B4-BE49-F238E27FC236}">
+                <a16:creationId xmlns:a16="http://schemas.microsoft.com/office/drawing/2014/main" id="{E85F2A9F-51EA-48E6-80AF-2FED55E2EE59}"/>
+              </a:ext>
+            </a:extLst>
+          </p:cNvPr>
+          <p:cNvCxnSpPr>
+            <a:cxnSpLocks/>
+          </p:cNvCxnSpPr>
+          <p:nvPr/>
+        </p:nvCxnSpPr>
+        <p:spPr>
+          <a:xfrm>
+            <a:off x="4863554" y="2612987"/>
+            <a:ext cx="672950" cy="0"/>
+          </a:xfrm>
+          <a:prstGeom prst="straightConnector1">
+            <a:avLst/>
+          </a:prstGeom>
+          <a:ln w="127000">
+            <a:solidFill>
+              <a:schemeClr val="tx1">
+                <a:lumMod val="65000"/>
+                <a:lumOff val="35000"/>
+              </a:schemeClr>
+            </a:solidFill>
+            <a:tailEnd type="triangle"/>
+          </a:ln>
+        </p:spPr>
+        <p:style>
+          <a:lnRef idx="1">
+            <a:schemeClr val="accent1"/>
+          </a:lnRef>
+          <a:fillRef idx="0">
+            <a:schemeClr val="accent1"/>
+          </a:fillRef>
+          <a:effectRef idx="0">
+            <a:schemeClr val="accent1"/>
+          </a:effectRef>
+          <a:fontRef idx="minor">
+            <a:schemeClr val="tx1"/>
+          </a:fontRef>
+        </p:style>
+      </p:cxnSp>
+      <p:cxnSp>
+        <p:nvCxnSpPr>
+          <p:cNvPr id="15" name="Straight Arrow Connector 14">
+            <a:extLst>
+              <a:ext uri="{FF2B5EF4-FFF2-40B4-BE49-F238E27FC236}">
+                <a16:creationId xmlns:a16="http://schemas.microsoft.com/office/drawing/2014/main" id="{19D3F533-B9D6-4595-8067-9D79B7E97036}"/>
+              </a:ext>
+            </a:extLst>
+          </p:cNvPr>
+          <p:cNvCxnSpPr>
+            <a:cxnSpLocks/>
+          </p:cNvCxnSpPr>
+          <p:nvPr/>
+        </p:nvCxnSpPr>
+        <p:spPr>
+          <a:xfrm>
+            <a:off x="7774580" y="2612987"/>
+            <a:ext cx="672950" cy="0"/>
+          </a:xfrm>
+          <a:prstGeom prst="straightConnector1">
+            <a:avLst/>
+          </a:prstGeom>
+          <a:ln w="127000">
+            <a:solidFill>
+              <a:schemeClr val="tx1">
+                <a:lumMod val="65000"/>
+                <a:lumOff val="35000"/>
+              </a:schemeClr>
+            </a:solidFill>
+            <a:tailEnd type="triangle"/>
+          </a:ln>
+        </p:spPr>
+        <p:style>
+          <a:lnRef idx="1">
+            <a:schemeClr val="accent1"/>
+          </a:lnRef>
+          <a:fillRef idx="0">
+            <a:schemeClr val="accent1"/>
+          </a:fillRef>
+          <a:effectRef idx="0">
+            <a:schemeClr val="accent1"/>
+          </a:effectRef>
+          <a:fontRef idx="minor">
+            <a:schemeClr val="tx1"/>
+          </a:fontRef>
+        </p:style>
+      </p:cxnSp>
+      <p:sp>
+        <p:nvSpPr>
+          <p:cNvPr id="16" name="TextBox 15">
+            <a:extLst>
+              <a:ext uri="{FF2B5EF4-FFF2-40B4-BE49-F238E27FC236}">
+                <a16:creationId xmlns:a16="http://schemas.microsoft.com/office/drawing/2014/main" id="{F1D67D79-8925-46F1-ABB5-7D8C57DCE19F}"/>
               </a:ext>
             </a:extLst>
           </p:cNvPr>
@@ -5337,8 +5411,8 @@
         </p:nvSpPr>
         <p:spPr>
           <a:xfrm>
-            <a:off x="8910536" y="946981"/>
-            <a:ext cx="3060437" cy="338554"/>
+            <a:off x="9226810" y="1306260"/>
+            <a:ext cx="766557" cy="338554"/>
           </a:xfrm>
           <a:prstGeom prst="rect">
             <a:avLst/>
@@ -5346,26 +5420,139 @@
           <a:noFill/>
         </p:spPr>
         <p:txBody>
-          <a:bodyPr wrap="square" rtlCol="0">
+          <a:bodyPr wrap="none" rtlCol="0">
             <a:spAutoFit/>
           </a:bodyPr>
           <a:lstStyle/>
           <a:p>
             <a:r>
               <a:rPr lang="en-US" sz="1600" dirty="0">
+                <a:latin typeface="Bahnschrift" panose="020B0502040204020203" pitchFamily="34" charset="0"/>
+              </a:rPr>
+              <a:t>Topic 1</a:t>
+            </a:r>
+          </a:p>
+        </p:txBody>
+      </p:sp>
+      <p:sp>
+        <p:nvSpPr>
+          <p:cNvPr id="17" name="TextBox 16">
+            <a:extLst>
+              <a:ext uri="{FF2B5EF4-FFF2-40B4-BE49-F238E27FC236}">
+                <a16:creationId xmlns:a16="http://schemas.microsoft.com/office/drawing/2014/main" id="{F533346F-AA8B-4881-B391-7FA6A32B17B3}"/>
+              </a:ext>
+            </a:extLst>
+          </p:cNvPr>
+          <p:cNvSpPr txBox="1"/>
+          <p:nvPr/>
+        </p:nvSpPr>
+        <p:spPr>
+          <a:xfrm>
+            <a:off x="10648054" y="1306260"/>
+            <a:ext cx="803425" cy="338554"/>
+          </a:xfrm>
+          <a:prstGeom prst="rect">
+            <a:avLst/>
+          </a:prstGeom>
+          <a:noFill/>
+        </p:spPr>
+        <p:txBody>
+          <a:bodyPr wrap="none" rtlCol="0">
+            <a:spAutoFit/>
+          </a:bodyPr>
+          <a:lstStyle/>
+          <a:p>
+            <a:r>
+              <a:rPr lang="en-US" sz="1600" dirty="0">
+                <a:latin typeface="Bahnschrift" panose="020B0502040204020203" pitchFamily="34" charset="0"/>
+              </a:rPr>
+              <a:t>Topic 2</a:t>
+            </a:r>
+          </a:p>
+        </p:txBody>
+      </p:sp>
+      <p:sp>
+        <p:nvSpPr>
+          <p:cNvPr id="18" name="Rectangle 17">
+            <a:extLst>
+              <a:ext uri="{FF2B5EF4-FFF2-40B4-BE49-F238E27FC236}">
+                <a16:creationId xmlns:a16="http://schemas.microsoft.com/office/drawing/2014/main" id="{6F1E81B5-12DA-451E-BDEF-98F7E93EFA2F}"/>
+              </a:ext>
+            </a:extLst>
+          </p:cNvPr>
+          <p:cNvSpPr/>
+          <p:nvPr/>
+        </p:nvSpPr>
+        <p:spPr>
+          <a:xfrm>
+            <a:off x="5581275" y="1347296"/>
+            <a:ext cx="2287806" cy="369332"/>
+          </a:xfrm>
+          <a:prstGeom prst="rect">
+            <a:avLst/>
+          </a:prstGeom>
+        </p:spPr>
+        <p:txBody>
+          <a:bodyPr wrap="none">
+            <a:spAutoFit/>
+          </a:bodyPr>
+          <a:lstStyle/>
+          <a:p>
+            <a:r>
+              <a:rPr lang="en-US" dirty="0">
+                <a:solidFill>
+                  <a:srgbClr val="000000"/>
+                </a:solidFill>
                 <a:latin typeface="Bahnschrift SemiCondensed" panose="020B0502040204020203" pitchFamily="34" charset="0"/>
               </a:rPr>
-              <a:t>Sep 11-30, 2016 (Right Trolls)</a:t>
+              <a:t>R Topic Models Package</a:t>
+            </a:r>
+            <a:endParaRPr lang="en-US" dirty="0"/>
+          </a:p>
+        </p:txBody>
+      </p:sp>
+      <p:sp>
+        <p:nvSpPr>
+          <p:cNvPr id="21" name="Rectangle 20">
+            <a:extLst>
+              <a:ext uri="{FF2B5EF4-FFF2-40B4-BE49-F238E27FC236}">
+                <a16:creationId xmlns:a16="http://schemas.microsoft.com/office/drawing/2014/main" id="{C1DD6902-0053-4C6F-8288-8258E0EB4003}"/>
+              </a:ext>
+            </a:extLst>
+          </p:cNvPr>
+          <p:cNvSpPr/>
+          <p:nvPr/>
+        </p:nvSpPr>
+        <p:spPr>
+          <a:xfrm>
+            <a:off x="302619" y="5242860"/>
+            <a:ext cx="1651772" cy="369332"/>
+          </a:xfrm>
+          <a:prstGeom prst="rect">
+            <a:avLst/>
+          </a:prstGeom>
+        </p:spPr>
+        <p:txBody>
+          <a:bodyPr wrap="square">
+            <a:spAutoFit/>
+          </a:bodyPr>
+          <a:lstStyle/>
+          <a:p>
+            <a:r>
+              <a:rPr lang="en-US" dirty="0">
+                <a:latin typeface="Bahnschrift" panose="020B0502040204020203" pitchFamily="34" charset="0"/>
+              </a:rPr>
+              <a:t>Word Clouds</a:t>
             </a:r>
           </a:p>
         </p:txBody>
       </p:sp>
       <p:pic>
         <p:nvPicPr>
-          <p:cNvPr id="20" name="Picture 19">
-            <a:extLst>
-              <a:ext uri="{FF2B5EF4-FFF2-40B4-BE49-F238E27FC236}">
-                <a16:creationId xmlns:a16="http://schemas.microsoft.com/office/drawing/2014/main" xmlns="" id="{EDB40842-AF91-486F-9B1A-56DBAFB3E7C3}"/>
+          <p:cNvPr id="22" name="Picture 21">
+            <a:extLst>
+              <a:ext uri="{FF2B5EF4-FFF2-40B4-BE49-F238E27FC236}">
+                <a16:creationId xmlns:a16="http://schemas.microsoft.com/office/drawing/2014/main" id="{B39F4874-E3DF-490D-B361-89C7CDDB6ECA}"/>
               </a:ext>
             </a:extLst>
           </p:cNvPr>
@@ -5382,164 +5569,104 @@
         </p:blipFill>
         <p:spPr>
           <a:xfrm>
-            <a:off x="4158893" y="4432240"/>
-            <a:ext cx="3715135" cy="2396262"/>
+            <a:off x="3502952" y="4461411"/>
+            <a:ext cx="3394154" cy="2350376"/>
           </a:xfrm>
           <a:prstGeom prst="rect">
             <a:avLst/>
           </a:prstGeom>
         </p:spPr>
       </p:pic>
-      <p:sp>
-        <p:nvSpPr>
-          <p:cNvPr id="21" name="TextBox 20">
-            <a:extLst>
-              <a:ext uri="{FF2B5EF4-FFF2-40B4-BE49-F238E27FC236}">
-                <a16:creationId xmlns:a16="http://schemas.microsoft.com/office/drawing/2014/main" xmlns="" id="{1F162A81-C566-48E4-BA46-C72BE2BF12E4}"/>
-              </a:ext>
-            </a:extLst>
-          </p:cNvPr>
-          <p:cNvSpPr txBox="1"/>
+      <p:cxnSp>
+        <p:nvCxnSpPr>
+          <p:cNvPr id="24" name="Straight Connector 23">
+            <a:extLst>
+              <a:ext uri="{FF2B5EF4-FFF2-40B4-BE49-F238E27FC236}">
+                <a16:creationId xmlns:a16="http://schemas.microsoft.com/office/drawing/2014/main" id="{D06174F7-30F9-4C21-A55B-60DD0AC9087B}"/>
+              </a:ext>
+            </a:extLst>
+          </p:cNvPr>
+          <p:cNvCxnSpPr>
+            <a:cxnSpLocks/>
+          </p:cNvCxnSpPr>
           <p:nvPr/>
-        </p:nvSpPr>
-        <p:spPr>
-          <a:xfrm>
-            <a:off x="4752602" y="4062908"/>
-            <a:ext cx="3498725" cy="338554"/>
-          </a:xfrm>
-          <a:prstGeom prst="rect">
+        </p:nvCxnSpPr>
+        <p:spPr>
+          <a:xfrm>
+            <a:off x="302619" y="4300559"/>
+            <a:ext cx="11353495" cy="0"/>
+          </a:xfrm>
+          <a:prstGeom prst="line">
             <a:avLst/>
           </a:prstGeom>
-          <a:noFill/>
-        </p:spPr>
-        <p:txBody>
-          <a:bodyPr wrap="square" rtlCol="0">
-            <a:spAutoFit/>
-          </a:bodyPr>
-          <a:lstStyle/>
-          <a:p>
-            <a:r>
-              <a:rPr lang="en-US" sz="1600" dirty="0">
-                <a:latin typeface="Bahnschrift SemiCondensed" panose="020B0502040204020203" pitchFamily="34" charset="0"/>
-              </a:rPr>
-              <a:t>July 28 – Aug 26, 2017 (Right Trolls)</a:t>
-            </a:r>
-          </a:p>
-        </p:txBody>
-      </p:sp>
-      <p:pic>
-        <p:nvPicPr>
-          <p:cNvPr id="22" name="Picture 21">
-            <a:extLst>
-              <a:ext uri="{FF2B5EF4-FFF2-40B4-BE49-F238E27FC236}">
-                <a16:creationId xmlns:a16="http://schemas.microsoft.com/office/drawing/2014/main" xmlns="" id="{3806D5E2-2479-4660-B7BD-7128703E6867}"/>
-              </a:ext>
-            </a:extLst>
-          </p:cNvPr>
-          <p:cNvPicPr>
-            <a:picLocks noChangeAspect="1"/>
-          </p:cNvPicPr>
+          <a:ln w="38100">
+            <a:solidFill>
+              <a:srgbClr val="00B0F0"/>
+            </a:solidFill>
+          </a:ln>
+        </p:spPr>
+        <p:style>
+          <a:lnRef idx="1">
+            <a:schemeClr val="accent1"/>
+          </a:lnRef>
+          <a:fillRef idx="0">
+            <a:schemeClr val="accent1"/>
+          </a:fillRef>
+          <a:effectRef idx="0">
+            <a:schemeClr val="accent1"/>
+          </a:effectRef>
+          <a:fontRef idx="minor">
+            <a:schemeClr val="tx1"/>
+          </a:fontRef>
+        </p:style>
+      </p:cxnSp>
+      <p:cxnSp>
+        <p:nvCxnSpPr>
+          <p:cNvPr id="35" name="Straight Connector 34">
+            <a:extLst>
+              <a:ext uri="{FF2B5EF4-FFF2-40B4-BE49-F238E27FC236}">
+                <a16:creationId xmlns:a16="http://schemas.microsoft.com/office/drawing/2014/main" id="{7928893B-4D47-4C62-B717-77D816D02A8B}"/>
+              </a:ext>
+            </a:extLst>
+          </p:cNvPr>
+          <p:cNvCxnSpPr>
+            <a:cxnSpLocks/>
+          </p:cNvCxnSpPr>
           <p:nvPr/>
-        </p:nvPicPr>
-        <p:blipFill>
-          <a:blip r:embed="rId6"/>
-          <a:stretch>
-            <a:fillRect/>
-          </a:stretch>
-        </p:blipFill>
-        <p:spPr>
-          <a:xfrm>
-            <a:off x="129523" y="4388124"/>
-            <a:ext cx="3851928" cy="2484494"/>
-          </a:xfrm>
-          <a:prstGeom prst="rect">
+        </p:nvCxnSpPr>
+        <p:spPr>
+          <a:xfrm>
+            <a:off x="481828" y="1276947"/>
+            <a:ext cx="11174286" cy="0"/>
+          </a:xfrm>
+          <a:prstGeom prst="line">
             <a:avLst/>
           </a:prstGeom>
-        </p:spPr>
-      </p:pic>
-      <p:sp>
-        <p:nvSpPr>
-          <p:cNvPr id="23" name="TextBox 22">
-            <a:extLst>
-              <a:ext uri="{FF2B5EF4-FFF2-40B4-BE49-F238E27FC236}">
-                <a16:creationId xmlns:a16="http://schemas.microsoft.com/office/drawing/2014/main" xmlns="" id="{879D359E-5DB1-4B2A-917C-F57868E81507}"/>
-              </a:ext>
-            </a:extLst>
-          </p:cNvPr>
-          <p:cNvSpPr txBox="1"/>
-          <p:nvPr/>
-        </p:nvSpPr>
-        <p:spPr>
-          <a:xfrm>
-            <a:off x="1062620" y="4018792"/>
-            <a:ext cx="2756885" cy="338554"/>
-          </a:xfrm>
-          <a:prstGeom prst="rect">
-            <a:avLst/>
-          </a:prstGeom>
-          <a:noFill/>
-        </p:spPr>
-        <p:txBody>
-          <a:bodyPr wrap="square" rtlCol="0">
-            <a:spAutoFit/>
-          </a:bodyPr>
-          <a:lstStyle/>
-          <a:p>
-            <a:r>
-              <a:rPr lang="en-US" sz="1600" dirty="0">
-                <a:latin typeface="Bahnschrift SemiCondensed" panose="020B0502040204020203" pitchFamily="34" charset="0"/>
-              </a:rPr>
-              <a:t>Oct 5-8, 2016 (Left Trolls)</a:t>
-            </a:r>
-          </a:p>
-        </p:txBody>
-      </p:sp>
-      <p:sp>
-        <p:nvSpPr>
-          <p:cNvPr id="24" name="Rectangle 23">
-            <a:extLst>
-              <a:ext uri="{FF2B5EF4-FFF2-40B4-BE49-F238E27FC236}">
-                <a16:creationId xmlns:a16="http://schemas.microsoft.com/office/drawing/2014/main" xmlns="" id="{186B743F-53C6-496E-9C35-F64D36119AC6}"/>
-              </a:ext>
-            </a:extLst>
-          </p:cNvPr>
-          <p:cNvSpPr/>
-          <p:nvPr/>
-        </p:nvSpPr>
-        <p:spPr>
-          <a:xfrm>
-            <a:off x="775593" y="103112"/>
-            <a:ext cx="10263644" cy="646331"/>
-          </a:xfrm>
-          <a:prstGeom prst="rect">
-            <a:avLst/>
-          </a:prstGeom>
-        </p:spPr>
-        <p:txBody>
-          <a:bodyPr wrap="square">
-            <a:spAutoFit/>
-          </a:bodyPr>
-          <a:lstStyle/>
-          <a:p>
-            <a:r>
-              <a:rPr lang="en-US" sz="3600" dirty="0">
-                <a:solidFill>
-                  <a:schemeClr val="tx1">
-                    <a:lumMod val="75000"/>
-                    <a:lumOff val="25000"/>
-                  </a:schemeClr>
-                </a:solidFill>
-                <a:latin typeface="Bahnschrift SemiCondensed" panose="020B0502040204020203" pitchFamily="34" charset="0"/>
-              </a:rPr>
-              <a:t>Peak Troll Tweet LDA Topic Values (Unsupervised)</a:t>
-            </a:r>
-          </a:p>
-        </p:txBody>
-      </p:sp>
+          <a:ln w="38100">
+            <a:solidFill>
+              <a:srgbClr val="00B0F0"/>
+            </a:solidFill>
+          </a:ln>
+        </p:spPr>
+        <p:style>
+          <a:lnRef idx="1">
+            <a:schemeClr val="accent1"/>
+          </a:lnRef>
+          <a:fillRef idx="0">
+            <a:schemeClr val="accent1"/>
+          </a:fillRef>
+          <a:effectRef idx="0">
+            <a:schemeClr val="accent1"/>
+          </a:effectRef>
+          <a:fontRef idx="minor">
+            <a:schemeClr val="tx1"/>
+          </a:fontRef>
+        </p:style>
+      </p:cxnSp>
     </p:spTree>
     <p:extLst>
       <p:ext uri="{BB962C8B-B14F-4D97-AF65-F5344CB8AC3E}">
-        <p14:creationId xmlns:p14="http://schemas.microsoft.com/office/powerpoint/2010/main" val="1858228894"/>
+        <p14:creationId xmlns:p14="http://schemas.microsoft.com/office/powerpoint/2010/main" val="3912550152"/>
       </p:ext>
     </p:extLst>
   </p:cSld>
@@ -5566,12 +5693,347 @@
           <a:chExt cx="0" cy="0"/>
         </a:xfrm>
       </p:grpSpPr>
-      <p:sp>
-        <p:nvSpPr>
-          <p:cNvPr id="2" name="Rectangle 1">
-            <a:extLst>
-              <a:ext uri="{FF2B5EF4-FFF2-40B4-BE49-F238E27FC236}">
-                <a16:creationId xmlns:a16="http://schemas.microsoft.com/office/drawing/2014/main" xmlns="" id="{B8B14447-0FBD-402F-ABE3-4C25E1827A6B}"/>
+      <p:pic>
+        <p:nvPicPr>
+          <p:cNvPr id="14" name="Picture 13">
+            <a:extLst>
+              <a:ext uri="{FF2B5EF4-FFF2-40B4-BE49-F238E27FC236}">
+                <a16:creationId xmlns:a16="http://schemas.microsoft.com/office/drawing/2014/main" id="{BE03139D-8751-40BD-8037-D780F7104A92}"/>
+              </a:ext>
+            </a:extLst>
+          </p:cNvPr>
+          <p:cNvPicPr>
+            <a:picLocks noChangeAspect="1"/>
+          </p:cNvPicPr>
+          <p:nvPr/>
+        </p:nvPicPr>
+        <p:blipFill>
+          <a:blip r:embed="rId2"/>
+          <a:stretch>
+            <a:fillRect/>
+          </a:stretch>
+        </p:blipFill>
+        <p:spPr>
+          <a:xfrm>
+            <a:off x="201271" y="1356399"/>
+            <a:ext cx="3715135" cy="2396262"/>
+          </a:xfrm>
+          <a:prstGeom prst="rect">
+            <a:avLst/>
+          </a:prstGeom>
+        </p:spPr>
+      </p:pic>
+      <p:sp>
+        <p:nvSpPr>
+          <p:cNvPr id="15" name="TextBox 14">
+            <a:extLst>
+              <a:ext uri="{FF2B5EF4-FFF2-40B4-BE49-F238E27FC236}">
+                <a16:creationId xmlns:a16="http://schemas.microsoft.com/office/drawing/2014/main" id="{55151C75-05A7-4AFB-BA9E-542763EA59C9}"/>
+              </a:ext>
+            </a:extLst>
+          </p:cNvPr>
+          <p:cNvSpPr txBox="1"/>
+          <p:nvPr/>
+        </p:nvSpPr>
+        <p:spPr>
+          <a:xfrm>
+            <a:off x="796338" y="940418"/>
+            <a:ext cx="2847531" cy="338554"/>
+          </a:xfrm>
+          <a:prstGeom prst="rect">
+            <a:avLst/>
+          </a:prstGeom>
+          <a:noFill/>
+        </p:spPr>
+        <p:txBody>
+          <a:bodyPr wrap="square" rtlCol="0">
+            <a:spAutoFit/>
+          </a:bodyPr>
+          <a:lstStyle/>
+          <a:p>
+            <a:r>
+              <a:rPr lang="en-US" sz="1600" dirty="0">
+                <a:latin typeface="Bahnschrift SemiCondensed" panose="020B0502040204020203" pitchFamily="34" charset="0"/>
+              </a:rPr>
+              <a:t>July 20-24, 2015 (Right Trolls)</a:t>
+            </a:r>
+          </a:p>
+        </p:txBody>
+      </p:sp>
+      <p:pic>
+        <p:nvPicPr>
+          <p:cNvPr id="16" name="Picture 15">
+            <a:extLst>
+              <a:ext uri="{FF2B5EF4-FFF2-40B4-BE49-F238E27FC236}">
+                <a16:creationId xmlns:a16="http://schemas.microsoft.com/office/drawing/2014/main" id="{4C70C66F-A86A-497A-983B-D7497F0C273F}"/>
+              </a:ext>
+            </a:extLst>
+          </p:cNvPr>
+          <p:cNvPicPr>
+            <a:picLocks noChangeAspect="1"/>
+          </p:cNvPicPr>
+          <p:nvPr/>
+        </p:nvPicPr>
+        <p:blipFill>
+          <a:blip r:embed="rId3"/>
+          <a:stretch>
+            <a:fillRect/>
+          </a:stretch>
+        </p:blipFill>
+        <p:spPr>
+          <a:xfrm>
+            <a:off x="3981451" y="1324902"/>
+            <a:ext cx="3851928" cy="2484494"/>
+          </a:xfrm>
+          <a:prstGeom prst="rect">
+            <a:avLst/>
+          </a:prstGeom>
+        </p:spPr>
+      </p:pic>
+      <p:sp>
+        <p:nvSpPr>
+          <p:cNvPr id="17" name="TextBox 16">
+            <a:extLst>
+              <a:ext uri="{FF2B5EF4-FFF2-40B4-BE49-F238E27FC236}">
+                <a16:creationId xmlns:a16="http://schemas.microsoft.com/office/drawing/2014/main" id="{79579487-98BA-42F6-B098-D363E1C56791}"/>
+              </a:ext>
+            </a:extLst>
+          </p:cNvPr>
+          <p:cNvSpPr txBox="1"/>
+          <p:nvPr/>
+        </p:nvSpPr>
+        <p:spPr>
+          <a:xfrm>
+            <a:off x="4752602" y="945685"/>
+            <a:ext cx="2900834" cy="338554"/>
+          </a:xfrm>
+          <a:prstGeom prst="rect">
+            <a:avLst/>
+          </a:prstGeom>
+          <a:noFill/>
+        </p:spPr>
+        <p:txBody>
+          <a:bodyPr wrap="square" rtlCol="0">
+            <a:spAutoFit/>
+          </a:bodyPr>
+          <a:lstStyle/>
+          <a:p>
+            <a:r>
+              <a:rPr lang="en-US" sz="1600" dirty="0">
+                <a:latin typeface="Bahnschrift SemiCondensed" panose="020B0502040204020203" pitchFamily="34" charset="0"/>
+              </a:rPr>
+              <a:t>Mar 21-23, 2016 (Right Trolls)</a:t>
+            </a:r>
+          </a:p>
+        </p:txBody>
+      </p:sp>
+      <p:pic>
+        <p:nvPicPr>
+          <p:cNvPr id="18" name="Picture 17">
+            <a:extLst>
+              <a:ext uri="{FF2B5EF4-FFF2-40B4-BE49-F238E27FC236}">
+                <a16:creationId xmlns:a16="http://schemas.microsoft.com/office/drawing/2014/main" id="{4C541F7E-5A80-4F57-9FC3-B9DCA907C7F8}"/>
+              </a:ext>
+            </a:extLst>
+          </p:cNvPr>
+          <p:cNvPicPr>
+            <a:picLocks noChangeAspect="1"/>
+          </p:cNvPicPr>
+          <p:nvPr/>
+        </p:nvPicPr>
+        <p:blipFill>
+          <a:blip r:embed="rId4"/>
+          <a:stretch>
+            <a:fillRect/>
+          </a:stretch>
+        </p:blipFill>
+        <p:spPr>
+          <a:xfrm>
+            <a:off x="8103769" y="1324902"/>
+            <a:ext cx="3763969" cy="2427759"/>
+          </a:xfrm>
+          <a:prstGeom prst="rect">
+            <a:avLst/>
+          </a:prstGeom>
+        </p:spPr>
+      </p:pic>
+      <p:sp>
+        <p:nvSpPr>
+          <p:cNvPr id="19" name="TextBox 18">
+            <a:extLst>
+              <a:ext uri="{FF2B5EF4-FFF2-40B4-BE49-F238E27FC236}">
+                <a16:creationId xmlns:a16="http://schemas.microsoft.com/office/drawing/2014/main" id="{347EE929-CE65-4398-B545-7CCCBB85939B}"/>
+              </a:ext>
+            </a:extLst>
+          </p:cNvPr>
+          <p:cNvSpPr txBox="1"/>
+          <p:nvPr/>
+        </p:nvSpPr>
+        <p:spPr>
+          <a:xfrm>
+            <a:off x="8910536" y="946981"/>
+            <a:ext cx="3060437" cy="338554"/>
+          </a:xfrm>
+          <a:prstGeom prst="rect">
+            <a:avLst/>
+          </a:prstGeom>
+          <a:noFill/>
+        </p:spPr>
+        <p:txBody>
+          <a:bodyPr wrap="square" rtlCol="0">
+            <a:spAutoFit/>
+          </a:bodyPr>
+          <a:lstStyle/>
+          <a:p>
+            <a:r>
+              <a:rPr lang="en-US" sz="1600" dirty="0">
+                <a:latin typeface="Bahnschrift SemiCondensed" panose="020B0502040204020203" pitchFamily="34" charset="0"/>
+              </a:rPr>
+              <a:t>Sep 11-30, 2016 (Right Trolls)</a:t>
+            </a:r>
+          </a:p>
+        </p:txBody>
+      </p:sp>
+      <p:pic>
+        <p:nvPicPr>
+          <p:cNvPr id="20" name="Picture 19">
+            <a:extLst>
+              <a:ext uri="{FF2B5EF4-FFF2-40B4-BE49-F238E27FC236}">
+                <a16:creationId xmlns:a16="http://schemas.microsoft.com/office/drawing/2014/main" id="{EDB40842-AF91-486F-9B1A-56DBAFB3E7C3}"/>
+              </a:ext>
+            </a:extLst>
+          </p:cNvPr>
+          <p:cNvPicPr>
+            <a:picLocks noChangeAspect="1"/>
+          </p:cNvPicPr>
+          <p:nvPr/>
+        </p:nvPicPr>
+        <p:blipFill>
+          <a:blip r:embed="rId5"/>
+          <a:stretch>
+            <a:fillRect/>
+          </a:stretch>
+        </p:blipFill>
+        <p:spPr>
+          <a:xfrm>
+            <a:off x="4158893" y="4432240"/>
+            <a:ext cx="3715135" cy="2396262"/>
+          </a:xfrm>
+          <a:prstGeom prst="rect">
+            <a:avLst/>
+          </a:prstGeom>
+        </p:spPr>
+      </p:pic>
+      <p:sp>
+        <p:nvSpPr>
+          <p:cNvPr id="21" name="TextBox 20">
+            <a:extLst>
+              <a:ext uri="{FF2B5EF4-FFF2-40B4-BE49-F238E27FC236}">
+                <a16:creationId xmlns:a16="http://schemas.microsoft.com/office/drawing/2014/main" id="{1F162A81-C566-48E4-BA46-C72BE2BF12E4}"/>
+              </a:ext>
+            </a:extLst>
+          </p:cNvPr>
+          <p:cNvSpPr txBox="1"/>
+          <p:nvPr/>
+        </p:nvSpPr>
+        <p:spPr>
+          <a:xfrm>
+            <a:off x="4752602" y="4062908"/>
+            <a:ext cx="3498725" cy="338554"/>
+          </a:xfrm>
+          <a:prstGeom prst="rect">
+            <a:avLst/>
+          </a:prstGeom>
+          <a:noFill/>
+        </p:spPr>
+        <p:txBody>
+          <a:bodyPr wrap="square" rtlCol="0">
+            <a:spAutoFit/>
+          </a:bodyPr>
+          <a:lstStyle/>
+          <a:p>
+            <a:r>
+              <a:rPr lang="en-US" sz="1600" dirty="0">
+                <a:latin typeface="Bahnschrift SemiCondensed" panose="020B0502040204020203" pitchFamily="34" charset="0"/>
+              </a:rPr>
+              <a:t>July 28 – Aug 26, 2017 (Right Trolls)</a:t>
+            </a:r>
+          </a:p>
+        </p:txBody>
+      </p:sp>
+      <p:pic>
+        <p:nvPicPr>
+          <p:cNvPr id="22" name="Picture 21">
+            <a:extLst>
+              <a:ext uri="{FF2B5EF4-FFF2-40B4-BE49-F238E27FC236}">
+                <a16:creationId xmlns:a16="http://schemas.microsoft.com/office/drawing/2014/main" id="{3806D5E2-2479-4660-B7BD-7128703E6867}"/>
+              </a:ext>
+            </a:extLst>
+          </p:cNvPr>
+          <p:cNvPicPr>
+            <a:picLocks noChangeAspect="1"/>
+          </p:cNvPicPr>
+          <p:nvPr/>
+        </p:nvPicPr>
+        <p:blipFill>
+          <a:blip r:embed="rId6"/>
+          <a:stretch>
+            <a:fillRect/>
+          </a:stretch>
+        </p:blipFill>
+        <p:spPr>
+          <a:xfrm>
+            <a:off x="129523" y="4388124"/>
+            <a:ext cx="3851928" cy="2484494"/>
+          </a:xfrm>
+          <a:prstGeom prst="rect">
+            <a:avLst/>
+          </a:prstGeom>
+        </p:spPr>
+      </p:pic>
+      <p:sp>
+        <p:nvSpPr>
+          <p:cNvPr id="23" name="TextBox 22">
+            <a:extLst>
+              <a:ext uri="{FF2B5EF4-FFF2-40B4-BE49-F238E27FC236}">
+                <a16:creationId xmlns:a16="http://schemas.microsoft.com/office/drawing/2014/main" id="{879D359E-5DB1-4B2A-917C-F57868E81507}"/>
+              </a:ext>
+            </a:extLst>
+          </p:cNvPr>
+          <p:cNvSpPr txBox="1"/>
+          <p:nvPr/>
+        </p:nvSpPr>
+        <p:spPr>
+          <a:xfrm>
+            <a:off x="1062620" y="4018792"/>
+            <a:ext cx="2756885" cy="338554"/>
+          </a:xfrm>
+          <a:prstGeom prst="rect">
+            <a:avLst/>
+          </a:prstGeom>
+          <a:noFill/>
+        </p:spPr>
+        <p:txBody>
+          <a:bodyPr wrap="square" rtlCol="0">
+            <a:spAutoFit/>
+          </a:bodyPr>
+          <a:lstStyle/>
+          <a:p>
+            <a:r>
+              <a:rPr lang="en-US" sz="1600" dirty="0">
+                <a:latin typeface="Bahnschrift SemiCondensed" panose="020B0502040204020203" pitchFamily="34" charset="0"/>
+              </a:rPr>
+              <a:t>Oct 5-8, 2016 (Left Trolls)</a:t>
+            </a:r>
+          </a:p>
+        </p:txBody>
+      </p:sp>
+      <p:sp>
+        <p:nvSpPr>
+          <p:cNvPr id="24" name="Rectangle 23">
+            <a:extLst>
+              <a:ext uri="{FF2B5EF4-FFF2-40B4-BE49-F238E27FC236}">
+                <a16:creationId xmlns:a16="http://schemas.microsoft.com/office/drawing/2014/main" id="{186B743F-53C6-496E-9C35-F64D36119AC6}"/>
               </a:ext>
             </a:extLst>
           </p:cNvPr>
@@ -5580,8 +6042,8 @@
         </p:nvSpPr>
         <p:spPr>
           <a:xfrm>
-            <a:off x="895350" y="314236"/>
-            <a:ext cx="10077450" cy="1077218"/>
+            <a:off x="775593" y="103112"/>
+            <a:ext cx="10263644" cy="646331"/>
           </a:xfrm>
           <a:prstGeom prst="rect">
             <a:avLst/>
@@ -5594,213 +6056,16 @@
           <a:lstStyle/>
           <a:p>
             <a:r>
-              <a:rPr lang="en-US" sz="3200" dirty="0">
+              <a:rPr lang="en-US" sz="3600" dirty="0">
                 <a:solidFill>
                   <a:schemeClr val="tx1">
-                    <a:lumMod val="85000"/>
-                    <a:lumOff val="15000"/>
+                    <a:lumMod val="75000"/>
+                    <a:lumOff val="25000"/>
                   </a:schemeClr>
                 </a:solidFill>
                 <a:latin typeface="Bahnschrift SemiCondensed" panose="020B0502040204020203" pitchFamily="34" charset="0"/>
               </a:rPr>
-              <a:t>Topics, sentiment, and emotional appeal used by Left and Right trolls in peak periods</a:t>
-            </a:r>
-          </a:p>
-        </p:txBody>
-      </p:sp>
-      <p:sp>
-        <p:nvSpPr>
-          <p:cNvPr id="3" name="TextBox 2">
-            <a:extLst>
-              <a:ext uri="{FF2B5EF4-FFF2-40B4-BE49-F238E27FC236}">
-                <a16:creationId xmlns:a16="http://schemas.microsoft.com/office/drawing/2014/main" xmlns="" id="{71F3B2A4-BEF8-4D76-8155-741DF309DDCE}"/>
-              </a:ext>
-            </a:extLst>
-          </p:cNvPr>
-          <p:cNvSpPr txBox="1"/>
-          <p:nvPr/>
-        </p:nvSpPr>
-        <p:spPr>
-          <a:xfrm>
-            <a:off x="895350" y="1676400"/>
-            <a:ext cx="10572750" cy="4508927"/>
-          </a:xfrm>
-          <a:prstGeom prst="rect">
-            <a:avLst/>
-          </a:prstGeom>
-          <a:noFill/>
-        </p:spPr>
-        <p:txBody>
-          <a:bodyPr wrap="square" rtlCol="0">
-            <a:spAutoFit/>
-          </a:bodyPr>
-          <a:lstStyle/>
-          <a:p>
-            <a:pPr marL="285750" indent="-285750">
-              <a:spcBef>
-                <a:spcPts val="600"/>
-              </a:spcBef>
-              <a:buFont typeface="Arial" panose="020B0604020202020204" pitchFamily="34" charset="0"/>
-              <a:buChar char="•"/>
-            </a:pPr>
-            <a:r>
-              <a:rPr lang="en-US" dirty="0">
-                <a:solidFill>
-                  <a:schemeClr val="tx1">
-                    <a:lumMod val="85000"/>
-                    <a:lumOff val="15000"/>
-                  </a:schemeClr>
-                </a:solidFill>
-                <a:latin typeface="Bahnschrift SemiCondensed" panose="020B0502040204020203" pitchFamily="34" charset="0"/>
-              </a:rPr>
-              <a:t>Total sentiment/emotion was obviously influenced the most by daily tweet volume so averages per tweet were used instead – this created its own imprecision when tweet volumes were low and no statistical correction was made for this</a:t>
-            </a:r>
-          </a:p>
-          <a:p>
-            <a:pPr marL="285750" indent="-285750">
-              <a:spcBef>
-                <a:spcPts val="600"/>
-              </a:spcBef>
-              <a:buFont typeface="Arial" panose="020B0604020202020204" pitchFamily="34" charset="0"/>
-              <a:buChar char="•"/>
-            </a:pPr>
-            <a:r>
-              <a:rPr lang="en-US" dirty="0">
-                <a:solidFill>
-                  <a:schemeClr val="tx1">
-                    <a:lumMod val="85000"/>
-                    <a:lumOff val="15000"/>
-                  </a:schemeClr>
-                </a:solidFill>
-                <a:latin typeface="Bahnschrift SemiCondensed" panose="020B0502040204020203" pitchFamily="34" charset="0"/>
-              </a:rPr>
-              <a:t>Differences in emotion weren’t exclusive to peak tweet periods but reflective of longer periods</a:t>
-            </a:r>
-          </a:p>
-          <a:p>
-            <a:pPr marL="285750" indent="-285750">
-              <a:spcBef>
-                <a:spcPts val="600"/>
-              </a:spcBef>
-              <a:buFont typeface="Arial" panose="020B0604020202020204" pitchFamily="34" charset="0"/>
-              <a:buChar char="•"/>
-            </a:pPr>
-            <a:r>
-              <a:rPr lang="en-US" dirty="0">
-                <a:solidFill>
-                  <a:schemeClr val="tx1">
-                    <a:lumMod val="85000"/>
-                    <a:lumOff val="15000"/>
-                  </a:schemeClr>
-                </a:solidFill>
-                <a:latin typeface="Bahnschrift SemiCondensed" panose="020B0502040204020203" pitchFamily="34" charset="0"/>
-              </a:rPr>
-              <a:t>Fear and Surprise emotions trended slightly higher for Right trolls while Joy trended slightly higher for Left trolls</a:t>
-            </a:r>
-          </a:p>
-          <a:p>
-            <a:pPr marL="285750" indent="-285750">
-              <a:spcBef>
-                <a:spcPts val="600"/>
-              </a:spcBef>
-              <a:buFont typeface="Arial" panose="020B0604020202020204" pitchFamily="34" charset="0"/>
-              <a:buChar char="•"/>
-            </a:pPr>
-            <a:r>
-              <a:rPr lang="en-US" dirty="0">
-                <a:solidFill>
-                  <a:schemeClr val="tx1">
-                    <a:lumMod val="85000"/>
-                    <a:lumOff val="15000"/>
-                  </a:schemeClr>
-                </a:solidFill>
-                <a:latin typeface="Bahnschrift SemiCondensed" panose="020B0502040204020203" pitchFamily="34" charset="0"/>
-              </a:rPr>
-              <a:t>Negative and Positive sentiment both trended up over the period, possibly indicating more extreme positions of Trolls</a:t>
-            </a:r>
-          </a:p>
-          <a:p>
-            <a:pPr marL="285750" indent="-285750">
-              <a:spcBef>
-                <a:spcPts val="600"/>
-              </a:spcBef>
-              <a:buFont typeface="Arial" panose="020B0604020202020204" pitchFamily="34" charset="0"/>
-              <a:buChar char="•"/>
-            </a:pPr>
-            <a:r>
-              <a:rPr lang="en-US" dirty="0">
-                <a:solidFill>
-                  <a:schemeClr val="tx1">
-                    <a:lumMod val="85000"/>
-                    <a:lumOff val="15000"/>
-                  </a:schemeClr>
-                </a:solidFill>
-                <a:latin typeface="Bahnschrift SemiCondensed" panose="020B0502040204020203" pitchFamily="34" charset="0"/>
-              </a:rPr>
-              <a:t>Positive sentiment increased at twice the rate for Left Trolls than for Right Trolls</a:t>
-            </a:r>
-          </a:p>
-          <a:p>
-            <a:pPr marL="285750" indent="-285750">
-              <a:spcBef>
-                <a:spcPts val="600"/>
-              </a:spcBef>
-              <a:buFont typeface="Arial" panose="020B0604020202020204" pitchFamily="34" charset="0"/>
-              <a:buChar char="•"/>
-            </a:pPr>
-            <a:r>
-              <a:rPr lang="en-US" dirty="0">
-                <a:solidFill>
-                  <a:schemeClr val="tx1">
-                    <a:lumMod val="85000"/>
-                    <a:lumOff val="15000"/>
-                  </a:schemeClr>
-                </a:solidFill>
-                <a:latin typeface="Bahnschrift SemiCondensed" panose="020B0502040204020203" pitchFamily="34" charset="0"/>
-              </a:rPr>
-              <a:t>Left Trolls started with a higher degree of negative sentiment but were overtaken by Right Trolls shortly after the Nov 2016 election</a:t>
-            </a:r>
-          </a:p>
-          <a:p>
-            <a:pPr marL="285750" indent="-285750">
-              <a:spcBef>
-                <a:spcPts val="600"/>
-              </a:spcBef>
-              <a:buFont typeface="Arial" panose="020B0604020202020204" pitchFamily="34" charset="0"/>
-              <a:buChar char="•"/>
-            </a:pPr>
-            <a:r>
-              <a:rPr lang="en-US" dirty="0">
-                <a:solidFill>
-                  <a:schemeClr val="tx1">
-                    <a:lumMod val="85000"/>
-                    <a:lumOff val="15000"/>
-                  </a:schemeClr>
-                </a:solidFill>
-                <a:latin typeface="Bahnschrift SemiCondensed" panose="020B0502040204020203" pitchFamily="34" charset="0"/>
-              </a:rPr>
-              <a:t>Tweets in Mar 22, 2016 around the time of terror attacks in Brussels showed strong anti-Islamic bias</a:t>
-            </a:r>
-          </a:p>
-          <a:p>
-            <a:pPr marL="285750" indent="-285750">
-              <a:spcBef>
-                <a:spcPts val="600"/>
-              </a:spcBef>
-              <a:buFont typeface="Arial" panose="020B0604020202020204" pitchFamily="34" charset="0"/>
-              <a:buChar char="•"/>
-            </a:pPr>
-            <a:r>
-              <a:rPr lang="en-US" dirty="0">
-                <a:solidFill>
-                  <a:schemeClr val="tx1">
-                    <a:lumMod val="85000"/>
-                    <a:lumOff val="15000"/>
-                  </a:schemeClr>
-                </a:solidFill>
-                <a:latin typeface="Bahnschrift SemiCondensed" panose="020B0502040204020203" pitchFamily="34" charset="0"/>
-              </a:rPr>
-              <a:t>Tweet topics around the Aug 11-12 Charlottesville, VA Unite the Right rally and subsequent riots were reflective of the events of that period…however there is a period of tweet volume by Right Trolls leading up to the rally date that looks suspicious and needs further investigation</a:t>
+              <a:t>Peak Troll Tweet LDA Topic Values (Unsupervised)</a:t>
             </a:r>
           </a:p>
         </p:txBody>
@@ -5808,7 +6073,7 @@
     </p:spTree>
     <p:extLst>
       <p:ext uri="{BB962C8B-B14F-4D97-AF65-F5344CB8AC3E}">
-        <p14:creationId xmlns:p14="http://schemas.microsoft.com/office/powerpoint/2010/main" val="2480025771"/>
+        <p14:creationId xmlns:p14="http://schemas.microsoft.com/office/powerpoint/2010/main" val="1858228894"/>
       </p:ext>
     </p:extLst>
   </p:cSld>
@@ -5840,7 +6105,276 @@
           <p:cNvPr id="2" name="Rectangle 1">
             <a:extLst>
               <a:ext uri="{FF2B5EF4-FFF2-40B4-BE49-F238E27FC236}">
-                <a16:creationId xmlns:a16="http://schemas.microsoft.com/office/drawing/2014/main" xmlns="" id="{51A079DC-1C67-44A1-BA43-3D2CE4587852}"/>
+                <a16:creationId xmlns:a16="http://schemas.microsoft.com/office/drawing/2014/main" id="{B8B14447-0FBD-402F-ABE3-4C25E1827A6B}"/>
+              </a:ext>
+            </a:extLst>
+          </p:cNvPr>
+          <p:cNvSpPr/>
+          <p:nvPr/>
+        </p:nvSpPr>
+        <p:spPr>
+          <a:xfrm>
+            <a:off x="895350" y="314236"/>
+            <a:ext cx="10077450" cy="1077218"/>
+          </a:xfrm>
+          <a:prstGeom prst="rect">
+            <a:avLst/>
+          </a:prstGeom>
+        </p:spPr>
+        <p:txBody>
+          <a:bodyPr wrap="square">
+            <a:spAutoFit/>
+          </a:bodyPr>
+          <a:lstStyle/>
+          <a:p>
+            <a:r>
+              <a:rPr lang="en-US" sz="3200" dirty="0">
+                <a:solidFill>
+                  <a:schemeClr val="tx1">
+                    <a:lumMod val="85000"/>
+                    <a:lumOff val="15000"/>
+                  </a:schemeClr>
+                </a:solidFill>
+                <a:latin typeface="Bahnschrift SemiCondensed" panose="020B0502040204020203" pitchFamily="34" charset="0"/>
+              </a:rPr>
+              <a:t>Topics, sentiment, and emotional appeal used by Left and Right trolls in peak periods</a:t>
+            </a:r>
+          </a:p>
+        </p:txBody>
+      </p:sp>
+      <p:sp>
+        <p:nvSpPr>
+          <p:cNvPr id="3" name="TextBox 2">
+            <a:extLst>
+              <a:ext uri="{FF2B5EF4-FFF2-40B4-BE49-F238E27FC236}">
+                <a16:creationId xmlns:a16="http://schemas.microsoft.com/office/drawing/2014/main" id="{71F3B2A4-BEF8-4D76-8155-741DF309DDCE}"/>
+              </a:ext>
+            </a:extLst>
+          </p:cNvPr>
+          <p:cNvSpPr txBox="1"/>
+          <p:nvPr/>
+        </p:nvSpPr>
+        <p:spPr>
+          <a:xfrm>
+            <a:off x="895350" y="1676400"/>
+            <a:ext cx="10572750" cy="4508927"/>
+          </a:xfrm>
+          <a:prstGeom prst="rect">
+            <a:avLst/>
+          </a:prstGeom>
+          <a:noFill/>
+        </p:spPr>
+        <p:txBody>
+          <a:bodyPr wrap="square" rtlCol="0">
+            <a:spAutoFit/>
+          </a:bodyPr>
+          <a:lstStyle/>
+          <a:p>
+            <a:pPr marL="285750" indent="-285750">
+              <a:spcBef>
+                <a:spcPts val="600"/>
+              </a:spcBef>
+              <a:buFont typeface="Arial" panose="020B0604020202020204" pitchFamily="34" charset="0"/>
+              <a:buChar char="•"/>
+            </a:pPr>
+            <a:r>
+              <a:rPr lang="en-US" dirty="0">
+                <a:solidFill>
+                  <a:schemeClr val="tx1">
+                    <a:lumMod val="85000"/>
+                    <a:lumOff val="15000"/>
+                  </a:schemeClr>
+                </a:solidFill>
+                <a:latin typeface="Bahnschrift SemiCondensed" panose="020B0502040204020203" pitchFamily="34" charset="0"/>
+              </a:rPr>
+              <a:t>Total sentiment/emotion was obviously influenced the most by daily tweet volume so averages per tweet were used instead – this created its own imprecision when tweet volumes were low and no statistical correction was made for this</a:t>
+            </a:r>
+          </a:p>
+          <a:p>
+            <a:pPr marL="285750" indent="-285750">
+              <a:spcBef>
+                <a:spcPts val="600"/>
+              </a:spcBef>
+              <a:buFont typeface="Arial" panose="020B0604020202020204" pitchFamily="34" charset="0"/>
+              <a:buChar char="•"/>
+            </a:pPr>
+            <a:r>
+              <a:rPr lang="en-US" dirty="0">
+                <a:solidFill>
+                  <a:schemeClr val="tx1">
+                    <a:lumMod val="85000"/>
+                    <a:lumOff val="15000"/>
+                  </a:schemeClr>
+                </a:solidFill>
+                <a:latin typeface="Bahnschrift SemiCondensed" panose="020B0502040204020203" pitchFamily="34" charset="0"/>
+              </a:rPr>
+              <a:t>Differences in emotion weren’t exclusive to peak tweet periods but reflective of longer periods</a:t>
+            </a:r>
+          </a:p>
+          <a:p>
+            <a:pPr marL="285750" indent="-285750">
+              <a:spcBef>
+                <a:spcPts val="600"/>
+              </a:spcBef>
+              <a:buFont typeface="Arial" panose="020B0604020202020204" pitchFamily="34" charset="0"/>
+              <a:buChar char="•"/>
+            </a:pPr>
+            <a:r>
+              <a:rPr lang="en-US" dirty="0">
+                <a:solidFill>
+                  <a:schemeClr val="tx1">
+                    <a:lumMod val="85000"/>
+                    <a:lumOff val="15000"/>
+                  </a:schemeClr>
+                </a:solidFill>
+                <a:latin typeface="Bahnschrift SemiCondensed" panose="020B0502040204020203" pitchFamily="34" charset="0"/>
+              </a:rPr>
+              <a:t>Fear and Surprise emotions trended slightly higher for Right trolls while Joy trended slightly higher for Left trolls</a:t>
+            </a:r>
+          </a:p>
+          <a:p>
+            <a:pPr marL="285750" indent="-285750">
+              <a:spcBef>
+                <a:spcPts val="600"/>
+              </a:spcBef>
+              <a:buFont typeface="Arial" panose="020B0604020202020204" pitchFamily="34" charset="0"/>
+              <a:buChar char="•"/>
+            </a:pPr>
+            <a:r>
+              <a:rPr lang="en-US" dirty="0">
+                <a:solidFill>
+                  <a:schemeClr val="tx1">
+                    <a:lumMod val="85000"/>
+                    <a:lumOff val="15000"/>
+                  </a:schemeClr>
+                </a:solidFill>
+                <a:latin typeface="Bahnschrift SemiCondensed" panose="020B0502040204020203" pitchFamily="34" charset="0"/>
+              </a:rPr>
+              <a:t>Negative and Positive sentiment both trended up over the period, possibly indicating more extreme positions of Trolls</a:t>
+            </a:r>
+          </a:p>
+          <a:p>
+            <a:pPr marL="285750" indent="-285750">
+              <a:spcBef>
+                <a:spcPts val="600"/>
+              </a:spcBef>
+              <a:buFont typeface="Arial" panose="020B0604020202020204" pitchFamily="34" charset="0"/>
+              <a:buChar char="•"/>
+            </a:pPr>
+            <a:r>
+              <a:rPr lang="en-US" dirty="0">
+                <a:solidFill>
+                  <a:schemeClr val="tx1">
+                    <a:lumMod val="85000"/>
+                    <a:lumOff val="15000"/>
+                  </a:schemeClr>
+                </a:solidFill>
+                <a:latin typeface="Bahnschrift SemiCondensed" panose="020B0502040204020203" pitchFamily="34" charset="0"/>
+              </a:rPr>
+              <a:t>Positive sentiment increased at twice the rate for Left Trolls than for Right Trolls</a:t>
+            </a:r>
+          </a:p>
+          <a:p>
+            <a:pPr marL="285750" indent="-285750">
+              <a:spcBef>
+                <a:spcPts val="600"/>
+              </a:spcBef>
+              <a:buFont typeface="Arial" panose="020B0604020202020204" pitchFamily="34" charset="0"/>
+              <a:buChar char="•"/>
+            </a:pPr>
+            <a:r>
+              <a:rPr lang="en-US" dirty="0">
+                <a:solidFill>
+                  <a:schemeClr val="tx1">
+                    <a:lumMod val="85000"/>
+                    <a:lumOff val="15000"/>
+                  </a:schemeClr>
+                </a:solidFill>
+                <a:latin typeface="Bahnschrift SemiCondensed" panose="020B0502040204020203" pitchFamily="34" charset="0"/>
+              </a:rPr>
+              <a:t>Left Trolls started with a higher degree of negative sentiment but were overtaken by Right Trolls shortly after the Nov 2016 election</a:t>
+            </a:r>
+          </a:p>
+          <a:p>
+            <a:pPr marL="285750" indent="-285750">
+              <a:spcBef>
+                <a:spcPts val="600"/>
+              </a:spcBef>
+              <a:buFont typeface="Arial" panose="020B0604020202020204" pitchFamily="34" charset="0"/>
+              <a:buChar char="•"/>
+            </a:pPr>
+            <a:r>
+              <a:rPr lang="en-US" dirty="0">
+                <a:solidFill>
+                  <a:schemeClr val="tx1">
+                    <a:lumMod val="85000"/>
+                    <a:lumOff val="15000"/>
+                  </a:schemeClr>
+                </a:solidFill>
+                <a:latin typeface="Bahnschrift SemiCondensed" panose="020B0502040204020203" pitchFamily="34" charset="0"/>
+              </a:rPr>
+              <a:t>Tweets in Mar 22, 2016 around the time of terror attacks in Brussels showed strong anti-Islamic bias</a:t>
+            </a:r>
+          </a:p>
+          <a:p>
+            <a:pPr marL="285750" indent="-285750">
+              <a:spcBef>
+                <a:spcPts val="600"/>
+              </a:spcBef>
+              <a:buFont typeface="Arial" panose="020B0604020202020204" pitchFamily="34" charset="0"/>
+              <a:buChar char="•"/>
+            </a:pPr>
+            <a:r>
+              <a:rPr lang="en-US" dirty="0">
+                <a:solidFill>
+                  <a:schemeClr val="tx1">
+                    <a:lumMod val="85000"/>
+                    <a:lumOff val="15000"/>
+                  </a:schemeClr>
+                </a:solidFill>
+                <a:latin typeface="Bahnschrift SemiCondensed" panose="020B0502040204020203" pitchFamily="34" charset="0"/>
+              </a:rPr>
+              <a:t>Tweet topics around the Aug 11-12 Charlottesville, VA Unite the Right rally and subsequent riots were reflective of the events of that period…however there is a period of tweet volume by Right Trolls leading up to the rally date that looks suspicious and needs further investigation</a:t>
+            </a:r>
+          </a:p>
+        </p:txBody>
+      </p:sp>
+    </p:spTree>
+    <p:extLst>
+      <p:ext uri="{BB962C8B-B14F-4D97-AF65-F5344CB8AC3E}">
+        <p14:creationId xmlns:p14="http://schemas.microsoft.com/office/powerpoint/2010/main" val="2480025771"/>
+      </p:ext>
+    </p:extLst>
+  </p:cSld>
+  <p:clrMapOvr>
+    <a:masterClrMapping/>
+  </p:clrMapOvr>
+</p:sld>
+</file>
+
+<file path=ppt/slides/slide13.xml><?xml version="1.0" encoding="utf-8"?>
+<p:sld xmlns:a="http://schemas.openxmlformats.org/drawingml/2006/main" xmlns:r="http://schemas.openxmlformats.org/officeDocument/2006/relationships" xmlns:p="http://schemas.openxmlformats.org/presentationml/2006/main">
+  <p:cSld>
+    <p:spTree>
+      <p:nvGrpSpPr>
+        <p:cNvPr id="1" name=""/>
+        <p:cNvGrpSpPr/>
+        <p:nvPr/>
+      </p:nvGrpSpPr>
+      <p:grpSpPr>
+        <a:xfrm>
+          <a:off x="0" y="0"/>
+          <a:ext cx="0" cy="0"/>
+          <a:chOff x="0" y="0"/>
+          <a:chExt cx="0" cy="0"/>
+        </a:xfrm>
+      </p:grpSpPr>
+      <p:sp>
+        <p:nvSpPr>
+          <p:cNvPr id="2" name="Rectangle 1">
+            <a:extLst>
+              <a:ext uri="{FF2B5EF4-FFF2-40B4-BE49-F238E27FC236}">
+                <a16:creationId xmlns:a16="http://schemas.microsoft.com/office/drawing/2014/main" id="{51A079DC-1C67-44A1-BA43-3D2CE4587852}"/>
               </a:ext>
             </a:extLst>
           </p:cNvPr>
@@ -5906,7 +6440,7 @@
           <p:cNvPr id="4" name="Rectangle 3">
             <a:extLst>
               <a:ext uri="{FF2B5EF4-FFF2-40B4-BE49-F238E27FC236}">
-                <a16:creationId xmlns:a16="http://schemas.microsoft.com/office/drawing/2014/main" xmlns="" id="{D24C350C-E30B-4D73-98B9-A2D9E1ABEDCF}"/>
+                <a16:creationId xmlns:a16="http://schemas.microsoft.com/office/drawing/2014/main" id="{D24C350C-E30B-4D73-98B9-A2D9E1ABEDCF}"/>
               </a:ext>
             </a:extLst>
           </p:cNvPr>
@@ -5952,7 +6486,7 @@
           <p:cNvPr id="5" name="Rectangle 4">
             <a:extLst>
               <a:ext uri="{FF2B5EF4-FFF2-40B4-BE49-F238E27FC236}">
-                <a16:creationId xmlns:a16="http://schemas.microsoft.com/office/drawing/2014/main" xmlns="" id="{554322C7-57F1-48EC-B99F-01339CE4880F}"/>
+                <a16:creationId xmlns:a16="http://schemas.microsoft.com/office/drawing/2014/main" id="{554322C7-57F1-48EC-B99F-01339CE4880F}"/>
               </a:ext>
             </a:extLst>
           </p:cNvPr>
@@ -5998,7 +6532,7 @@
           <p:cNvPr id="6" name="Picture 5">
             <a:extLst>
               <a:ext uri="{FF2B5EF4-FFF2-40B4-BE49-F238E27FC236}">
-                <a16:creationId xmlns:a16="http://schemas.microsoft.com/office/drawing/2014/main" xmlns="" id="{510452C3-67FD-4BB8-A819-ED8F29FDC178}"/>
+                <a16:creationId xmlns:a16="http://schemas.microsoft.com/office/drawing/2014/main" id="{510452C3-67FD-4BB8-A819-ED8F29FDC178}"/>
               </a:ext>
             </a:extLst>
           </p:cNvPr>
@@ -6028,7 +6562,7 @@
           <p:cNvPr id="9" name="Picture 8">
             <a:extLst>
               <a:ext uri="{FF2B5EF4-FFF2-40B4-BE49-F238E27FC236}">
-                <a16:creationId xmlns:a16="http://schemas.microsoft.com/office/drawing/2014/main" xmlns="" id="{67A6EBF1-7B86-40FF-AB18-8A91E413FABC}"/>
+                <a16:creationId xmlns:a16="http://schemas.microsoft.com/office/drawing/2014/main" id="{67A6EBF1-7B86-40FF-AB18-8A91E413FABC}"/>
               </a:ext>
             </a:extLst>
           </p:cNvPr>
@@ -6058,7 +6592,7 @@
           <p:cNvPr id="10" name="Rectangle 9">
             <a:extLst>
               <a:ext uri="{FF2B5EF4-FFF2-40B4-BE49-F238E27FC236}">
-                <a16:creationId xmlns:a16="http://schemas.microsoft.com/office/drawing/2014/main" xmlns="" id="{AA9391A6-2082-464E-94EA-EEC8495BDAF6}"/>
+                <a16:creationId xmlns:a16="http://schemas.microsoft.com/office/drawing/2014/main" id="{AA9391A6-2082-464E-94EA-EEC8495BDAF6}"/>
               </a:ext>
             </a:extLst>
           </p:cNvPr>
@@ -6158,7 +6692,7 @@
           <p:cNvPr id="13" name="Rectangle 12">
             <a:extLst>
               <a:ext uri="{FF2B5EF4-FFF2-40B4-BE49-F238E27FC236}">
-                <a16:creationId xmlns:a16="http://schemas.microsoft.com/office/drawing/2014/main" xmlns="" id="{A8287D40-2A5A-4DCF-AF62-3C6A3449CF19}"/>
+                <a16:creationId xmlns:a16="http://schemas.microsoft.com/office/drawing/2014/main" id="{A8287D40-2A5A-4DCF-AF62-3C6A3449CF19}"/>
               </a:ext>
             </a:extLst>
           </p:cNvPr>
@@ -6223,7 +6757,7 @@
           <p:cNvPr id="14" name="Rectangle 13">
             <a:extLst>
               <a:ext uri="{FF2B5EF4-FFF2-40B4-BE49-F238E27FC236}">
-                <a16:creationId xmlns:a16="http://schemas.microsoft.com/office/drawing/2014/main" xmlns="" id="{CAD799E4-E493-4AE0-A341-49BC74C87401}"/>
+                <a16:creationId xmlns:a16="http://schemas.microsoft.com/office/drawing/2014/main" id="{CAD799E4-E493-4AE0-A341-49BC74C87401}"/>
               </a:ext>
             </a:extLst>
           </p:cNvPr>
@@ -6275,7 +6809,7 @@
           <p:cNvPr id="15" name="Rectangle 14">
             <a:extLst>
               <a:ext uri="{FF2B5EF4-FFF2-40B4-BE49-F238E27FC236}">
-                <a16:creationId xmlns:a16="http://schemas.microsoft.com/office/drawing/2014/main" xmlns="" id="{EB35041E-0BB1-484B-A84C-C2FD4021808D}"/>
+                <a16:creationId xmlns:a16="http://schemas.microsoft.com/office/drawing/2014/main" id="{EB35041E-0BB1-484B-A84C-C2FD4021808D}"/>
               </a:ext>
             </a:extLst>
           </p:cNvPr>
@@ -6339,7 +6873,7 @@
           <p:cNvPr id="16" name="Speech Bubble: Rectangle 15">
             <a:extLst>
               <a:ext uri="{FF2B5EF4-FFF2-40B4-BE49-F238E27FC236}">
-                <a16:creationId xmlns:a16="http://schemas.microsoft.com/office/drawing/2014/main" xmlns="" id="{201B3E1F-866E-445A-A167-62E0BAD8C2A4}"/>
+                <a16:creationId xmlns:a16="http://schemas.microsoft.com/office/drawing/2014/main" id="{201B3E1F-866E-445A-A167-62E0BAD8C2A4}"/>
               </a:ext>
             </a:extLst>
           </p:cNvPr>
@@ -6398,7 +6932,7 @@
           <p:cNvPr id="18" name="Speech Bubble: Rectangle 17">
             <a:extLst>
               <a:ext uri="{FF2B5EF4-FFF2-40B4-BE49-F238E27FC236}">
-                <a16:creationId xmlns:a16="http://schemas.microsoft.com/office/drawing/2014/main" xmlns="" id="{A4A22122-63F5-48FC-99A4-C08A43C538CB}"/>
+                <a16:creationId xmlns:a16="http://schemas.microsoft.com/office/drawing/2014/main" id="{A4A22122-63F5-48FC-99A4-C08A43C538CB}"/>
               </a:ext>
             </a:extLst>
           </p:cNvPr>
@@ -6457,7 +6991,7 @@
           <p:cNvPr id="19" name="Speech Bubble: Rectangle 18">
             <a:extLst>
               <a:ext uri="{FF2B5EF4-FFF2-40B4-BE49-F238E27FC236}">
-                <a16:creationId xmlns:a16="http://schemas.microsoft.com/office/drawing/2014/main" xmlns="" id="{E19179AC-D538-4080-949F-6276CC48ECA4}"/>
+                <a16:creationId xmlns:a16="http://schemas.microsoft.com/office/drawing/2014/main" id="{E19179AC-D538-4080-949F-6276CC48ECA4}"/>
               </a:ext>
             </a:extLst>
           </p:cNvPr>
@@ -6516,7 +7050,7 @@
           <p:cNvPr id="20" name="Speech Bubble: Rectangle 19">
             <a:extLst>
               <a:ext uri="{FF2B5EF4-FFF2-40B4-BE49-F238E27FC236}">
-                <a16:creationId xmlns:a16="http://schemas.microsoft.com/office/drawing/2014/main" xmlns="" id="{DFE6116D-ED12-4505-883A-410594085E50}"/>
+                <a16:creationId xmlns:a16="http://schemas.microsoft.com/office/drawing/2014/main" id="{DFE6116D-ED12-4505-883A-410594085E50}"/>
               </a:ext>
             </a:extLst>
           </p:cNvPr>
@@ -6591,7 +7125,7 @@
           <p:cNvPr id="12" name="Rectangle 11">
             <a:extLst>
               <a:ext uri="{FF2B5EF4-FFF2-40B4-BE49-F238E27FC236}">
-                <a16:creationId xmlns:a16="http://schemas.microsoft.com/office/drawing/2014/main" xmlns="" id="{6414E6A7-EEB6-47BC-B01D-6A0A44A49986}"/>
+                <a16:creationId xmlns:a16="http://schemas.microsoft.com/office/drawing/2014/main" id="{6414E6A7-EEB6-47BC-B01D-6A0A44A49986}"/>
               </a:ext>
             </a:extLst>
           </p:cNvPr>
@@ -6709,7 +7243,7 @@
           <p:cNvPr id="2" name="TextBox 1">
             <a:extLst>
               <a:ext uri="{FF2B5EF4-FFF2-40B4-BE49-F238E27FC236}">
-                <a16:creationId xmlns:a16="http://schemas.microsoft.com/office/drawing/2014/main" xmlns="" id="{E0636349-44FD-42EC-AB5C-CD84AD21DB72}"/>
+                <a16:creationId xmlns:a16="http://schemas.microsoft.com/office/drawing/2014/main" id="{E0636349-44FD-42EC-AB5C-CD84AD21DB72}"/>
               </a:ext>
             </a:extLst>
           </p:cNvPr>
@@ -6785,7 +7319,7 @@
           <p:cNvPr id="3" name="Rectangle 2">
             <a:extLst>
               <a:ext uri="{FF2B5EF4-FFF2-40B4-BE49-F238E27FC236}">
-                <a16:creationId xmlns:a16="http://schemas.microsoft.com/office/drawing/2014/main" xmlns="" id="{3C527614-8D0A-4EA5-B0E1-D875E91C2C2D}"/>
+                <a16:creationId xmlns:a16="http://schemas.microsoft.com/office/drawing/2014/main" id="{3C527614-8D0A-4EA5-B0E1-D875E91C2C2D}"/>
               </a:ext>
             </a:extLst>
           </p:cNvPr>
@@ -6867,7 +7401,7 @@
           <p:cNvPr id="5" name="Picture 4" descr="A picture containing sky&#10;&#10;Description generated with very high confidence">
             <a:extLst>
               <a:ext uri="{FF2B5EF4-FFF2-40B4-BE49-F238E27FC236}">
-                <a16:creationId xmlns:a16="http://schemas.microsoft.com/office/drawing/2014/main" xmlns="" id="{3C593A10-CD23-45C9-9A45-7D91A54EB487}"/>
+                <a16:creationId xmlns:a16="http://schemas.microsoft.com/office/drawing/2014/main" id="{3C593A10-CD23-45C9-9A45-7D91A54EB487}"/>
               </a:ext>
             </a:extLst>
           </p:cNvPr>
@@ -6903,7 +7437,7 @@
           <p:cNvPr id="6" name="Rectangle 5">
             <a:extLst>
               <a:ext uri="{FF2B5EF4-FFF2-40B4-BE49-F238E27FC236}">
-                <a16:creationId xmlns:a16="http://schemas.microsoft.com/office/drawing/2014/main" xmlns="" id="{72A536DB-E30D-4894-8550-D8ADE17C926D}"/>
+                <a16:creationId xmlns:a16="http://schemas.microsoft.com/office/drawing/2014/main" id="{72A536DB-E30D-4894-8550-D8ADE17C926D}"/>
               </a:ext>
             </a:extLst>
           </p:cNvPr>
@@ -6945,7 +7479,7 @@
           <p:cNvPr id="7" name="Callout: Line 6">
             <a:extLst>
               <a:ext uri="{FF2B5EF4-FFF2-40B4-BE49-F238E27FC236}">
-                <a16:creationId xmlns:a16="http://schemas.microsoft.com/office/drawing/2014/main" xmlns="" id="{72382BD5-F533-414E-8245-6B4CB8A71472}"/>
+                <a16:creationId xmlns:a16="http://schemas.microsoft.com/office/drawing/2014/main" id="{72382BD5-F533-414E-8245-6B4CB8A71472}"/>
               </a:ext>
             </a:extLst>
           </p:cNvPr>
@@ -7012,7 +7546,7 @@
           <p:cNvPr id="8" name="Callout: Line 7">
             <a:extLst>
               <a:ext uri="{FF2B5EF4-FFF2-40B4-BE49-F238E27FC236}">
-                <a16:creationId xmlns:a16="http://schemas.microsoft.com/office/drawing/2014/main" xmlns="" id="{1DAC9D15-ABDF-4938-A985-1C164184AC39}"/>
+                <a16:creationId xmlns:a16="http://schemas.microsoft.com/office/drawing/2014/main" id="{1DAC9D15-ABDF-4938-A985-1C164184AC39}"/>
               </a:ext>
             </a:extLst>
           </p:cNvPr>
@@ -7079,7 +7613,7 @@
           <p:cNvPr id="9" name="Callout: Line 8">
             <a:extLst>
               <a:ext uri="{FF2B5EF4-FFF2-40B4-BE49-F238E27FC236}">
-                <a16:creationId xmlns:a16="http://schemas.microsoft.com/office/drawing/2014/main" xmlns="" id="{DCD0828A-59C3-4E0C-8CAB-CBA735F5E00E}"/>
+                <a16:creationId xmlns:a16="http://schemas.microsoft.com/office/drawing/2014/main" id="{DCD0828A-59C3-4E0C-8CAB-CBA735F5E00E}"/>
               </a:ext>
             </a:extLst>
           </p:cNvPr>
@@ -7146,7 +7680,7 @@
           <p:cNvPr id="10" name="Callout: Line 9">
             <a:extLst>
               <a:ext uri="{FF2B5EF4-FFF2-40B4-BE49-F238E27FC236}">
-                <a16:creationId xmlns:a16="http://schemas.microsoft.com/office/drawing/2014/main" xmlns="" id="{4B2D0962-487B-411B-9298-C34E7138FC27}"/>
+                <a16:creationId xmlns:a16="http://schemas.microsoft.com/office/drawing/2014/main" id="{4B2D0962-487B-411B-9298-C34E7138FC27}"/>
               </a:ext>
             </a:extLst>
           </p:cNvPr>
@@ -7215,7 +7749,7 @@
           <p:cNvPr id="11" name="Callout: Line 10">
             <a:extLst>
               <a:ext uri="{FF2B5EF4-FFF2-40B4-BE49-F238E27FC236}">
-                <a16:creationId xmlns:a16="http://schemas.microsoft.com/office/drawing/2014/main" xmlns="" id="{391459BA-312C-4224-9B8D-0D5F2085FC51}"/>
+                <a16:creationId xmlns:a16="http://schemas.microsoft.com/office/drawing/2014/main" id="{391459BA-312C-4224-9B8D-0D5F2085FC51}"/>
               </a:ext>
             </a:extLst>
           </p:cNvPr>
@@ -7312,7 +7846,7 @@
           <p:cNvPr id="2" name="Rectangle 1">
             <a:extLst>
               <a:ext uri="{FF2B5EF4-FFF2-40B4-BE49-F238E27FC236}">
-                <a16:creationId xmlns:a16="http://schemas.microsoft.com/office/drawing/2014/main" xmlns="" id="{8EE3E63C-B491-4192-9DDB-535219FFA8C3}"/>
+                <a16:creationId xmlns:a16="http://schemas.microsoft.com/office/drawing/2014/main" id="{8EE3E63C-B491-4192-9DDB-535219FFA8C3}"/>
               </a:ext>
             </a:extLst>
           </p:cNvPr>
@@ -7364,7 +7898,7 @@
           <p:cNvPr id="3" name="Table 2">
             <a:extLst>
               <a:ext uri="{FF2B5EF4-FFF2-40B4-BE49-F238E27FC236}">
-                <a16:creationId xmlns:a16="http://schemas.microsoft.com/office/drawing/2014/main" xmlns="" id="{5E947591-1A85-465B-BD90-BA4FA397CFCE}"/>
+                <a16:creationId xmlns:a16="http://schemas.microsoft.com/office/drawing/2014/main" id="{5E947591-1A85-465B-BD90-BA4FA397CFCE}"/>
               </a:ext>
             </a:extLst>
           </p:cNvPr>
@@ -7393,84 +7927,84 @@
                 <a:gridCol w="3295731">
                   <a:extLst>
                     <a:ext uri="{9D8B030D-6E8A-4147-A177-3AD203B41FA5}">
-                      <a16:colId xmlns:a16="http://schemas.microsoft.com/office/drawing/2014/main" xmlns="" val="2296564455"/>
+                      <a16:colId xmlns:a16="http://schemas.microsoft.com/office/drawing/2014/main" val="2296564455"/>
                     </a:ext>
                   </a:extLst>
                 </a:gridCol>
                 <a:gridCol w="608588">
                   <a:extLst>
                     <a:ext uri="{9D8B030D-6E8A-4147-A177-3AD203B41FA5}">
-                      <a16:colId xmlns:a16="http://schemas.microsoft.com/office/drawing/2014/main" xmlns="" val="3337016153"/>
+                      <a16:colId xmlns:a16="http://schemas.microsoft.com/office/drawing/2014/main" val="3337016153"/>
                     </a:ext>
                   </a:extLst>
                 </a:gridCol>
                 <a:gridCol w="806732">
                   <a:extLst>
                     <a:ext uri="{9D8B030D-6E8A-4147-A177-3AD203B41FA5}">
-                      <a16:colId xmlns:a16="http://schemas.microsoft.com/office/drawing/2014/main" xmlns="" val="3864911095"/>
+                      <a16:colId xmlns:a16="http://schemas.microsoft.com/office/drawing/2014/main" val="3864911095"/>
                     </a:ext>
                   </a:extLst>
                 </a:gridCol>
                 <a:gridCol w="672045">
                   <a:extLst>
                     <a:ext uri="{9D8B030D-6E8A-4147-A177-3AD203B41FA5}">
-                      <a16:colId xmlns:a16="http://schemas.microsoft.com/office/drawing/2014/main" xmlns="" val="1262424048"/>
+                      <a16:colId xmlns:a16="http://schemas.microsoft.com/office/drawing/2014/main" val="1262424048"/>
                     </a:ext>
                   </a:extLst>
                 </a:gridCol>
                 <a:gridCol w="573437">
                   <a:extLst>
                     <a:ext uri="{9D8B030D-6E8A-4147-A177-3AD203B41FA5}">
-                      <a16:colId xmlns:a16="http://schemas.microsoft.com/office/drawing/2014/main" xmlns="" val="4207427119"/>
+                      <a16:colId xmlns:a16="http://schemas.microsoft.com/office/drawing/2014/main" val="4207427119"/>
                     </a:ext>
                   </a:extLst>
                 </a:gridCol>
                 <a:gridCol w="665200">
                   <a:extLst>
                     <a:ext uri="{9D8B030D-6E8A-4147-A177-3AD203B41FA5}">
-                      <a16:colId xmlns:a16="http://schemas.microsoft.com/office/drawing/2014/main" xmlns="" val="314516536"/>
+                      <a16:colId xmlns:a16="http://schemas.microsoft.com/office/drawing/2014/main" val="314516536"/>
                     </a:ext>
                   </a:extLst>
                 </a:gridCol>
                 <a:gridCol w="761591">
                   <a:extLst>
                     <a:ext uri="{9D8B030D-6E8A-4147-A177-3AD203B41FA5}">
-                      <a16:colId xmlns:a16="http://schemas.microsoft.com/office/drawing/2014/main" xmlns="" val="2965383869"/>
+                      <a16:colId xmlns:a16="http://schemas.microsoft.com/office/drawing/2014/main" val="2965383869"/>
                     </a:ext>
                   </a:extLst>
                 </a:gridCol>
                 <a:gridCol w="784704">
                   <a:extLst>
                     <a:ext uri="{9D8B030D-6E8A-4147-A177-3AD203B41FA5}">
-                      <a16:colId xmlns:a16="http://schemas.microsoft.com/office/drawing/2014/main" xmlns="" val="3379147286"/>
+                      <a16:colId xmlns:a16="http://schemas.microsoft.com/office/drawing/2014/main" val="3379147286"/>
                     </a:ext>
                   </a:extLst>
                 </a:gridCol>
                 <a:gridCol w="646228">
                   <a:extLst>
                     <a:ext uri="{9D8B030D-6E8A-4147-A177-3AD203B41FA5}">
-                      <a16:colId xmlns:a16="http://schemas.microsoft.com/office/drawing/2014/main" xmlns="" val="2356887181"/>
+                      <a16:colId xmlns:a16="http://schemas.microsoft.com/office/drawing/2014/main" val="2356887181"/>
                     </a:ext>
                   </a:extLst>
                 </a:gridCol>
                 <a:gridCol w="652267">
                   <a:extLst>
                     <a:ext uri="{9D8B030D-6E8A-4147-A177-3AD203B41FA5}">
-                      <a16:colId xmlns:a16="http://schemas.microsoft.com/office/drawing/2014/main" xmlns="" val="4246627445"/>
+                      <a16:colId xmlns:a16="http://schemas.microsoft.com/office/drawing/2014/main" val="4246627445"/>
                     </a:ext>
                   </a:extLst>
                 </a:gridCol>
                 <a:gridCol w="891651">
                   <a:extLst>
                     <a:ext uri="{9D8B030D-6E8A-4147-A177-3AD203B41FA5}">
-                      <a16:colId xmlns:a16="http://schemas.microsoft.com/office/drawing/2014/main" xmlns="" val="3137824285"/>
+                      <a16:colId xmlns:a16="http://schemas.microsoft.com/office/drawing/2014/main" val="3137824285"/>
                     </a:ext>
                   </a:extLst>
                 </a:gridCol>
                 <a:gridCol w="767027">
                   <a:extLst>
                     <a:ext uri="{9D8B030D-6E8A-4147-A177-3AD203B41FA5}">
-                      <a16:colId xmlns:a16="http://schemas.microsoft.com/office/drawing/2014/main" xmlns="" val="4103441227"/>
+                      <a16:colId xmlns:a16="http://schemas.microsoft.com/office/drawing/2014/main" val="4103441227"/>
                     </a:ext>
                   </a:extLst>
                 </a:gridCol>
@@ -7752,7 +8286,7 @@
                 </a:tc>
                 <a:extLst>
                   <a:ext uri="{0D108BD9-81ED-4DB2-BD59-A6C34878D82A}">
-                    <a16:rowId xmlns:a16="http://schemas.microsoft.com/office/drawing/2014/main" xmlns="" val="773629288"/>
+                    <a16:rowId xmlns:a16="http://schemas.microsoft.com/office/drawing/2014/main" val="773629288"/>
                   </a:ext>
                 </a:extLst>
               </a:tr>
@@ -8054,7 +8588,7 @@
                 </a:tc>
                 <a:extLst>
                   <a:ext uri="{0D108BD9-81ED-4DB2-BD59-A6C34878D82A}">
-                    <a16:rowId xmlns:a16="http://schemas.microsoft.com/office/drawing/2014/main" xmlns="" val="1386880744"/>
+                    <a16:rowId xmlns:a16="http://schemas.microsoft.com/office/drawing/2014/main" val="1386880744"/>
                   </a:ext>
                 </a:extLst>
               </a:tr>
@@ -8360,7 +8894,7 @@
                 </a:tc>
                 <a:extLst>
                   <a:ext uri="{0D108BD9-81ED-4DB2-BD59-A6C34878D82A}">
-                    <a16:rowId xmlns:a16="http://schemas.microsoft.com/office/drawing/2014/main" xmlns="" val="1082861925"/>
+                    <a16:rowId xmlns:a16="http://schemas.microsoft.com/office/drawing/2014/main" val="1082861925"/>
                   </a:ext>
                 </a:extLst>
               </a:tr>
@@ -8654,7 +9188,7 @@
                 </a:tc>
                 <a:extLst>
                   <a:ext uri="{0D108BD9-81ED-4DB2-BD59-A6C34878D82A}">
-                    <a16:rowId xmlns:a16="http://schemas.microsoft.com/office/drawing/2014/main" xmlns="" val="179850159"/>
+                    <a16:rowId xmlns:a16="http://schemas.microsoft.com/office/drawing/2014/main" val="179850159"/>
                   </a:ext>
                 </a:extLst>
               </a:tr>
@@ -8941,7 +9475,7 @@
                 </a:tc>
                 <a:extLst>
                   <a:ext uri="{0D108BD9-81ED-4DB2-BD59-A6C34878D82A}">
-                    <a16:rowId xmlns:a16="http://schemas.microsoft.com/office/drawing/2014/main" xmlns="" val="3226941073"/>
+                    <a16:rowId xmlns:a16="http://schemas.microsoft.com/office/drawing/2014/main" val="3226941073"/>
                   </a:ext>
                 </a:extLst>
               </a:tr>
@@ -8954,7 +9488,7 @@
           <p:cNvPr id="5" name="Rectangle 4">
             <a:extLst>
               <a:ext uri="{FF2B5EF4-FFF2-40B4-BE49-F238E27FC236}">
-                <a16:creationId xmlns:a16="http://schemas.microsoft.com/office/drawing/2014/main" xmlns="" id="{D208CED8-298B-4228-9DEE-618744C0D7A4}"/>
+                <a16:creationId xmlns:a16="http://schemas.microsoft.com/office/drawing/2014/main" id="{D208CED8-298B-4228-9DEE-618744C0D7A4}"/>
               </a:ext>
             </a:extLst>
           </p:cNvPr>
@@ -9047,7 +9581,7 @@
           <p:cNvPr id="6" name="Rectangle 5">
             <a:extLst>
               <a:ext uri="{FF2B5EF4-FFF2-40B4-BE49-F238E27FC236}">
-                <a16:creationId xmlns:a16="http://schemas.microsoft.com/office/drawing/2014/main" xmlns="" id="{7CBC0A20-C9B8-48FA-BBE8-C23EB1CE25D1}"/>
+                <a16:creationId xmlns:a16="http://schemas.microsoft.com/office/drawing/2014/main" id="{7CBC0A20-C9B8-48FA-BBE8-C23EB1CE25D1}"/>
               </a:ext>
             </a:extLst>
           </p:cNvPr>
@@ -9102,7 +9636,7 @@
           <p:cNvPr id="7" name="Rectangle 6">
             <a:extLst>
               <a:ext uri="{FF2B5EF4-FFF2-40B4-BE49-F238E27FC236}">
-                <a16:creationId xmlns:a16="http://schemas.microsoft.com/office/drawing/2014/main" xmlns="" id="{D3866D78-76BE-4DC4-99EB-F1558FCE623D}"/>
+                <a16:creationId xmlns:a16="http://schemas.microsoft.com/office/drawing/2014/main" id="{D3866D78-76BE-4DC4-99EB-F1558FCE623D}"/>
               </a:ext>
             </a:extLst>
           </p:cNvPr>
@@ -9157,7 +9691,7 @@
           <p:cNvPr id="8" name="Rectangle 7">
             <a:extLst>
               <a:ext uri="{FF2B5EF4-FFF2-40B4-BE49-F238E27FC236}">
-                <a16:creationId xmlns:a16="http://schemas.microsoft.com/office/drawing/2014/main" xmlns="" id="{B56A7613-17AD-4C5C-A6C4-70AC8B75CACA}"/>
+                <a16:creationId xmlns:a16="http://schemas.microsoft.com/office/drawing/2014/main" id="{B56A7613-17AD-4C5C-A6C4-70AC8B75CACA}"/>
               </a:ext>
             </a:extLst>
           </p:cNvPr>
@@ -9212,7 +9746,7 @@
           <p:cNvPr id="9" name="Rectangle 8">
             <a:extLst>
               <a:ext uri="{FF2B5EF4-FFF2-40B4-BE49-F238E27FC236}">
-                <a16:creationId xmlns:a16="http://schemas.microsoft.com/office/drawing/2014/main" xmlns="" id="{77565C6E-05B1-4727-BE49-44FC9F7343B7}"/>
+                <a16:creationId xmlns:a16="http://schemas.microsoft.com/office/drawing/2014/main" id="{77565C6E-05B1-4727-BE49-44FC9F7343B7}"/>
               </a:ext>
             </a:extLst>
           </p:cNvPr>
@@ -9297,7 +9831,7 @@
           <p:cNvPr id="20" name="Rectangle 19">
             <a:extLst>
               <a:ext uri="{FF2B5EF4-FFF2-40B4-BE49-F238E27FC236}">
-                <a16:creationId xmlns:a16="http://schemas.microsoft.com/office/drawing/2014/main" xmlns="" id="{6B5AF3FB-C510-418A-B70E-7A23B606AE59}"/>
+                <a16:creationId xmlns:a16="http://schemas.microsoft.com/office/drawing/2014/main" id="{6B5AF3FB-C510-418A-B70E-7A23B606AE59}"/>
               </a:ext>
             </a:extLst>
           </p:cNvPr>
@@ -9346,7 +9880,7 @@
           <p:cNvPr id="3" name="Picture 2">
             <a:extLst>
               <a:ext uri="{FF2B5EF4-FFF2-40B4-BE49-F238E27FC236}">
-                <a16:creationId xmlns:a16="http://schemas.microsoft.com/office/drawing/2014/main" xmlns="" id="{040E6B10-33AD-4158-BBBA-CFC4FFFC3190}"/>
+                <a16:creationId xmlns:a16="http://schemas.microsoft.com/office/drawing/2014/main" id="{040E6B10-33AD-4158-BBBA-CFC4FFFC3190}"/>
               </a:ext>
             </a:extLst>
           </p:cNvPr>
@@ -9382,7 +9916,7 @@
           <p:cNvPr id="5" name="Rectangle 4">
             <a:extLst>
               <a:ext uri="{FF2B5EF4-FFF2-40B4-BE49-F238E27FC236}">
-                <a16:creationId xmlns:a16="http://schemas.microsoft.com/office/drawing/2014/main" xmlns="" id="{38DCAED1-EE65-4842-B0C1-74C7C5B5EF9D}"/>
+                <a16:creationId xmlns:a16="http://schemas.microsoft.com/office/drawing/2014/main" id="{38DCAED1-EE65-4842-B0C1-74C7C5B5EF9D}"/>
               </a:ext>
             </a:extLst>
           </p:cNvPr>
@@ -9434,7 +9968,7 @@
           <p:cNvPr id="6" name="Rectangle 5">
             <a:extLst>
               <a:ext uri="{FF2B5EF4-FFF2-40B4-BE49-F238E27FC236}">
-                <a16:creationId xmlns:a16="http://schemas.microsoft.com/office/drawing/2014/main" xmlns="" id="{79B6AE29-F48D-4475-8E8A-B7D0A196C6DF}"/>
+                <a16:creationId xmlns:a16="http://schemas.microsoft.com/office/drawing/2014/main" id="{79B6AE29-F48D-4475-8E8A-B7D0A196C6DF}"/>
               </a:ext>
             </a:extLst>
           </p:cNvPr>
@@ -9471,7 +10005,7 @@
           <p:cNvPr id="7" name="Rectangle 6">
             <a:extLst>
               <a:ext uri="{FF2B5EF4-FFF2-40B4-BE49-F238E27FC236}">
-                <a16:creationId xmlns:a16="http://schemas.microsoft.com/office/drawing/2014/main" xmlns="" id="{59A80C8B-4877-4E83-BD0F-EA4C5E5EF173}"/>
+                <a16:creationId xmlns:a16="http://schemas.microsoft.com/office/drawing/2014/main" id="{59A80C8B-4877-4E83-BD0F-EA4C5E5EF173}"/>
               </a:ext>
             </a:extLst>
           </p:cNvPr>
@@ -9511,7 +10045,7 @@
           <p:cNvPr id="8" name="Rectangle 7">
             <a:extLst>
               <a:ext uri="{FF2B5EF4-FFF2-40B4-BE49-F238E27FC236}">
-                <a16:creationId xmlns:a16="http://schemas.microsoft.com/office/drawing/2014/main" xmlns="" id="{85042AC4-3E7B-42FD-AA5F-F2C65909597B}"/>
+                <a16:creationId xmlns:a16="http://schemas.microsoft.com/office/drawing/2014/main" id="{85042AC4-3E7B-42FD-AA5F-F2C65909597B}"/>
               </a:ext>
             </a:extLst>
           </p:cNvPr>
@@ -9553,7 +10087,7 @@
           <p:cNvPr id="10" name="Rectangle 9">
             <a:extLst>
               <a:ext uri="{FF2B5EF4-FFF2-40B4-BE49-F238E27FC236}">
-                <a16:creationId xmlns:a16="http://schemas.microsoft.com/office/drawing/2014/main" xmlns="" id="{E4EF2B47-8B8B-4EA2-B1A9-F090A35AB6B9}"/>
+                <a16:creationId xmlns:a16="http://schemas.microsoft.com/office/drawing/2014/main" id="{E4EF2B47-8B8B-4EA2-B1A9-F090A35AB6B9}"/>
               </a:ext>
             </a:extLst>
           </p:cNvPr>
@@ -9590,7 +10124,7 @@
           <p:cNvPr id="11" name="Rectangle 10">
             <a:extLst>
               <a:ext uri="{FF2B5EF4-FFF2-40B4-BE49-F238E27FC236}">
-                <a16:creationId xmlns:a16="http://schemas.microsoft.com/office/drawing/2014/main" xmlns="" id="{AC8EEBB4-A24F-4CB2-AF8F-72EC2E254675}"/>
+                <a16:creationId xmlns:a16="http://schemas.microsoft.com/office/drawing/2014/main" id="{AC8EEBB4-A24F-4CB2-AF8F-72EC2E254675}"/>
               </a:ext>
             </a:extLst>
           </p:cNvPr>
@@ -9630,7 +10164,7 @@
           <p:cNvPr id="12" name="TextBox 11">
             <a:extLst>
               <a:ext uri="{FF2B5EF4-FFF2-40B4-BE49-F238E27FC236}">
-                <a16:creationId xmlns:a16="http://schemas.microsoft.com/office/drawing/2014/main" xmlns="" id="{711BFE2E-E146-4103-9516-A29259BDC4F6}"/>
+                <a16:creationId xmlns:a16="http://schemas.microsoft.com/office/drawing/2014/main" id="{711BFE2E-E146-4103-9516-A29259BDC4F6}"/>
               </a:ext>
             </a:extLst>
           </p:cNvPr>
@@ -9670,7 +10204,7 @@
           <p:cNvPr id="13" name="TextBox 12">
             <a:extLst>
               <a:ext uri="{FF2B5EF4-FFF2-40B4-BE49-F238E27FC236}">
-                <a16:creationId xmlns:a16="http://schemas.microsoft.com/office/drawing/2014/main" xmlns="" id="{DCFD20EE-F18A-41A4-81A7-6F54BA81CF9D}"/>
+                <a16:creationId xmlns:a16="http://schemas.microsoft.com/office/drawing/2014/main" id="{DCFD20EE-F18A-41A4-81A7-6F54BA81CF9D}"/>
               </a:ext>
             </a:extLst>
           </p:cNvPr>
@@ -9710,7 +10244,7 @@
           <p:cNvPr id="14" name="TextBox 13">
             <a:extLst>
               <a:ext uri="{FF2B5EF4-FFF2-40B4-BE49-F238E27FC236}">
-                <a16:creationId xmlns:a16="http://schemas.microsoft.com/office/drawing/2014/main" xmlns="" id="{16B9622D-7122-48DD-B4FC-4675A5BA7C2B}"/>
+                <a16:creationId xmlns:a16="http://schemas.microsoft.com/office/drawing/2014/main" id="{16B9622D-7122-48DD-B4FC-4675A5BA7C2B}"/>
               </a:ext>
             </a:extLst>
           </p:cNvPr>
@@ -9750,7 +10284,7 @@
           <p:cNvPr id="15" name="TextBox 14">
             <a:extLst>
               <a:ext uri="{FF2B5EF4-FFF2-40B4-BE49-F238E27FC236}">
-                <a16:creationId xmlns:a16="http://schemas.microsoft.com/office/drawing/2014/main" xmlns="" id="{08287993-87A0-447E-9928-841FAB9191CB}"/>
+                <a16:creationId xmlns:a16="http://schemas.microsoft.com/office/drawing/2014/main" id="{08287993-87A0-447E-9928-841FAB9191CB}"/>
               </a:ext>
             </a:extLst>
           </p:cNvPr>
@@ -9790,7 +10324,7 @@
           <p:cNvPr id="16" name="TextBox 15">
             <a:extLst>
               <a:ext uri="{FF2B5EF4-FFF2-40B4-BE49-F238E27FC236}">
-                <a16:creationId xmlns:a16="http://schemas.microsoft.com/office/drawing/2014/main" xmlns="" id="{1E1A1D2F-77C3-4FEB-9B4D-661F33177290}"/>
+                <a16:creationId xmlns:a16="http://schemas.microsoft.com/office/drawing/2014/main" id="{1E1A1D2F-77C3-4FEB-9B4D-661F33177290}"/>
               </a:ext>
             </a:extLst>
           </p:cNvPr>
@@ -9830,7 +10364,7 @@
           <p:cNvPr id="17" name="TextBox 16">
             <a:extLst>
               <a:ext uri="{FF2B5EF4-FFF2-40B4-BE49-F238E27FC236}">
-                <a16:creationId xmlns:a16="http://schemas.microsoft.com/office/drawing/2014/main" xmlns="" id="{3CC8D3C5-6372-4C05-AFD8-78F03E96F5FE}"/>
+                <a16:creationId xmlns:a16="http://schemas.microsoft.com/office/drawing/2014/main" id="{3CC8D3C5-6372-4C05-AFD8-78F03E96F5FE}"/>
               </a:ext>
             </a:extLst>
           </p:cNvPr>
@@ -9870,7 +10404,7 @@
           <p:cNvPr id="18" name="TextBox 17">
             <a:extLst>
               <a:ext uri="{FF2B5EF4-FFF2-40B4-BE49-F238E27FC236}">
-                <a16:creationId xmlns:a16="http://schemas.microsoft.com/office/drawing/2014/main" xmlns="" id="{577E28A4-FF75-4141-99E7-B6C055580EB7}"/>
+                <a16:creationId xmlns:a16="http://schemas.microsoft.com/office/drawing/2014/main" id="{577E28A4-FF75-4141-99E7-B6C055580EB7}"/>
               </a:ext>
             </a:extLst>
           </p:cNvPr>
@@ -9910,7 +10444,7 @@
           <p:cNvPr id="19" name="TextBox 18">
             <a:extLst>
               <a:ext uri="{FF2B5EF4-FFF2-40B4-BE49-F238E27FC236}">
-                <a16:creationId xmlns:a16="http://schemas.microsoft.com/office/drawing/2014/main" xmlns="" id="{61B36F20-D8AE-4EB4-9906-DF91BC5C2365}"/>
+                <a16:creationId xmlns:a16="http://schemas.microsoft.com/office/drawing/2014/main" id="{61B36F20-D8AE-4EB4-9906-DF91BC5C2365}"/>
               </a:ext>
             </a:extLst>
           </p:cNvPr>
@@ -9980,7 +10514,7 @@
           <p:cNvPr id="5" name="Rectangle 4">
             <a:extLst>
               <a:ext uri="{FF2B5EF4-FFF2-40B4-BE49-F238E27FC236}">
-                <a16:creationId xmlns:a16="http://schemas.microsoft.com/office/drawing/2014/main" xmlns="" id="{38DCAED1-EE65-4842-B0C1-74C7C5B5EF9D}"/>
+                <a16:creationId xmlns:a16="http://schemas.microsoft.com/office/drawing/2014/main" id="{38DCAED1-EE65-4842-B0C1-74C7C5B5EF9D}"/>
               </a:ext>
             </a:extLst>
           </p:cNvPr>
@@ -10044,7 +10578,7 @@
           <p:cNvPr id="6" name="Rectangle 5">
             <a:extLst>
               <a:ext uri="{FF2B5EF4-FFF2-40B4-BE49-F238E27FC236}">
-                <a16:creationId xmlns:a16="http://schemas.microsoft.com/office/drawing/2014/main" xmlns="" id="{79B6AE29-F48D-4475-8E8A-B7D0A196C6DF}"/>
+                <a16:creationId xmlns:a16="http://schemas.microsoft.com/office/drawing/2014/main" id="{79B6AE29-F48D-4475-8E8A-B7D0A196C6DF}"/>
               </a:ext>
             </a:extLst>
           </p:cNvPr>
@@ -10081,7 +10615,7 @@
           <p:cNvPr id="7" name="Rectangle 6">
             <a:extLst>
               <a:ext uri="{FF2B5EF4-FFF2-40B4-BE49-F238E27FC236}">
-                <a16:creationId xmlns:a16="http://schemas.microsoft.com/office/drawing/2014/main" xmlns="" id="{59A80C8B-4877-4E83-BD0F-EA4C5E5EF173}"/>
+                <a16:creationId xmlns:a16="http://schemas.microsoft.com/office/drawing/2014/main" id="{59A80C8B-4877-4E83-BD0F-EA4C5E5EF173}"/>
               </a:ext>
             </a:extLst>
           </p:cNvPr>
@@ -10121,7 +10655,7 @@
           <p:cNvPr id="8" name="Rectangle 7">
             <a:extLst>
               <a:ext uri="{FF2B5EF4-FFF2-40B4-BE49-F238E27FC236}">
-                <a16:creationId xmlns:a16="http://schemas.microsoft.com/office/drawing/2014/main" xmlns="" id="{85042AC4-3E7B-42FD-AA5F-F2C65909597B}"/>
+                <a16:creationId xmlns:a16="http://schemas.microsoft.com/office/drawing/2014/main" id="{85042AC4-3E7B-42FD-AA5F-F2C65909597B}"/>
               </a:ext>
             </a:extLst>
           </p:cNvPr>
@@ -10163,7 +10697,7 @@
           <p:cNvPr id="10" name="Rectangle 9">
             <a:extLst>
               <a:ext uri="{FF2B5EF4-FFF2-40B4-BE49-F238E27FC236}">
-                <a16:creationId xmlns:a16="http://schemas.microsoft.com/office/drawing/2014/main" xmlns="" id="{E4EF2B47-8B8B-4EA2-B1A9-F090A35AB6B9}"/>
+                <a16:creationId xmlns:a16="http://schemas.microsoft.com/office/drawing/2014/main" id="{E4EF2B47-8B8B-4EA2-B1A9-F090A35AB6B9}"/>
               </a:ext>
             </a:extLst>
           </p:cNvPr>
@@ -10200,7 +10734,7 @@
           <p:cNvPr id="11" name="Rectangle 10">
             <a:extLst>
               <a:ext uri="{FF2B5EF4-FFF2-40B4-BE49-F238E27FC236}">
-                <a16:creationId xmlns:a16="http://schemas.microsoft.com/office/drawing/2014/main" xmlns="" id="{AC8EEBB4-A24F-4CB2-AF8F-72EC2E254675}"/>
+                <a16:creationId xmlns:a16="http://schemas.microsoft.com/office/drawing/2014/main" id="{AC8EEBB4-A24F-4CB2-AF8F-72EC2E254675}"/>
               </a:ext>
             </a:extLst>
           </p:cNvPr>
@@ -10240,7 +10774,7 @@
           <p:cNvPr id="4" name="Picture 3" descr="A picture containing sky, indoor&#10;&#10;Description generated with very high confidence">
             <a:extLst>
               <a:ext uri="{FF2B5EF4-FFF2-40B4-BE49-F238E27FC236}">
-                <a16:creationId xmlns:a16="http://schemas.microsoft.com/office/drawing/2014/main" xmlns="" id="{6A7B61F4-0B96-4666-9A29-C3095B543FBF}"/>
+                <a16:creationId xmlns:a16="http://schemas.microsoft.com/office/drawing/2014/main" id="{6A7B61F4-0B96-4666-9A29-C3095B543FBF}"/>
               </a:ext>
             </a:extLst>
           </p:cNvPr>
@@ -10276,7 +10810,7 @@
           <p:cNvPr id="12" name="Rectangle 11">
             <a:extLst>
               <a:ext uri="{FF2B5EF4-FFF2-40B4-BE49-F238E27FC236}">
-                <a16:creationId xmlns:a16="http://schemas.microsoft.com/office/drawing/2014/main" xmlns="" id="{7E7E6826-D304-4FC7-9A83-58C56BF79887}"/>
+                <a16:creationId xmlns:a16="http://schemas.microsoft.com/office/drawing/2014/main" id="{7E7E6826-D304-4FC7-9A83-58C56BF79887}"/>
               </a:ext>
             </a:extLst>
           </p:cNvPr>
@@ -10325,7 +10859,7 @@
           <p:cNvPr id="19" name="TextBox 18">
             <a:extLst>
               <a:ext uri="{FF2B5EF4-FFF2-40B4-BE49-F238E27FC236}">
-                <a16:creationId xmlns:a16="http://schemas.microsoft.com/office/drawing/2014/main" xmlns="" id="{23234E85-ECFD-426B-98B8-FDFA04F0EBF1}"/>
+                <a16:creationId xmlns:a16="http://schemas.microsoft.com/office/drawing/2014/main" id="{23234E85-ECFD-426B-98B8-FDFA04F0EBF1}"/>
               </a:ext>
             </a:extLst>
           </p:cNvPr>
@@ -10366,7 +10900,7 @@
           <p:cNvPr id="20" name="TextBox 19">
             <a:extLst>
               <a:ext uri="{FF2B5EF4-FFF2-40B4-BE49-F238E27FC236}">
-                <a16:creationId xmlns:a16="http://schemas.microsoft.com/office/drawing/2014/main" xmlns="" id="{89E8ECF8-1345-4018-81B2-269F196D2B34}"/>
+                <a16:creationId xmlns:a16="http://schemas.microsoft.com/office/drawing/2014/main" id="{89E8ECF8-1345-4018-81B2-269F196D2B34}"/>
               </a:ext>
             </a:extLst>
           </p:cNvPr>
@@ -10437,7 +10971,7 @@
           <p:cNvPr id="3" name="Picture 2" descr="A picture containing sky&#10;&#10;Description generated with high confidence">
             <a:extLst>
               <a:ext uri="{FF2B5EF4-FFF2-40B4-BE49-F238E27FC236}">
-                <a16:creationId xmlns:a16="http://schemas.microsoft.com/office/drawing/2014/main" xmlns="" id="{1A176FD7-06C6-432B-8220-64818B94CF11}"/>
+                <a16:creationId xmlns:a16="http://schemas.microsoft.com/office/drawing/2014/main" id="{1A176FD7-06C6-432B-8220-64818B94CF11}"/>
               </a:ext>
             </a:extLst>
           </p:cNvPr>
@@ -10473,7 +11007,7 @@
           <p:cNvPr id="4" name="Rectangle 3">
             <a:extLst>
               <a:ext uri="{FF2B5EF4-FFF2-40B4-BE49-F238E27FC236}">
-                <a16:creationId xmlns:a16="http://schemas.microsoft.com/office/drawing/2014/main" xmlns="" id="{84BCD03D-C74D-41E4-BF0E-462EAE0C82BC}"/>
+                <a16:creationId xmlns:a16="http://schemas.microsoft.com/office/drawing/2014/main" id="{84BCD03D-C74D-41E4-BF0E-462EAE0C82BC}"/>
               </a:ext>
             </a:extLst>
           </p:cNvPr>
@@ -10545,7 +11079,7 @@
           <p:cNvPr id="4" name="Rectangle 3">
             <a:extLst>
               <a:ext uri="{FF2B5EF4-FFF2-40B4-BE49-F238E27FC236}">
-                <a16:creationId xmlns:a16="http://schemas.microsoft.com/office/drawing/2014/main" xmlns="" id="{84BCD03D-C74D-41E4-BF0E-462EAE0C82BC}"/>
+                <a16:creationId xmlns:a16="http://schemas.microsoft.com/office/drawing/2014/main" id="{84BCD03D-C74D-41E4-BF0E-462EAE0C82BC}"/>
               </a:ext>
             </a:extLst>
           </p:cNvPr>
@@ -10587,7 +11121,7 @@
           <p:cNvPr id="5" name="Picture 4" descr="A picture containing sky, outdoor&#10;&#10;Description generated with very high confidence">
             <a:extLst>
               <a:ext uri="{FF2B5EF4-FFF2-40B4-BE49-F238E27FC236}">
-                <a16:creationId xmlns:a16="http://schemas.microsoft.com/office/drawing/2014/main" xmlns="" id="{EED7ABC7-6F6A-4454-98AD-ED6C0558C50F}"/>
+                <a16:creationId xmlns:a16="http://schemas.microsoft.com/office/drawing/2014/main" id="{EED7ABC7-6F6A-4454-98AD-ED6C0558C50F}"/>
               </a:ext>
             </a:extLst>
           </p:cNvPr>

</xml_diff>

<commit_message>
emotion by time category by Troll type
</commit_message>
<xml_diff>
--- a/DA_6233_Final_Presentation.pptx
+++ b/DA_6233_Final_Presentation.pptx
@@ -5,7 +5,7 @@
     <p:sldMasterId id="2147483648" r:id="rId1"/>
   </p:sldMasterIdLst>
   <p:notesMasterIdLst>
-    <p:notesMasterId r:id="rId20"/>
+    <p:notesMasterId r:id="rId21"/>
   </p:notesMasterIdLst>
   <p:sldIdLst>
     <p:sldId id="256" r:id="rId2"/>
@@ -22,10 +22,11 @@
     <p:sldId id="266" r:id="rId13"/>
     <p:sldId id="272" r:id="rId14"/>
     <p:sldId id="267" r:id="rId15"/>
-    <p:sldId id="274" r:id="rId16"/>
-    <p:sldId id="270" r:id="rId17"/>
-    <p:sldId id="258" r:id="rId18"/>
-    <p:sldId id="273" r:id="rId19"/>
+    <p:sldId id="275" r:id="rId16"/>
+    <p:sldId id="274" r:id="rId17"/>
+    <p:sldId id="270" r:id="rId18"/>
+    <p:sldId id="258" r:id="rId19"/>
+    <p:sldId id="273" r:id="rId20"/>
   </p:sldIdLst>
   <p:sldSz cx="12192000" cy="6858000"/>
   <p:notesSz cx="6858000" cy="9144000"/>
@@ -214,7 +215,7 @@
           <a:p>
             <a:fld id="{58299053-DB97-47E9-A4B3-500162653FBF}" type="datetimeFigureOut">
               <a:rPr lang="en-US" smtClean="0"/>
-              <a:t>9/14/2018</a:t>
+              <a:t>9/15/2018</a:t>
             </a:fld>
             <a:endParaRPr lang="en-US"/>
           </a:p>
@@ -796,7 +797,7 @@
           <a:p>
             <a:fld id="{50CB2F0A-8324-4208-AF8B-B09E4CFA67EA}" type="datetimeFigureOut">
               <a:rPr lang="en-US" smtClean="0"/>
-              <a:t>9/14/2018</a:t>
+              <a:t>9/15/2018</a:t>
             </a:fld>
             <a:endParaRPr lang="en-US"/>
           </a:p>
@@ -994,7 +995,7 @@
           <a:p>
             <a:fld id="{50CB2F0A-8324-4208-AF8B-B09E4CFA67EA}" type="datetimeFigureOut">
               <a:rPr lang="en-US" smtClean="0"/>
-              <a:t>9/14/2018</a:t>
+              <a:t>9/15/2018</a:t>
             </a:fld>
             <a:endParaRPr lang="en-US"/>
           </a:p>
@@ -1202,7 +1203,7 @@
           <a:p>
             <a:fld id="{50CB2F0A-8324-4208-AF8B-B09E4CFA67EA}" type="datetimeFigureOut">
               <a:rPr lang="en-US" smtClean="0"/>
-              <a:t>9/14/2018</a:t>
+              <a:t>9/15/2018</a:t>
             </a:fld>
             <a:endParaRPr lang="en-US"/>
           </a:p>
@@ -1400,7 +1401,7 @@
           <a:p>
             <a:fld id="{50CB2F0A-8324-4208-AF8B-B09E4CFA67EA}" type="datetimeFigureOut">
               <a:rPr lang="en-US" smtClean="0"/>
-              <a:t>9/14/2018</a:t>
+              <a:t>9/15/2018</a:t>
             </a:fld>
             <a:endParaRPr lang="en-US"/>
           </a:p>
@@ -1675,7 +1676,7 @@
           <a:p>
             <a:fld id="{50CB2F0A-8324-4208-AF8B-B09E4CFA67EA}" type="datetimeFigureOut">
               <a:rPr lang="en-US" smtClean="0"/>
-              <a:t>9/14/2018</a:t>
+              <a:t>9/15/2018</a:t>
             </a:fld>
             <a:endParaRPr lang="en-US"/>
           </a:p>
@@ -1940,7 +1941,7 @@
           <a:p>
             <a:fld id="{50CB2F0A-8324-4208-AF8B-B09E4CFA67EA}" type="datetimeFigureOut">
               <a:rPr lang="en-US" smtClean="0"/>
-              <a:t>9/14/2018</a:t>
+              <a:t>9/15/2018</a:t>
             </a:fld>
             <a:endParaRPr lang="en-US"/>
           </a:p>
@@ -2352,7 +2353,7 @@
           <a:p>
             <a:fld id="{50CB2F0A-8324-4208-AF8B-B09E4CFA67EA}" type="datetimeFigureOut">
               <a:rPr lang="en-US" smtClean="0"/>
-              <a:t>9/14/2018</a:t>
+              <a:t>9/15/2018</a:t>
             </a:fld>
             <a:endParaRPr lang="en-US"/>
           </a:p>
@@ -2493,7 +2494,7 @@
           <a:p>
             <a:fld id="{50CB2F0A-8324-4208-AF8B-B09E4CFA67EA}" type="datetimeFigureOut">
               <a:rPr lang="en-US" smtClean="0"/>
-              <a:t>9/14/2018</a:t>
+              <a:t>9/15/2018</a:t>
             </a:fld>
             <a:endParaRPr lang="en-US"/>
           </a:p>
@@ -2606,7 +2607,7 @@
           <a:p>
             <a:fld id="{50CB2F0A-8324-4208-AF8B-B09E4CFA67EA}" type="datetimeFigureOut">
               <a:rPr lang="en-US" smtClean="0"/>
-              <a:t>9/14/2018</a:t>
+              <a:t>9/15/2018</a:t>
             </a:fld>
             <a:endParaRPr lang="en-US"/>
           </a:p>
@@ -2917,7 +2918,7 @@
           <a:p>
             <a:fld id="{50CB2F0A-8324-4208-AF8B-B09E4CFA67EA}" type="datetimeFigureOut">
               <a:rPr lang="en-US" smtClean="0"/>
-              <a:t>9/14/2018</a:t>
+              <a:t>9/15/2018</a:t>
             </a:fld>
             <a:endParaRPr lang="en-US"/>
           </a:p>
@@ -3205,7 +3206,7 @@
           <a:p>
             <a:fld id="{50CB2F0A-8324-4208-AF8B-B09E4CFA67EA}" type="datetimeFigureOut">
               <a:rPr lang="en-US" smtClean="0"/>
-              <a:t>9/14/2018</a:t>
+              <a:t>9/15/2018</a:t>
             </a:fld>
             <a:endParaRPr lang="en-US"/>
           </a:p>
@@ -3446,7 +3447,7 @@
           <a:p>
             <a:fld id="{50CB2F0A-8324-4208-AF8B-B09E4CFA67EA}" type="datetimeFigureOut">
               <a:rPr lang="en-US" smtClean="0"/>
-              <a:t>9/14/2018</a:t>
+              <a:t>9/15/2018</a:t>
             </a:fld>
             <a:endParaRPr lang="en-US"/>
           </a:p>
@@ -20197,6 +20198,570 @@
       </p:grpSpPr>
       <p:sp>
         <p:nvSpPr>
+          <p:cNvPr id="25" name="Rectangle 24">
+            <a:extLst>
+              <a:ext uri="{FF2B5EF4-FFF2-40B4-BE49-F238E27FC236}">
+                <a16:creationId xmlns:a16="http://schemas.microsoft.com/office/drawing/2014/main" id="{F0E3CED0-B354-478D-BED6-62AD4BC74ABF}"/>
+              </a:ext>
+            </a:extLst>
+          </p:cNvPr>
+          <p:cNvSpPr/>
+          <p:nvPr/>
+        </p:nvSpPr>
+        <p:spPr>
+          <a:xfrm>
+            <a:off x="5779693" y="1446488"/>
+            <a:ext cx="345906" cy="4963966"/>
+          </a:xfrm>
+          <a:prstGeom prst="rect">
+            <a:avLst/>
+          </a:prstGeom>
+          <a:solidFill>
+            <a:srgbClr val="00B0F0"/>
+          </a:solidFill>
+          <a:ln>
+            <a:noFill/>
+          </a:ln>
+        </p:spPr>
+        <p:style>
+          <a:lnRef idx="2">
+            <a:schemeClr val="accent1">
+              <a:shade val="50000"/>
+            </a:schemeClr>
+          </a:lnRef>
+          <a:fillRef idx="1">
+            <a:schemeClr val="accent1"/>
+          </a:fillRef>
+          <a:effectRef idx="0">
+            <a:schemeClr val="accent1"/>
+          </a:effectRef>
+          <a:fontRef idx="minor">
+            <a:schemeClr val="lt1"/>
+          </a:fontRef>
+        </p:style>
+        <p:txBody>
+          <a:bodyPr vert="vert270" rtlCol="0" anchor="ctr"/>
+          <a:lstStyle/>
+          <a:p>
+            <a:pPr algn="ctr"/>
+            <a:r>
+              <a:rPr lang="en-US" dirty="0"/>
+              <a:t> </a:t>
+            </a:r>
+          </a:p>
+        </p:txBody>
+      </p:sp>
+      <p:sp>
+        <p:nvSpPr>
+          <p:cNvPr id="24" name="Rectangle 23">
+            <a:extLst>
+              <a:ext uri="{FF2B5EF4-FFF2-40B4-BE49-F238E27FC236}">
+                <a16:creationId xmlns:a16="http://schemas.microsoft.com/office/drawing/2014/main" id="{A19B74B2-EB08-4DFC-BE89-983C83809243}"/>
+              </a:ext>
+            </a:extLst>
+          </p:cNvPr>
+          <p:cNvSpPr/>
+          <p:nvPr/>
+        </p:nvSpPr>
+        <p:spPr>
+          <a:xfrm>
+            <a:off x="342727" y="1397806"/>
+            <a:ext cx="269548" cy="5012647"/>
+          </a:xfrm>
+          <a:prstGeom prst="rect">
+            <a:avLst/>
+          </a:prstGeom>
+          <a:solidFill>
+            <a:srgbClr val="00B0F0"/>
+          </a:solidFill>
+          <a:ln>
+            <a:noFill/>
+          </a:ln>
+        </p:spPr>
+        <p:style>
+          <a:lnRef idx="2">
+            <a:schemeClr val="accent1">
+              <a:shade val="50000"/>
+            </a:schemeClr>
+          </a:lnRef>
+          <a:fillRef idx="1">
+            <a:schemeClr val="accent1"/>
+          </a:fillRef>
+          <a:effectRef idx="0">
+            <a:schemeClr val="accent1"/>
+          </a:effectRef>
+          <a:fontRef idx="minor">
+            <a:schemeClr val="lt1"/>
+          </a:fontRef>
+        </p:style>
+        <p:txBody>
+          <a:bodyPr vert="vert270" rtlCol="0" anchor="ctr"/>
+          <a:lstStyle/>
+          <a:p>
+            <a:pPr algn="ctr"/>
+            <a:endParaRPr lang="en-US" dirty="0">
+              <a:solidFill>
+                <a:schemeClr val="bg1"/>
+              </a:solidFill>
+            </a:endParaRPr>
+          </a:p>
+        </p:txBody>
+      </p:sp>
+      <p:sp>
+        <p:nvSpPr>
+          <p:cNvPr id="2" name="Rectangle 1">
+            <a:extLst>
+              <a:ext uri="{FF2B5EF4-FFF2-40B4-BE49-F238E27FC236}">
+                <a16:creationId xmlns:a16="http://schemas.microsoft.com/office/drawing/2014/main" id="{51A079DC-1C67-44A1-BA43-3D2CE4587852}"/>
+              </a:ext>
+            </a:extLst>
+          </p:cNvPr>
+          <p:cNvSpPr/>
+          <p:nvPr/>
+        </p:nvSpPr>
+        <p:spPr>
+          <a:xfrm>
+            <a:off x="363256" y="438835"/>
+            <a:ext cx="10158608" cy="769441"/>
+          </a:xfrm>
+          <a:prstGeom prst="rect">
+            <a:avLst/>
+          </a:prstGeom>
+        </p:spPr>
+        <p:txBody>
+          <a:bodyPr wrap="square">
+            <a:spAutoFit/>
+          </a:bodyPr>
+          <a:lstStyle/>
+          <a:p>
+            <a:pPr algn="ctr"/>
+            <a:r>
+              <a:rPr lang="en-US" sz="4400" dirty="0">
+                <a:solidFill>
+                  <a:schemeClr val="tx1">
+                    <a:lumMod val="75000"/>
+                    <a:lumOff val="25000"/>
+                  </a:schemeClr>
+                </a:solidFill>
+                <a:latin typeface="Bahnschrift SemiCondensed" panose="020B0502040204020203" pitchFamily="34" charset="0"/>
+              </a:rPr>
+              <a:t>Emotional Appeal by Time of Day</a:t>
+            </a:r>
+          </a:p>
+        </p:txBody>
+      </p:sp>
+      <p:pic>
+        <p:nvPicPr>
+          <p:cNvPr id="4" name="Picture 3">
+            <a:extLst>
+              <a:ext uri="{FF2B5EF4-FFF2-40B4-BE49-F238E27FC236}">
+                <a16:creationId xmlns:a16="http://schemas.microsoft.com/office/drawing/2014/main" id="{12A43A08-2103-40C7-B829-448823EF99BF}"/>
+              </a:ext>
+            </a:extLst>
+          </p:cNvPr>
+          <p:cNvPicPr>
+            <a:picLocks noChangeAspect="1"/>
+          </p:cNvPicPr>
+          <p:nvPr/>
+        </p:nvPicPr>
+        <p:blipFill>
+          <a:blip r:embed="rId2"/>
+          <a:stretch>
+            <a:fillRect/>
+          </a:stretch>
+        </p:blipFill>
+        <p:spPr>
+          <a:xfrm>
+            <a:off x="773940" y="1302706"/>
+            <a:ext cx="4562587" cy="5340380"/>
+          </a:xfrm>
+          <a:prstGeom prst="rect">
+            <a:avLst/>
+          </a:prstGeom>
+        </p:spPr>
+      </p:pic>
+      <p:pic>
+        <p:nvPicPr>
+          <p:cNvPr id="13" name="Picture 12">
+            <a:extLst>
+              <a:ext uri="{FF2B5EF4-FFF2-40B4-BE49-F238E27FC236}">
+                <a16:creationId xmlns:a16="http://schemas.microsoft.com/office/drawing/2014/main" id="{9D41C866-5012-43F7-9BAE-CFA1D8AEE594}"/>
+              </a:ext>
+            </a:extLst>
+          </p:cNvPr>
+          <p:cNvPicPr>
+            <a:picLocks noChangeAspect="1"/>
+          </p:cNvPicPr>
+          <p:nvPr/>
+        </p:nvPicPr>
+        <p:blipFill>
+          <a:blip r:embed="rId3"/>
+          <a:stretch>
+            <a:fillRect/>
+          </a:stretch>
+        </p:blipFill>
+        <p:spPr>
+          <a:xfrm>
+            <a:off x="6210237" y="1302706"/>
+            <a:ext cx="4562587" cy="5340380"/>
+          </a:xfrm>
+          <a:prstGeom prst="rect">
+            <a:avLst/>
+          </a:prstGeom>
+        </p:spPr>
+      </p:pic>
+      <p:sp>
+        <p:nvSpPr>
+          <p:cNvPr id="15" name="TextBox 14">
+            <a:extLst>
+              <a:ext uri="{FF2B5EF4-FFF2-40B4-BE49-F238E27FC236}">
+                <a16:creationId xmlns:a16="http://schemas.microsoft.com/office/drawing/2014/main" id="{23C30619-1362-4445-879F-DE45917B9660}"/>
+              </a:ext>
+            </a:extLst>
+          </p:cNvPr>
+          <p:cNvSpPr txBox="1"/>
+          <p:nvPr/>
+        </p:nvSpPr>
+        <p:spPr>
+          <a:xfrm rot="16200000">
+            <a:off x="5352931" y="1847544"/>
+            <a:ext cx="1124983" cy="338554"/>
+          </a:xfrm>
+          <a:prstGeom prst="rect">
+            <a:avLst/>
+          </a:prstGeom>
+          <a:noFill/>
+        </p:spPr>
+        <p:txBody>
+          <a:bodyPr wrap="square" rtlCol="0">
+            <a:spAutoFit/>
+          </a:bodyPr>
+          <a:lstStyle/>
+          <a:p>
+            <a:r>
+              <a:rPr lang="en-US" sz="1600" dirty="0">
+                <a:solidFill>
+                  <a:schemeClr val="bg1"/>
+                </a:solidFill>
+                <a:latin typeface="Bahnschrift SemiCondensed" panose="020B0502040204020203" pitchFamily="34" charset="0"/>
+              </a:rPr>
+              <a:t>Avg Anger</a:t>
+            </a:r>
+          </a:p>
+        </p:txBody>
+      </p:sp>
+      <p:sp>
+        <p:nvSpPr>
+          <p:cNvPr id="17" name="TextBox 16">
+            <a:extLst>
+              <a:ext uri="{FF2B5EF4-FFF2-40B4-BE49-F238E27FC236}">
+                <a16:creationId xmlns:a16="http://schemas.microsoft.com/office/drawing/2014/main" id="{2DF71FB6-8294-4D08-9705-E96811F74EE1}"/>
+              </a:ext>
+            </a:extLst>
+          </p:cNvPr>
+          <p:cNvSpPr txBox="1"/>
+          <p:nvPr/>
+        </p:nvSpPr>
+        <p:spPr>
+          <a:xfrm rot="16200000">
+            <a:off x="5298219" y="3112726"/>
+            <a:ext cx="1234406" cy="338554"/>
+          </a:xfrm>
+          <a:prstGeom prst="rect">
+            <a:avLst/>
+          </a:prstGeom>
+          <a:noFill/>
+        </p:spPr>
+        <p:txBody>
+          <a:bodyPr wrap="square" rtlCol="0">
+            <a:spAutoFit/>
+          </a:bodyPr>
+          <a:lstStyle/>
+          <a:p>
+            <a:r>
+              <a:rPr lang="en-US" sz="1600" dirty="0">
+                <a:solidFill>
+                  <a:schemeClr val="bg1"/>
+                </a:solidFill>
+                <a:latin typeface="Bahnschrift SemiCondensed" panose="020B0502040204020203" pitchFamily="34" charset="0"/>
+              </a:rPr>
+              <a:t>Avg Disgust</a:t>
+            </a:r>
+          </a:p>
+        </p:txBody>
+      </p:sp>
+      <p:sp>
+        <p:nvSpPr>
+          <p:cNvPr id="18" name="TextBox 17">
+            <a:extLst>
+              <a:ext uri="{FF2B5EF4-FFF2-40B4-BE49-F238E27FC236}">
+                <a16:creationId xmlns:a16="http://schemas.microsoft.com/office/drawing/2014/main" id="{0BF994A3-7518-4A80-9A7C-5FB6C5292ED9}"/>
+              </a:ext>
+            </a:extLst>
+          </p:cNvPr>
+          <p:cNvSpPr txBox="1"/>
+          <p:nvPr/>
+        </p:nvSpPr>
+        <p:spPr>
+          <a:xfrm rot="16200000">
+            <a:off x="5447025" y="4422307"/>
+            <a:ext cx="956805" cy="338554"/>
+          </a:xfrm>
+          <a:prstGeom prst="rect">
+            <a:avLst/>
+          </a:prstGeom>
+          <a:noFill/>
+        </p:spPr>
+        <p:txBody>
+          <a:bodyPr wrap="square" rtlCol="0">
+            <a:spAutoFit/>
+          </a:bodyPr>
+          <a:lstStyle/>
+          <a:p>
+            <a:r>
+              <a:rPr lang="en-US" sz="1600" dirty="0">
+                <a:solidFill>
+                  <a:schemeClr val="bg1"/>
+                </a:solidFill>
+                <a:latin typeface="Bahnschrift SemiCondensed" panose="020B0502040204020203" pitchFamily="34" charset="0"/>
+              </a:rPr>
+              <a:t>Avg Fear</a:t>
+            </a:r>
+          </a:p>
+        </p:txBody>
+      </p:sp>
+      <p:sp>
+        <p:nvSpPr>
+          <p:cNvPr id="19" name="TextBox 18">
+            <a:extLst>
+              <a:ext uri="{FF2B5EF4-FFF2-40B4-BE49-F238E27FC236}">
+                <a16:creationId xmlns:a16="http://schemas.microsoft.com/office/drawing/2014/main" id="{CD96B1CB-E605-477B-A94F-CECD76007C0C}"/>
+              </a:ext>
+            </a:extLst>
+          </p:cNvPr>
+          <p:cNvSpPr txBox="1"/>
+          <p:nvPr/>
+        </p:nvSpPr>
+        <p:spPr>
+          <a:xfrm rot="16200000">
+            <a:off x="36035" y="3234786"/>
+            <a:ext cx="858314" cy="338554"/>
+          </a:xfrm>
+          <a:prstGeom prst="rect">
+            <a:avLst/>
+          </a:prstGeom>
+          <a:noFill/>
+        </p:spPr>
+        <p:txBody>
+          <a:bodyPr wrap="square" rtlCol="0">
+            <a:spAutoFit/>
+          </a:bodyPr>
+          <a:lstStyle/>
+          <a:p>
+            <a:r>
+              <a:rPr lang="en-US" sz="1600" dirty="0">
+                <a:solidFill>
+                  <a:schemeClr val="bg1"/>
+                </a:solidFill>
+                <a:latin typeface="Bahnschrift SemiCondensed" panose="020B0502040204020203" pitchFamily="34" charset="0"/>
+              </a:rPr>
+              <a:t>Avg Joy</a:t>
+            </a:r>
+          </a:p>
+        </p:txBody>
+      </p:sp>
+      <p:sp>
+        <p:nvSpPr>
+          <p:cNvPr id="20" name="TextBox 19">
+            <a:extLst>
+              <a:ext uri="{FF2B5EF4-FFF2-40B4-BE49-F238E27FC236}">
+                <a16:creationId xmlns:a16="http://schemas.microsoft.com/office/drawing/2014/main" id="{557852E7-AA53-43CC-9F4C-10DAA091896E}"/>
+              </a:ext>
+            </a:extLst>
+          </p:cNvPr>
+          <p:cNvSpPr txBox="1"/>
+          <p:nvPr/>
+        </p:nvSpPr>
+        <p:spPr>
+          <a:xfrm rot="16200000">
+            <a:off x="5323339" y="5618042"/>
+            <a:ext cx="1263691" cy="338554"/>
+          </a:xfrm>
+          <a:prstGeom prst="rect">
+            <a:avLst/>
+          </a:prstGeom>
+          <a:noFill/>
+        </p:spPr>
+        <p:txBody>
+          <a:bodyPr wrap="square" rtlCol="0">
+            <a:spAutoFit/>
+          </a:bodyPr>
+          <a:lstStyle/>
+          <a:p>
+            <a:r>
+              <a:rPr lang="en-US" sz="1600" dirty="0">
+                <a:solidFill>
+                  <a:schemeClr val="bg1"/>
+                </a:solidFill>
+                <a:latin typeface="Bahnschrift SemiCondensed" panose="020B0502040204020203" pitchFamily="34" charset="0"/>
+              </a:rPr>
+              <a:t>Avg Sadness</a:t>
+            </a:r>
+          </a:p>
+        </p:txBody>
+      </p:sp>
+      <p:sp>
+        <p:nvSpPr>
+          <p:cNvPr id="21" name="TextBox 20">
+            <a:extLst>
+              <a:ext uri="{FF2B5EF4-FFF2-40B4-BE49-F238E27FC236}">
+                <a16:creationId xmlns:a16="http://schemas.microsoft.com/office/drawing/2014/main" id="{D63685E6-DB9C-4B14-AD96-2F702AE87E7A}"/>
+              </a:ext>
+            </a:extLst>
+          </p:cNvPr>
+          <p:cNvSpPr txBox="1"/>
+          <p:nvPr/>
+        </p:nvSpPr>
+        <p:spPr>
+          <a:xfrm rot="16200000">
+            <a:off x="-130776" y="4440784"/>
+            <a:ext cx="1191937" cy="338554"/>
+          </a:xfrm>
+          <a:prstGeom prst="rect">
+            <a:avLst/>
+          </a:prstGeom>
+          <a:noFill/>
+        </p:spPr>
+        <p:txBody>
+          <a:bodyPr wrap="square" rtlCol="0">
+            <a:spAutoFit/>
+          </a:bodyPr>
+          <a:lstStyle/>
+          <a:p>
+            <a:r>
+              <a:rPr lang="en-US" sz="1600" dirty="0">
+                <a:solidFill>
+                  <a:schemeClr val="bg1"/>
+                </a:solidFill>
+                <a:latin typeface="Bahnschrift SemiCondensed" panose="020B0502040204020203" pitchFamily="34" charset="0"/>
+              </a:rPr>
+              <a:t>Avg Surprise</a:t>
+            </a:r>
+          </a:p>
+        </p:txBody>
+      </p:sp>
+      <p:sp>
+        <p:nvSpPr>
+          <p:cNvPr id="22" name="TextBox 21">
+            <a:extLst>
+              <a:ext uri="{FF2B5EF4-FFF2-40B4-BE49-F238E27FC236}">
+                <a16:creationId xmlns:a16="http://schemas.microsoft.com/office/drawing/2014/main" id="{D5FD1679-A1A0-41AE-A28E-00E2ACC6FED4}"/>
+              </a:ext>
+            </a:extLst>
+          </p:cNvPr>
+          <p:cNvSpPr txBox="1"/>
+          <p:nvPr/>
+        </p:nvSpPr>
+        <p:spPr>
+          <a:xfrm rot="16200000">
+            <a:off x="-35407" y="5638964"/>
+            <a:ext cx="1001201" cy="338554"/>
+          </a:xfrm>
+          <a:prstGeom prst="rect">
+            <a:avLst/>
+          </a:prstGeom>
+          <a:noFill/>
+        </p:spPr>
+        <p:txBody>
+          <a:bodyPr wrap="square" rtlCol="0">
+            <a:spAutoFit/>
+          </a:bodyPr>
+          <a:lstStyle/>
+          <a:p>
+            <a:r>
+              <a:rPr lang="en-US" sz="1600" dirty="0">
+                <a:solidFill>
+                  <a:schemeClr val="bg1"/>
+                </a:solidFill>
+                <a:latin typeface="Bahnschrift SemiCondensed" panose="020B0502040204020203" pitchFamily="34" charset="0"/>
+              </a:rPr>
+              <a:t>Avg Trust</a:t>
+            </a:r>
+          </a:p>
+        </p:txBody>
+      </p:sp>
+      <p:sp>
+        <p:nvSpPr>
+          <p:cNvPr id="23" name="TextBox 22">
+            <a:extLst>
+              <a:ext uri="{FF2B5EF4-FFF2-40B4-BE49-F238E27FC236}">
+                <a16:creationId xmlns:a16="http://schemas.microsoft.com/office/drawing/2014/main" id="{D7B746E6-B95D-4A9D-858F-07ECE48C19DA}"/>
+              </a:ext>
+            </a:extLst>
+          </p:cNvPr>
+          <p:cNvSpPr txBox="1"/>
+          <p:nvPr/>
+        </p:nvSpPr>
+        <p:spPr>
+          <a:xfrm rot="16200000">
+            <a:off x="-334977" y="2026901"/>
+            <a:ext cx="1540725" cy="338554"/>
+          </a:xfrm>
+          <a:prstGeom prst="rect">
+            <a:avLst/>
+          </a:prstGeom>
+          <a:noFill/>
+        </p:spPr>
+        <p:txBody>
+          <a:bodyPr wrap="square" rtlCol="0">
+            <a:spAutoFit/>
+          </a:bodyPr>
+          <a:lstStyle/>
+          <a:p>
+            <a:r>
+              <a:rPr lang="en-US" sz="1600" dirty="0">
+                <a:solidFill>
+                  <a:schemeClr val="bg1"/>
+                </a:solidFill>
+                <a:latin typeface="Bahnschrift SemiCondensed" panose="020B0502040204020203" pitchFamily="34" charset="0"/>
+              </a:rPr>
+              <a:t>Avg Anticipation</a:t>
+            </a:r>
+          </a:p>
+        </p:txBody>
+      </p:sp>
+    </p:spTree>
+    <p:extLst>
+      <p:ext uri="{BB962C8B-B14F-4D97-AF65-F5344CB8AC3E}">
+        <p14:creationId xmlns:p14="http://schemas.microsoft.com/office/powerpoint/2010/main" val="45150105"/>
+      </p:ext>
+    </p:extLst>
+  </p:cSld>
+  <p:clrMapOvr>
+    <a:masterClrMapping/>
+  </p:clrMapOvr>
+</p:sld>
+</file>
+
+<file path=ppt/slides/slide16.xml><?xml version="1.0" encoding="utf-8"?>
+<p:sld xmlns:a="http://schemas.openxmlformats.org/drawingml/2006/main" xmlns:r="http://schemas.openxmlformats.org/officeDocument/2006/relationships" xmlns:p="http://schemas.openxmlformats.org/presentationml/2006/main">
+  <p:cSld>
+    <p:spTree>
+      <p:nvGrpSpPr>
+        <p:cNvPr id="1" name=""/>
+        <p:cNvGrpSpPr/>
+        <p:nvPr/>
+      </p:nvGrpSpPr>
+      <p:grpSpPr>
+        <a:xfrm>
+          <a:off x="0" y="0"/>
+          <a:ext cx="0" cy="0"/>
+          <a:chOff x="0" y="0"/>
+          <a:chExt cx="0" cy="0"/>
+        </a:xfrm>
+      </p:grpSpPr>
+      <p:sp>
+        <p:nvSpPr>
           <p:cNvPr id="2" name="Rectangle 1">
             <a:extLst>
               <a:ext uri="{FF2B5EF4-FFF2-40B4-BE49-F238E27FC236}">
@@ -20367,7 +20932,7 @@
 </p:sld>
 </file>
 
-<file path=ppt/slides/slide16.xml><?xml version="1.0" encoding="utf-8"?>
+<file path=ppt/slides/slide17.xml><?xml version="1.0" encoding="utf-8"?>
 <p:sld xmlns:a="http://schemas.openxmlformats.org/drawingml/2006/main" xmlns:r="http://schemas.openxmlformats.org/officeDocument/2006/relationships" xmlns:p="http://schemas.openxmlformats.org/presentationml/2006/main">
   <p:cSld>
     <p:spTree>
@@ -20439,7 +21004,7 @@
 </p:sld>
 </file>
 
-<file path=ppt/slides/slide17.xml><?xml version="1.0" encoding="utf-8"?>
+<file path=ppt/slides/slide18.xml><?xml version="1.0" encoding="utf-8"?>
 <p:sld xmlns:a="http://schemas.openxmlformats.org/drawingml/2006/main" xmlns:r="http://schemas.openxmlformats.org/officeDocument/2006/relationships" xmlns:p="http://schemas.openxmlformats.org/presentationml/2006/main">
   <p:cSld>
     <p:spTree>
@@ -22424,7 +22989,7 @@
 </p:sld>
 </file>
 
-<file path=ppt/slides/slide18.xml><?xml version="1.0" encoding="utf-8"?>
+<file path=ppt/slides/slide19.xml><?xml version="1.0" encoding="utf-8"?>
 <p:sld xmlns:a="http://schemas.openxmlformats.org/drawingml/2006/main" xmlns:r="http://schemas.openxmlformats.org/officeDocument/2006/relationships" xmlns:p="http://schemas.openxmlformats.org/presentationml/2006/main">
   <p:cSld>
     <p:spTree>

</xml_diff>